<commit_message>
minor changes to a few PowerPoint slides
</commit_message>
<xml_diff>
--- a/PowerPoints/01 - Overview of Compilers.pptx
+++ b/PowerPoints/01 - Overview of Compilers.pptx
@@ -27,7 +27,7 @@
     <p:sldId id="309" r:id="rId15"/>
     <p:sldId id="315" r:id="rId16"/>
     <p:sldId id="310" r:id="rId17"/>
-    <p:sldId id="311" r:id="rId18"/>
+    <p:sldId id="322" r:id="rId18"/>
     <p:sldId id="265" r:id="rId19"/>
     <p:sldId id="272" r:id="rId20"/>
     <p:sldId id="273" r:id="rId21"/>
@@ -8243,7 +8243,7 @@
           <a:p>
             <a:r>
               <a:rPr lang="en-US" dirty="0"/>
-              <a:t>Example – Oracle/Sun Java Development Kit</a:t>
+              <a:t>Example – Java Development Kit</a:t>
             </a:r>
           </a:p>
           <a:p>
@@ -8367,7 +8367,7 @@
           <a:lstStyle/>
           <a:p>
             <a:r>
-              <a:rPr lang="en-US" dirty="0"/>
+              <a:rPr lang="en-US"/>
               <a:t>Just-In-Time Compiler</a:t>
             </a:r>
           </a:p>
@@ -8383,7 +8383,12 @@
             <p:ph type="body" idx="1"/>
           </p:nvPr>
         </p:nvSpPr>
-        <p:spPr/>
+        <p:spPr>
+          <a:xfrm>
+            <a:off x="458788" y="1363663"/>
+            <a:ext cx="8229600" cy="4935537"/>
+          </a:xfrm>
+        </p:spPr>
         <p:txBody>
           <a:bodyPr/>
           <a:lstStyle/>
@@ -8398,7 +8403,7 @@
             </a:r>
             <a:r>
               <a:rPr lang="en-US" dirty="0"/>
-              <a:t> is a compiler that converts program source code into native machine code just before the program is run.</a:t>
+              <a:t> is a compiler that converts program source code into native machine code as the program is running.</a:t>
             </a:r>
           </a:p>
           <a:p>
@@ -8411,14 +8416,21 @@
             <a:pPr lvl="1"/>
             <a:r>
               <a:rPr lang="en-US" dirty="0"/>
-              <a:t>Use of the JIT compiler is optional.</a:t>
+              <a:t>The JVM interpreter starts executing initially with no delay.</a:t>
             </a:r>
           </a:p>
           <a:p>
             <a:pPr lvl="1"/>
             <a:r>
               <a:rPr lang="en-US" dirty="0"/>
-              <a:t>Translation for a method is performed when the method is first called.</a:t>
+              <a:t>Methods that are executed frequently (hot) are JIT compiled.</a:t>
+            </a:r>
+          </a:p>
+          <a:p>
+            <a:pPr lvl="1"/>
+            <a:r>
+              <a:rPr lang="en-US" dirty="0"/>
+              <a:t>Execution switches to the compiled version once it becomes available,</a:t>
             </a:r>
           </a:p>
           <a:p>
@@ -8432,10 +8444,10 @@
       </p:sp>
       <p:sp>
         <p:nvSpPr>
-          <p:cNvPr id="6" name="TextBox 5">
+          <p:cNvPr id="2" name="TextBox 1">
             <a:extLst>
               <a:ext uri="{FF2B5EF4-FFF2-40B4-BE49-F238E27FC236}">
-                <a16:creationId xmlns:a16="http://schemas.microsoft.com/office/drawing/2014/main" id="{46879E0C-F686-2262-A89C-3B59AE0DA123}"/>
+                <a16:creationId xmlns:a16="http://schemas.microsoft.com/office/drawing/2014/main" id="{B971A9A6-B073-B7F3-5137-C7C5D1F36CD1}"/>
               </a:ext>
             </a:extLst>
           </p:cNvPr>
@@ -8444,8 +8456,8 @@
         </p:nvSpPr>
         <p:spPr>
           <a:xfrm>
-            <a:off x="559780" y="5334000"/>
-            <a:ext cx="8024441" cy="769441"/>
+            <a:off x="744735" y="5560536"/>
+            <a:ext cx="7654531" cy="738664"/>
           </a:xfrm>
           <a:prstGeom prst="rect">
             <a:avLst/>
@@ -8465,14 +8477,14 @@
           <a:p>
             <a:pPr algn="l"/>
             <a:r>
-              <a:rPr lang="en-US" sz="2200" dirty="0"/>
+              <a:rPr lang="en-US" sz="2100" dirty="0"/>
               <a:t> Note that Java’s JIT compiler is part of the JVM, not the actual</a:t>
             </a:r>
           </a:p>
           <a:p>
             <a:pPr algn="l"/>
             <a:r>
-              <a:rPr lang="en-US" sz="2200" dirty="0"/>
+              <a:rPr lang="en-US" sz="2100" dirty="0"/>
               <a:t>Java compiler that translates Java source files into bytecode.</a:t>
             </a:r>
           </a:p>
@@ -43462,15 +43474,7 @@
             <a:pPr algn="l"/>
             <a:r>
               <a:rPr lang="en-US" dirty="0"/>
-              <a:t>Apache </a:t>
-            </a:r>
-            <a:r>
-              <a:rPr lang="en-US" dirty="0" err="1"/>
-              <a:t>Netbeans</a:t>
-            </a:r>
-            <a:r>
-              <a:rPr lang="en-US" dirty="0"/>
-              <a:t>, and Microsoft Visual Studio.</a:t>
+              <a:t>Apache NetBeans, and Microsoft Visual Studio.</a:t>
             </a:r>
           </a:p>
         </p:txBody>

</xml_diff>

<commit_message>
updated a few slides; removed doc directory
</commit_message>
<xml_diff>
--- a/PowerPoints/01 - Overview of Compilers.pptx
+++ b/PowerPoints/01 - Overview of Compilers.pptx
@@ -6810,7 +6810,26 @@
           <a:bodyPr/>
           <a:lstStyle/>
           <a:p>
-            <a:endParaRPr lang="en-US" dirty="0"/>
+            <a:r>
+              <a:rPr lang="en-US" sz="2400" dirty="0"/>
+              <a:t>"There is a magical moment when a programmer presses the </a:t>
+            </a:r>
+            <a:r>
+              <a:rPr lang="en-US" sz="2400" i="1" dirty="0"/>
+              <a:t>run</a:t>
+            </a:r>
+            <a:r>
+              <a:rPr lang="en-US" sz="2400" dirty="0"/>
+              <a:t> button and the software begins to execute.  Somehow a program written in a high-level language is running on a computer that is capable only of shuffling bits.  Here we reveal the wizardry that makes that moment possible." – Jeremy </a:t>
+            </a:r>
+            <a:r>
+              <a:rPr lang="en-US" sz="2400" dirty="0" err="1"/>
+              <a:t>Siek</a:t>
+            </a:r>
+            <a:endParaRPr lang="en-US" sz="2400" dirty="0"/>
+          </a:p>
+          <a:p>
+            <a:endParaRPr lang="en-US" sz="2400" dirty="0"/>
           </a:p>
         </p:txBody>
       </p:sp>

</xml_diff>

<commit_message>
minor edits for 2 PowerPoint slides
</commit_message>
<xml_diff>
--- a/PowerPoints/01 - Overview of Compilers.pptx
+++ b/PowerPoints/01 - Overview of Compilers.pptx
@@ -19431,10 +19431,10 @@
           </p:nvGrpSpPr>
           <p:grpSpPr bwMode="auto">
             <a:xfrm>
-              <a:off x="2244725" y="4481513"/>
-              <a:ext cx="1462087" cy="730250"/>
-              <a:chOff x="624" y="2544"/>
-              <a:chExt cx="921" cy="460"/>
+              <a:off x="2222500" y="4481513"/>
+              <a:ext cx="1497012" cy="730250"/>
+              <a:chOff x="610" y="2544"/>
+              <a:chExt cx="943" cy="460"/>
             </a:xfrm>
           </p:grpSpPr>
           <p:grpSp>
@@ -19773,8 +19773,8 @@
             </p:nvSpPr>
             <p:spPr bwMode="auto">
               <a:xfrm>
-                <a:off x="686" y="2557"/>
-                <a:ext cx="795" cy="204"/>
+                <a:off x="610" y="2557"/>
+                <a:ext cx="943" cy="204"/>
               </a:xfrm>
               <a:prstGeom prst="rect">
                 <a:avLst/>
@@ -19801,7 +19801,7 @@
                   <a:rPr lang="en-US" sz="1500" dirty="0">
                     <a:sym typeface="Symbol" pitchFamily="18" charset="2"/>
                   </a:rPr>
-                  <a:t> ARM</a:t>
+                  <a:t> RISC-V</a:t>
                 </a:r>
               </a:p>
             </p:txBody>
@@ -31636,16 +31636,22 @@
       </p:sp>
       <p:grpSp>
         <p:nvGrpSpPr>
-          <p:cNvPr id="2" name="Group 1"/>
+          <p:cNvPr id="5" name="Group 4">
+            <a:extLst>
+              <a:ext uri="{FF2B5EF4-FFF2-40B4-BE49-F238E27FC236}">
+                <a16:creationId xmlns:a16="http://schemas.microsoft.com/office/drawing/2014/main" id="{07264B80-FD5F-5540-93D7-B398B61B6141}"/>
+              </a:ext>
+            </a:extLst>
+          </p:cNvPr>
           <p:cNvGrpSpPr/>
           <p:nvPr/>
         </p:nvGrpSpPr>
         <p:grpSpPr>
           <a:xfrm>
-            <a:off x="1269100" y="3715138"/>
-            <a:ext cx="6605800" cy="2551743"/>
-            <a:chOff x="1371478" y="3733800"/>
-            <a:chExt cx="6605800" cy="2551743"/>
+            <a:off x="924086" y="3657600"/>
+            <a:ext cx="7295828" cy="2490188"/>
+            <a:chOff x="1371468" y="3715138"/>
+            <a:chExt cx="7295828" cy="2490188"/>
           </a:xfrm>
         </p:grpSpPr>
         <p:grpSp>
@@ -31658,7 +31664,7 @@
           </p:nvGrpSpPr>
           <p:grpSpPr bwMode="auto">
             <a:xfrm>
-              <a:off x="2429328" y="3733800"/>
+              <a:off x="2326950" y="3715138"/>
               <a:ext cx="1462088" cy="730250"/>
               <a:chOff x="624" y="2544"/>
               <a:chExt cx="921" cy="460"/>
@@ -32021,11 +32027,11 @@
               <a:lstStyle/>
               <a:p>
                 <a:r>
-                  <a:rPr lang="en-US" sz="1500"/>
+                  <a:rPr lang="en-US" sz="1500" dirty="0"/>
                   <a:t>C++ </a:t>
                 </a:r>
                 <a:r>
-                  <a:rPr lang="en-US" sz="1500">
+                  <a:rPr lang="en-US" sz="1500" dirty="0">
                     <a:sym typeface="Symbol" pitchFamily="18" charset="2"/>
                   </a:rPr>
                   <a:t> M</a:t>
@@ -32044,7 +32050,7 @@
           </p:nvGrpSpPr>
           <p:grpSpPr bwMode="auto">
             <a:xfrm>
-              <a:off x="3616778" y="4098925"/>
+              <a:off x="3514400" y="4080263"/>
               <a:ext cx="1462088" cy="730250"/>
               <a:chOff x="624" y="2544"/>
               <a:chExt cx="921" cy="460"/>
@@ -32430,7 +32436,7 @@
           </p:nvGrpSpPr>
           <p:grpSpPr bwMode="auto">
             <a:xfrm>
-              <a:off x="4804228" y="3733800"/>
+              <a:off x="4701850" y="3715138"/>
               <a:ext cx="1462088" cy="730250"/>
               <a:chOff x="624" y="2544"/>
               <a:chExt cx="921" cy="460"/>
@@ -32816,8 +32822,8 @@
           </p:nvSpPr>
           <p:spPr bwMode="auto">
             <a:xfrm>
-              <a:off x="1371478" y="4802188"/>
-              <a:ext cx="2233175" cy="708528"/>
+              <a:off x="1371468" y="4783526"/>
+              <a:ext cx="2028439" cy="646973"/>
             </a:xfrm>
             <a:prstGeom prst="rect">
               <a:avLst/>
@@ -32837,13 +32843,13 @@
             <a:lstStyle/>
             <a:p>
               <a:r>
-                <a:rPr lang="en-US" sz="2000" dirty="0"/>
+                <a:rPr lang="en-US" sz="1800" dirty="0"/>
                 <a:t>Rewritten to</a:t>
               </a:r>
             </a:p>
             <a:p>
               <a:r>
-                <a:rPr lang="en-US" sz="2000" dirty="0"/>
+                <a:rPr lang="en-US" sz="1800" dirty="0"/>
                 <a:t>improve efficiency</a:t>
               </a:r>
             </a:p>
@@ -32859,8 +32865,8 @@
           </p:nvSpPr>
           <p:spPr bwMode="auto">
             <a:xfrm>
-              <a:off x="5689600" y="4724400"/>
-              <a:ext cx="2287678" cy="1016305"/>
+              <a:off x="5587222" y="4705738"/>
+              <a:ext cx="3080074" cy="1477970"/>
             </a:xfrm>
             <a:prstGeom prst="rect">
               <a:avLst/>
@@ -32881,22 +32887,36 @@
             <a:p>
               <a:pPr algn="l"/>
               <a:r>
-                <a:rPr lang="en-US" sz="2000" dirty="0"/>
-                <a:t>This version is</a:t>
+                <a:rPr lang="en-US" sz="1800" dirty="0"/>
+                <a:t>This version generates</a:t>
               </a:r>
             </a:p>
             <a:p>
               <a:pPr algn="l"/>
               <a:r>
-                <a:rPr lang="en-US" sz="2000" dirty="0"/>
-                <a:t>more efficient than</a:t>
+                <a:rPr lang="en-US" sz="1800" dirty="0"/>
+                <a:t>more efficient code than</a:t>
               </a:r>
             </a:p>
             <a:p>
               <a:pPr algn="l"/>
               <a:r>
-                <a:rPr lang="en-US" sz="2000" dirty="0"/>
-                <a:t>this version</a:t>
+                <a:rPr lang="en-US" sz="1800" dirty="0"/>
+                <a:t>this version.  Use it to</a:t>
+              </a:r>
+            </a:p>
+            <a:p>
+              <a:pPr algn="l"/>
+              <a:r>
+                <a:rPr lang="en-US" sz="1800" dirty="0"/>
+                <a:t>recompile the C++ version</a:t>
+              </a:r>
+            </a:p>
+            <a:p>
+              <a:pPr algn="l"/>
+              <a:r>
+                <a:rPr lang="en-US" sz="1800" dirty="0"/>
+                <a:t>for a more efficient compiler.</a:t>
               </a:r>
             </a:p>
           </p:txBody>
@@ -32911,7 +32931,7 @@
           </p:nvSpPr>
           <p:spPr bwMode="auto">
             <a:xfrm>
-              <a:off x="3115128" y="4375150"/>
+              <a:off x="3012750" y="4356488"/>
               <a:ext cx="92075" cy="92075"/>
             </a:xfrm>
             <a:prstGeom prst="diamond">
@@ -32943,7 +32963,7 @@
           </p:nvSpPr>
           <p:spPr bwMode="auto">
             <a:xfrm>
-              <a:off x="5477328" y="4375150"/>
+              <a:off x="5374950" y="4356488"/>
               <a:ext cx="92075" cy="92075"/>
             </a:xfrm>
             <a:prstGeom prst="diamond">
@@ -32977,7 +32997,7 @@
           </p:nvCxnSpPr>
           <p:spPr bwMode="auto">
             <a:xfrm rot="5400000" flipH="1" flipV="1">
-              <a:off x="2657135" y="4298157"/>
+              <a:off x="2554757" y="4279495"/>
               <a:ext cx="334963" cy="673100"/>
             </a:xfrm>
             <a:prstGeom prst="bentConnector3">
@@ -33001,15 +33021,15 @@
             <p:cNvPr id="33807" name="AutoShape 48"/>
             <p:cNvCxnSpPr>
               <a:cxnSpLocks noChangeShapeType="1"/>
-              <a:stCxn id="33808" idx="1"/>
+              <a:stCxn id="3" idx="1"/>
               <a:endCxn id="33805" idx="2"/>
             </p:cNvCxnSpPr>
             <p:nvPr/>
           </p:nvCxnSpPr>
           <p:spPr bwMode="auto">
             <a:xfrm rot="10800000">
-              <a:off x="5523366" y="4467226"/>
-              <a:ext cx="196622" cy="496809"/>
+              <a:off x="5420988" y="4448564"/>
+              <a:ext cx="187332" cy="456923"/>
             </a:xfrm>
             <a:prstGeom prst="bentConnector2">
               <a:avLst/>
@@ -33035,7 +33055,7 @@
           </p:nvSpPr>
           <p:spPr bwMode="auto">
             <a:xfrm>
-              <a:off x="5719988" y="4917996"/>
+              <a:off x="5638708" y="4899334"/>
               <a:ext cx="92075" cy="92075"/>
             </a:xfrm>
             <a:prstGeom prst="diamond">
@@ -33067,7 +33087,7 @@
           </p:nvSpPr>
           <p:spPr bwMode="auto">
             <a:xfrm>
-              <a:off x="5719988" y="5486400"/>
+              <a:off x="5617610" y="5467738"/>
               <a:ext cx="92075" cy="92075"/>
             </a:xfrm>
             <a:prstGeom prst="diamond">
@@ -33101,7 +33121,7 @@
           </p:nvCxnSpPr>
           <p:spPr bwMode="auto">
             <a:xfrm rot="10800000">
-              <a:off x="4805136" y="4641702"/>
+              <a:off x="4702758" y="4623040"/>
               <a:ext cx="914852" cy="890736"/>
             </a:xfrm>
             <a:prstGeom prst="bentConnector3">
@@ -33130,8 +33150,8 @@
           </p:nvSpPr>
           <p:spPr bwMode="auto">
             <a:xfrm>
-              <a:off x="1682639" y="5577015"/>
-              <a:ext cx="2096728" cy="708528"/>
+              <a:off x="1676441" y="5558353"/>
+              <a:ext cx="1904367" cy="646973"/>
             </a:xfrm>
             <a:prstGeom prst="rect">
               <a:avLst/>
@@ -33151,13 +33171,13 @@
             <a:lstStyle/>
             <a:p>
               <a:r>
-                <a:rPr lang="en-US" sz="2000" dirty="0"/>
+                <a:rPr lang="en-US" sz="1800" dirty="0"/>
                 <a:t>Compile it using</a:t>
               </a:r>
             </a:p>
             <a:p>
               <a:r>
-                <a:rPr lang="en-US" sz="2000" dirty="0"/>
+                <a:rPr lang="en-US" sz="1800" dirty="0"/>
                 <a:t>existing compiler</a:t>
               </a:r>
             </a:p>
@@ -33175,8 +33195,8 @@
           </p:nvCxnSpPr>
           <p:spPr bwMode="auto">
             <a:xfrm flipV="1">
-              <a:off x="3779367" y="5563086"/>
-              <a:ext cx="568795" cy="368193"/>
+              <a:off x="3580808" y="5544424"/>
+              <a:ext cx="664976" cy="337416"/>
             </a:xfrm>
             <a:prstGeom prst="bentConnector2">
               <a:avLst/>
@@ -33202,7 +33222,7 @@
           </p:nvSpPr>
           <p:spPr bwMode="auto">
             <a:xfrm>
-              <a:off x="4713061" y="4595664"/>
+              <a:off x="4610683" y="4577002"/>
               <a:ext cx="92075" cy="92075"/>
             </a:xfrm>
             <a:prstGeom prst="diamond">
@@ -33232,7 +33252,7 @@
           </p:nvSpPr>
           <p:spPr bwMode="auto">
             <a:xfrm>
-              <a:off x="3890962" y="4831566"/>
+              <a:off x="3788584" y="4812904"/>
               <a:ext cx="914400" cy="731520"/>
             </a:xfrm>
             <a:prstGeom prst="flowChartOffpageConnector">
@@ -33257,6 +33277,43 @@
                 <a:rPr lang="en-US" sz="1500" dirty="0"/>
                 <a:t>M</a:t>
               </a:r>
+            </a:p>
+          </p:txBody>
+        </p:sp>
+        <p:sp>
+          <p:nvSpPr>
+            <p:cNvPr id="3" name="Diamond 2">
+              <a:extLst>
+                <a:ext uri="{FF2B5EF4-FFF2-40B4-BE49-F238E27FC236}">
+                  <a16:creationId xmlns:a16="http://schemas.microsoft.com/office/drawing/2014/main" id="{F4A621D2-73FC-9B45-1311-B6708BB1332F}"/>
+                </a:ext>
+              </a:extLst>
+            </p:cNvPr>
+            <p:cNvSpPr/>
+            <p:nvPr/>
+          </p:nvSpPr>
+          <p:spPr bwMode="auto">
+            <a:xfrm>
+              <a:off x="5608320" y="4814046"/>
+              <a:ext cx="182880" cy="182880"/>
+            </a:xfrm>
+            <a:prstGeom prst="diamond">
+              <a:avLst/>
+            </a:prstGeom>
+            <a:noFill/>
+            <a:ln w="9525">
+              <a:noFill/>
+              <a:round/>
+              <a:headEnd/>
+              <a:tailEnd/>
+            </a:ln>
+          </p:spPr>
+          <p:txBody>
+            <a:bodyPr wrap="none" lIns="92075" tIns="46038" rIns="92075" bIns="46038" rtlCol="0" anchor="ctr"/>
+            <a:lstStyle/>
+            <a:p>
+              <a:pPr algn="ctr"/>
+              <a:endParaRPr lang="en-US"/>
             </a:p>
           </p:txBody>
         </p:sp>

</xml_diff>

<commit_message>
clarified slides on improving compiler efficiency
</commit_message>
<xml_diff>
--- a/PowerPoints/01 - Overview of Compilers.pptx
+++ b/PowerPoints/01 - Overview of Compilers.pptx
@@ -5,10 +5,10 @@
     <p:sldMasterId id="2147483651" r:id="rId1"/>
   </p:sldMasterIdLst>
   <p:notesMasterIdLst>
-    <p:notesMasterId r:id="rId39"/>
+    <p:notesMasterId r:id="rId40"/>
   </p:notesMasterIdLst>
   <p:handoutMasterIdLst>
-    <p:handoutMasterId r:id="rId40"/>
+    <p:handoutMasterId r:id="rId41"/>
   </p:handoutMasterIdLst>
   <p:sldIdLst>
     <p:sldId id="256" r:id="rId2"/>
@@ -40,14 +40,15 @@
     <p:sldId id="301" r:id="rId28"/>
     <p:sldId id="302" r:id="rId29"/>
     <p:sldId id="305" r:id="rId30"/>
-    <p:sldId id="304" r:id="rId31"/>
-    <p:sldId id="280" r:id="rId32"/>
-    <p:sldId id="283" r:id="rId33"/>
-    <p:sldId id="320" r:id="rId34"/>
-    <p:sldId id="279" r:id="rId35"/>
-    <p:sldId id="314" r:id="rId36"/>
-    <p:sldId id="299" r:id="rId37"/>
-    <p:sldId id="321" r:id="rId38"/>
+    <p:sldId id="323" r:id="rId31"/>
+    <p:sldId id="324" r:id="rId32"/>
+    <p:sldId id="280" r:id="rId33"/>
+    <p:sldId id="283" r:id="rId34"/>
+    <p:sldId id="320" r:id="rId35"/>
+    <p:sldId id="279" r:id="rId36"/>
+    <p:sldId id="314" r:id="rId37"/>
+    <p:sldId id="299" r:id="rId38"/>
+    <p:sldId id="321" r:id="rId39"/>
   </p:sldIdLst>
   <p:sldSz cx="9144000" cy="6858000" type="screen4x3"/>
   <p:notesSz cx="7315200" cy="9601200"/>
@@ -3355,7 +3356,7 @@
     </p:spTree>
     <p:extLst>
       <p:ext uri="{BB962C8B-B14F-4D97-AF65-F5344CB8AC3E}">
-        <p14:creationId xmlns:p14="http://schemas.microsoft.com/office/powerpoint/2010/main" val="1904293377"/>
+        <p14:creationId xmlns:p14="http://schemas.microsoft.com/office/powerpoint/2010/main" val="3563528608"/>
       </p:ext>
     </p:extLst>
   </p:cSld>
@@ -3500,6 +3501,122 @@
       </p:grpSpPr>
       <p:sp>
         <p:nvSpPr>
+          <p:cNvPr id="72706" name="Slide Image Placeholder 1"/>
+          <p:cNvSpPr>
+            <a:spLocks noGrp="1" noRot="1" noChangeAspect="1" noTextEdit="1"/>
+          </p:cNvSpPr>
+          <p:nvPr>
+            <p:ph type="sldImg"/>
+          </p:nvPr>
+        </p:nvSpPr>
+        <p:spPr>
+          <a:ln/>
+        </p:spPr>
+      </p:sp>
+      <p:sp>
+        <p:nvSpPr>
+          <p:cNvPr id="72707" name="Notes Placeholder 2"/>
+          <p:cNvSpPr>
+            <a:spLocks noGrp="1"/>
+          </p:cNvSpPr>
+          <p:nvPr>
+            <p:ph type="body" idx="1"/>
+          </p:nvPr>
+        </p:nvSpPr>
+        <p:spPr>
+          <a:noFill/>
+          <a:ln/>
+        </p:spPr>
+        <p:txBody>
+          <a:bodyPr/>
+          <a:lstStyle/>
+          <a:p>
+            <a:endParaRPr lang="en-US"/>
+          </a:p>
+        </p:txBody>
+      </p:sp>
+      <p:sp>
+        <p:nvSpPr>
+          <p:cNvPr id="72708" name="Header Placeholder 3"/>
+          <p:cNvSpPr>
+            <a:spLocks noGrp="1"/>
+          </p:cNvSpPr>
+          <p:nvPr>
+            <p:ph type="hdr" sz="quarter"/>
+          </p:nvPr>
+        </p:nvSpPr>
+        <p:spPr>
+          <a:noFill/>
+        </p:spPr>
+        <p:txBody>
+          <a:bodyPr/>
+          <a:lstStyle/>
+          <a:p>
+            <a:r>
+              <a:rPr lang="en-US"/>
+              <a:t>Overview</a:t>
+            </a:r>
+          </a:p>
+        </p:txBody>
+      </p:sp>
+      <p:sp>
+        <p:nvSpPr>
+          <p:cNvPr id="72709" name="Slide Number Placeholder 4"/>
+          <p:cNvSpPr>
+            <a:spLocks noGrp="1"/>
+          </p:cNvSpPr>
+          <p:nvPr>
+            <p:ph type="sldNum" sz="quarter" idx="5"/>
+          </p:nvPr>
+        </p:nvSpPr>
+        <p:spPr>
+          <a:noFill/>
+        </p:spPr>
+        <p:txBody>
+          <a:bodyPr/>
+          <a:lstStyle/>
+          <a:p>
+            <a:fld id="{09D79773-CB6F-4D89-AF3C-07F6CE881356}" type="slidenum">
+              <a:rPr lang="en-US" smtClean="0"/>
+              <a:pPr/>
+              <a:t>31</a:t>
+            </a:fld>
+            <a:endParaRPr lang="en-US"/>
+          </a:p>
+        </p:txBody>
+      </p:sp>
+    </p:spTree>
+    <p:extLst>
+      <p:ext uri="{BB962C8B-B14F-4D97-AF65-F5344CB8AC3E}">
+        <p14:creationId xmlns:p14="http://schemas.microsoft.com/office/powerpoint/2010/main" val="3007977378"/>
+      </p:ext>
+    </p:extLst>
+  </p:cSld>
+  <p:clrMapOvr>
+    <a:masterClrMapping/>
+  </p:clrMapOvr>
+</p:notes>
+</file>
+
+<file path=ppt/notesSlides/notesSlide31.xml><?xml version="1.0" encoding="utf-8"?>
+<p:notes xmlns:a="http://schemas.openxmlformats.org/drawingml/2006/main" xmlns:r="http://schemas.openxmlformats.org/officeDocument/2006/relationships" xmlns:p="http://schemas.openxmlformats.org/presentationml/2006/main">
+  <p:cSld>
+    <p:spTree>
+      <p:nvGrpSpPr>
+        <p:cNvPr id="1" name=""/>
+        <p:cNvGrpSpPr/>
+        <p:nvPr/>
+      </p:nvGrpSpPr>
+      <p:grpSpPr>
+        <a:xfrm>
+          <a:off x="0" y="0"/>
+          <a:ext cx="0" cy="0"/>
+          <a:chOff x="0" y="0"/>
+          <a:chExt cx="0" cy="0"/>
+        </a:xfrm>
+      </p:grpSpPr>
+      <p:sp>
+        <p:nvSpPr>
           <p:cNvPr id="73730" name="Slide Image Placeholder 1"/>
           <p:cNvSpPr>
             <a:spLocks noGrp="1" noRot="1" noChangeAspect="1" noTextEdit="1"/>
@@ -3578,7 +3695,7 @@
             <a:fld id="{1F1285EA-4A9D-4B15-B096-1494399431D9}" type="slidenum">
               <a:rPr lang="en-US" smtClean="0"/>
               <a:pPr/>
-              <a:t>31</a:t>
+              <a:t>32</a:t>
             </a:fld>
             <a:endParaRPr lang="en-US"/>
           </a:p>
@@ -3597,7 +3714,7 @@
 </p:notes>
 </file>
 
-<file path=ppt/notesSlides/notesSlide31.xml><?xml version="1.0" encoding="utf-8"?>
+<file path=ppt/notesSlides/notesSlide32.xml><?xml version="1.0" encoding="utf-8"?>
 <p:notes xmlns:a="http://schemas.openxmlformats.org/drawingml/2006/main" xmlns:r="http://schemas.openxmlformats.org/officeDocument/2006/relationships" xmlns:p="http://schemas.openxmlformats.org/presentationml/2006/main">
   <p:cSld>
     <p:spTree>
@@ -3694,7 +3811,7 @@
             <a:fld id="{F0F645E5-B9F7-4648-B3AC-98A592BFCAD0}" type="slidenum">
               <a:rPr lang="en-US" smtClean="0"/>
               <a:pPr/>
-              <a:t>32</a:t>
+              <a:t>33</a:t>
             </a:fld>
             <a:endParaRPr lang="en-US"/>
           </a:p>
@@ -3713,7 +3830,7 @@
 </p:notes>
 </file>
 
-<file path=ppt/notesSlides/notesSlide32.xml><?xml version="1.0" encoding="utf-8"?>
+<file path=ppt/notesSlides/notesSlide33.xml><?xml version="1.0" encoding="utf-8"?>
 <p:notes xmlns:a="http://schemas.openxmlformats.org/drawingml/2006/main" xmlns:r="http://schemas.openxmlformats.org/officeDocument/2006/relationships" xmlns:p="http://schemas.openxmlformats.org/presentationml/2006/main">
   <p:cSld>
     <p:spTree>
@@ -3810,7 +3927,7 @@
             <a:fld id="{40F15E97-BBB5-46F5-8553-0D64B963256E}" type="slidenum">
               <a:rPr lang="en-US" smtClean="0"/>
               <a:pPr/>
-              <a:t>33</a:t>
+              <a:t>34</a:t>
             </a:fld>
             <a:endParaRPr lang="en-US"/>
           </a:p>
@@ -3820,122 +3937,6 @@
     <p:extLst>
       <p:ext uri="{BB962C8B-B14F-4D97-AF65-F5344CB8AC3E}">
         <p14:creationId xmlns:p14="http://schemas.microsoft.com/office/powerpoint/2010/main" val="3194553735"/>
-      </p:ext>
-    </p:extLst>
-  </p:cSld>
-  <p:clrMapOvr>
-    <a:masterClrMapping/>
-  </p:clrMapOvr>
-</p:notes>
-</file>
-
-<file path=ppt/notesSlides/notesSlide33.xml><?xml version="1.0" encoding="utf-8"?>
-<p:notes xmlns:a="http://schemas.openxmlformats.org/drawingml/2006/main" xmlns:r="http://schemas.openxmlformats.org/officeDocument/2006/relationships" xmlns:p="http://schemas.openxmlformats.org/presentationml/2006/main">
-  <p:cSld>
-    <p:spTree>
-      <p:nvGrpSpPr>
-        <p:cNvPr id="1" name=""/>
-        <p:cNvGrpSpPr/>
-        <p:nvPr/>
-      </p:nvGrpSpPr>
-      <p:grpSpPr>
-        <a:xfrm>
-          <a:off x="0" y="0"/>
-          <a:ext cx="0" cy="0"/>
-          <a:chOff x="0" y="0"/>
-          <a:chExt cx="0" cy="0"/>
-        </a:xfrm>
-      </p:grpSpPr>
-      <p:sp>
-        <p:nvSpPr>
-          <p:cNvPr id="76802" name="Slide Image Placeholder 1"/>
-          <p:cNvSpPr>
-            <a:spLocks noGrp="1" noRot="1" noChangeAspect="1" noTextEdit="1"/>
-          </p:cNvSpPr>
-          <p:nvPr>
-            <p:ph type="sldImg"/>
-          </p:nvPr>
-        </p:nvSpPr>
-        <p:spPr>
-          <a:ln/>
-        </p:spPr>
-      </p:sp>
-      <p:sp>
-        <p:nvSpPr>
-          <p:cNvPr id="76803" name="Notes Placeholder 2"/>
-          <p:cNvSpPr>
-            <a:spLocks noGrp="1"/>
-          </p:cNvSpPr>
-          <p:nvPr>
-            <p:ph type="body" idx="1"/>
-          </p:nvPr>
-        </p:nvSpPr>
-        <p:spPr>
-          <a:noFill/>
-          <a:ln/>
-        </p:spPr>
-        <p:txBody>
-          <a:bodyPr/>
-          <a:lstStyle/>
-          <a:p>
-            <a:endParaRPr lang="en-US"/>
-          </a:p>
-        </p:txBody>
-      </p:sp>
-      <p:sp>
-        <p:nvSpPr>
-          <p:cNvPr id="76804" name="Header Placeholder 3"/>
-          <p:cNvSpPr>
-            <a:spLocks noGrp="1"/>
-          </p:cNvSpPr>
-          <p:nvPr>
-            <p:ph type="hdr" sz="quarter"/>
-          </p:nvPr>
-        </p:nvSpPr>
-        <p:spPr>
-          <a:noFill/>
-        </p:spPr>
-        <p:txBody>
-          <a:bodyPr/>
-          <a:lstStyle/>
-          <a:p>
-            <a:r>
-              <a:rPr lang="en-US"/>
-              <a:t>Overview</a:t>
-            </a:r>
-          </a:p>
-        </p:txBody>
-      </p:sp>
-      <p:sp>
-        <p:nvSpPr>
-          <p:cNvPr id="76805" name="Slide Number Placeholder 4"/>
-          <p:cNvSpPr>
-            <a:spLocks noGrp="1"/>
-          </p:cNvSpPr>
-          <p:nvPr>
-            <p:ph type="sldNum" sz="quarter" idx="5"/>
-          </p:nvPr>
-        </p:nvSpPr>
-        <p:spPr>
-          <a:noFill/>
-        </p:spPr>
-        <p:txBody>
-          <a:bodyPr/>
-          <a:lstStyle/>
-          <a:p>
-            <a:fld id="{1CD4857E-C895-4437-BF03-1B106071D256}" type="slidenum">
-              <a:rPr lang="en-US" smtClean="0"/>
-              <a:pPr/>
-              <a:t>34</a:t>
-            </a:fld>
-            <a:endParaRPr lang="en-US"/>
-          </a:p>
-        </p:txBody>
-      </p:sp>
-    </p:spTree>
-    <p:extLst>
-      <p:ext uri="{BB962C8B-B14F-4D97-AF65-F5344CB8AC3E}">
-        <p14:creationId xmlns:p14="http://schemas.microsoft.com/office/powerpoint/2010/main" val="2095944674"/>
       </p:ext>
     </p:extLst>
   </p:cSld>
@@ -4051,6 +4052,122 @@
     </p:spTree>
     <p:extLst>
       <p:ext uri="{BB962C8B-B14F-4D97-AF65-F5344CB8AC3E}">
+        <p14:creationId xmlns:p14="http://schemas.microsoft.com/office/powerpoint/2010/main" val="2095944674"/>
+      </p:ext>
+    </p:extLst>
+  </p:cSld>
+  <p:clrMapOvr>
+    <a:masterClrMapping/>
+  </p:clrMapOvr>
+</p:notes>
+</file>
+
+<file path=ppt/notesSlides/notesSlide35.xml><?xml version="1.0" encoding="utf-8"?>
+<p:notes xmlns:a="http://schemas.openxmlformats.org/drawingml/2006/main" xmlns:r="http://schemas.openxmlformats.org/officeDocument/2006/relationships" xmlns:p="http://schemas.openxmlformats.org/presentationml/2006/main">
+  <p:cSld>
+    <p:spTree>
+      <p:nvGrpSpPr>
+        <p:cNvPr id="1" name=""/>
+        <p:cNvGrpSpPr/>
+        <p:nvPr/>
+      </p:nvGrpSpPr>
+      <p:grpSpPr>
+        <a:xfrm>
+          <a:off x="0" y="0"/>
+          <a:ext cx="0" cy="0"/>
+          <a:chOff x="0" y="0"/>
+          <a:chExt cx="0" cy="0"/>
+        </a:xfrm>
+      </p:grpSpPr>
+      <p:sp>
+        <p:nvSpPr>
+          <p:cNvPr id="76802" name="Slide Image Placeholder 1"/>
+          <p:cNvSpPr>
+            <a:spLocks noGrp="1" noRot="1" noChangeAspect="1" noTextEdit="1"/>
+          </p:cNvSpPr>
+          <p:nvPr>
+            <p:ph type="sldImg"/>
+          </p:nvPr>
+        </p:nvSpPr>
+        <p:spPr>
+          <a:ln/>
+        </p:spPr>
+      </p:sp>
+      <p:sp>
+        <p:nvSpPr>
+          <p:cNvPr id="76803" name="Notes Placeholder 2"/>
+          <p:cNvSpPr>
+            <a:spLocks noGrp="1"/>
+          </p:cNvSpPr>
+          <p:nvPr>
+            <p:ph type="body" idx="1"/>
+          </p:nvPr>
+        </p:nvSpPr>
+        <p:spPr>
+          <a:noFill/>
+          <a:ln/>
+        </p:spPr>
+        <p:txBody>
+          <a:bodyPr/>
+          <a:lstStyle/>
+          <a:p>
+            <a:endParaRPr lang="en-US"/>
+          </a:p>
+        </p:txBody>
+      </p:sp>
+      <p:sp>
+        <p:nvSpPr>
+          <p:cNvPr id="76804" name="Header Placeholder 3"/>
+          <p:cNvSpPr>
+            <a:spLocks noGrp="1"/>
+          </p:cNvSpPr>
+          <p:nvPr>
+            <p:ph type="hdr" sz="quarter"/>
+          </p:nvPr>
+        </p:nvSpPr>
+        <p:spPr>
+          <a:noFill/>
+        </p:spPr>
+        <p:txBody>
+          <a:bodyPr/>
+          <a:lstStyle/>
+          <a:p>
+            <a:r>
+              <a:rPr lang="en-US"/>
+              <a:t>Overview</a:t>
+            </a:r>
+          </a:p>
+        </p:txBody>
+      </p:sp>
+      <p:sp>
+        <p:nvSpPr>
+          <p:cNvPr id="76805" name="Slide Number Placeholder 4"/>
+          <p:cNvSpPr>
+            <a:spLocks noGrp="1"/>
+          </p:cNvSpPr>
+          <p:nvPr>
+            <p:ph type="sldNum" sz="quarter" idx="5"/>
+          </p:nvPr>
+        </p:nvSpPr>
+        <p:spPr>
+          <a:noFill/>
+        </p:spPr>
+        <p:txBody>
+          <a:bodyPr/>
+          <a:lstStyle/>
+          <a:p>
+            <a:fld id="{1CD4857E-C895-4437-BF03-1B106071D256}" type="slidenum">
+              <a:rPr lang="en-US" smtClean="0"/>
+              <a:pPr/>
+              <a:t>36</a:t>
+            </a:fld>
+            <a:endParaRPr lang="en-US"/>
+          </a:p>
+        </p:txBody>
+      </p:sp>
+    </p:spTree>
+    <p:extLst>
+      <p:ext uri="{BB962C8B-B14F-4D97-AF65-F5344CB8AC3E}">
         <p14:creationId xmlns:p14="http://schemas.microsoft.com/office/powerpoint/2010/main" val="1958639721"/>
       </p:ext>
     </p:extLst>
@@ -4061,7 +4178,7 @@
 </p:notes>
 </file>
 
-<file path=ppt/notesSlides/notesSlide35.xml><?xml version="1.0" encoding="utf-8"?>
+<file path=ppt/notesSlides/notesSlide36.xml><?xml version="1.0" encoding="utf-8"?>
 <p:notes xmlns:a="http://schemas.openxmlformats.org/drawingml/2006/main" xmlns:r="http://schemas.openxmlformats.org/officeDocument/2006/relationships" xmlns:p="http://schemas.openxmlformats.org/presentationml/2006/main">
   <p:cSld>
     <p:spTree>
@@ -4158,7 +4275,7 @@
             <a:fld id="{891F7CF7-5ECF-4AF8-8F03-7616AB30EBD0}" type="slidenum">
               <a:rPr lang="en-US" smtClean="0"/>
               <a:pPr/>
-              <a:t>36</a:t>
+              <a:t>37</a:t>
             </a:fld>
             <a:endParaRPr lang="en-US"/>
           </a:p>
@@ -4177,7 +4294,7 @@
 </p:notes>
 </file>
 
-<file path=ppt/notesSlides/notesSlide36.xml><?xml version="1.0" encoding="utf-8"?>
+<file path=ppt/notesSlides/notesSlide37.xml><?xml version="1.0" encoding="utf-8"?>
 <p:notes xmlns:a="http://schemas.openxmlformats.org/drawingml/2006/main" xmlns:r="http://schemas.openxmlformats.org/officeDocument/2006/relationships" xmlns:p="http://schemas.openxmlformats.org/presentationml/2006/main">
   <p:cSld>
     <p:spTree>
@@ -4274,7 +4391,7 @@
             <a:fld id="{9B0ACD02-6F40-4E73-B8A6-AB01A613B27D}" type="slidenum">
               <a:rPr lang="en-US" smtClean="0"/>
               <a:pPr/>
-              <a:t>37</a:t>
+              <a:t>38</a:t>
             </a:fld>
             <a:endParaRPr lang="en-US"/>
           </a:p>
@@ -31629,17 +31746,20 @@
           <a:p>
             <a:r>
               <a:rPr lang="en-US" dirty="0"/>
-              <a:t>If you modify the compiler to improve efficiency of the generated object code, then you can recompile the compiler to obtain a more efficient compiler.</a:t>
+              <a:t>Modify the compiler to improve efficiency of the generated object code.  Recompile the compiler to obtain one that generates more efficient object code.</a:t>
             </a:r>
+          </a:p>
+          <a:p>
+            <a:endParaRPr lang="en-US" dirty="0"/>
           </a:p>
         </p:txBody>
       </p:sp>
       <p:grpSp>
         <p:nvGrpSpPr>
-          <p:cNvPr id="5" name="Group 4">
+          <p:cNvPr id="2" name="Group 1">
             <a:extLst>
               <a:ext uri="{FF2B5EF4-FFF2-40B4-BE49-F238E27FC236}">
-                <a16:creationId xmlns:a16="http://schemas.microsoft.com/office/drawing/2014/main" id="{07264B80-FD5F-5540-93D7-B398B61B6141}"/>
+                <a16:creationId xmlns:a16="http://schemas.microsoft.com/office/drawing/2014/main" id="{C0A2CA23-4184-0C96-3ADB-B3F76FBC9F0E}"/>
               </a:ext>
             </a:extLst>
           </p:cNvPr>
@@ -31648,15 +31768,21 @@
         </p:nvGrpSpPr>
         <p:grpSpPr>
           <a:xfrm>
-            <a:off x="924086" y="3657600"/>
-            <a:ext cx="7295828" cy="2490188"/>
-            <a:chOff x="1371468" y="3715138"/>
-            <a:chExt cx="7295828" cy="2490188"/>
+            <a:off x="1016736" y="3733800"/>
+            <a:ext cx="7110529" cy="2243359"/>
+            <a:chOff x="655511" y="1562827"/>
+            <a:chExt cx="7110529" cy="2243359"/>
           </a:xfrm>
         </p:grpSpPr>
         <p:grpSp>
           <p:nvGrpSpPr>
-            <p:cNvPr id="33798" name="Group 4"/>
+            <p:cNvPr id="4" name="Group 5">
+              <a:extLst>
+                <a:ext uri="{FF2B5EF4-FFF2-40B4-BE49-F238E27FC236}">
+                  <a16:creationId xmlns:a16="http://schemas.microsoft.com/office/drawing/2014/main" id="{8F9DDB8E-2873-25BC-39D4-0AB3C4C34F39}"/>
+                </a:ext>
+              </a:extLst>
+            </p:cNvPr>
             <p:cNvGrpSpPr>
               <a:grpSpLocks/>
             </p:cNvGrpSpPr>
@@ -31664,7 +31790,442 @@
           </p:nvGrpSpPr>
           <p:grpSpPr bwMode="auto">
             <a:xfrm>
-              <a:off x="2326950" y="3715138"/>
+              <a:off x="2342473" y="1562827"/>
+              <a:ext cx="1462088" cy="730250"/>
+              <a:chOff x="624" y="2544"/>
+              <a:chExt cx="921" cy="460"/>
+            </a:xfrm>
+          </p:grpSpPr>
+          <p:sp>
+            <p:nvSpPr>
+              <p:cNvPr id="47" name="Line 6">
+                <a:extLst>
+                  <a:ext uri="{FF2B5EF4-FFF2-40B4-BE49-F238E27FC236}">
+                    <a16:creationId xmlns:a16="http://schemas.microsoft.com/office/drawing/2014/main" id="{E341CF51-D9E8-13A2-125B-A5AB50601A01}"/>
+                  </a:ext>
+                </a:extLst>
+              </p:cNvPr>
+              <p:cNvSpPr>
+                <a:spLocks noChangeShapeType="1"/>
+              </p:cNvSpPr>
+              <p:nvPr/>
+            </p:nvSpPr>
+            <p:spPr bwMode="auto">
+              <a:xfrm>
+                <a:off x="624" y="2544"/>
+                <a:ext cx="921" cy="0"/>
+              </a:xfrm>
+              <a:prstGeom prst="line">
+                <a:avLst/>
+              </a:prstGeom>
+              <a:noFill/>
+              <a:ln w="9525">
+                <a:solidFill>
+                  <a:schemeClr val="tx1"/>
+                </a:solidFill>
+                <a:round/>
+                <a:headEnd/>
+                <a:tailEnd/>
+              </a:ln>
+            </p:spPr>
+            <p:txBody>
+              <a:bodyPr wrap="none" lIns="92075" tIns="46038" rIns="92075" bIns="46038" anchor="ctr"/>
+              <a:lstStyle/>
+              <a:p>
+                <a:endParaRPr lang="en-US"/>
+              </a:p>
+            </p:txBody>
+          </p:sp>
+          <p:sp>
+            <p:nvSpPr>
+              <p:cNvPr id="48" name="Line 7">
+                <a:extLst>
+                  <a:ext uri="{FF2B5EF4-FFF2-40B4-BE49-F238E27FC236}">
+                    <a16:creationId xmlns:a16="http://schemas.microsoft.com/office/drawing/2014/main" id="{93F40A64-B016-0DCB-76BC-E9C5145627F0}"/>
+                  </a:ext>
+                </a:extLst>
+              </p:cNvPr>
+              <p:cNvSpPr>
+                <a:spLocks noChangeShapeType="1"/>
+              </p:cNvSpPr>
+              <p:nvPr/>
+            </p:nvSpPr>
+            <p:spPr bwMode="auto">
+              <a:xfrm>
+                <a:off x="797" y="3004"/>
+                <a:ext cx="576" cy="0"/>
+              </a:xfrm>
+              <a:prstGeom prst="line">
+                <a:avLst/>
+              </a:prstGeom>
+              <a:noFill/>
+              <a:ln w="9525">
+                <a:solidFill>
+                  <a:schemeClr val="tx1"/>
+                </a:solidFill>
+                <a:round/>
+                <a:headEnd/>
+                <a:tailEnd/>
+              </a:ln>
+            </p:spPr>
+            <p:txBody>
+              <a:bodyPr wrap="none" lIns="92075" tIns="46038" rIns="92075" bIns="46038" anchor="ctr"/>
+              <a:lstStyle/>
+              <a:p>
+                <a:endParaRPr lang="en-US"/>
+              </a:p>
+            </p:txBody>
+          </p:sp>
+          <p:sp>
+            <p:nvSpPr>
+              <p:cNvPr id="49" name="Line 8">
+                <a:extLst>
+                  <a:ext uri="{FF2B5EF4-FFF2-40B4-BE49-F238E27FC236}">
+                    <a16:creationId xmlns:a16="http://schemas.microsoft.com/office/drawing/2014/main" id="{D3579AF4-23E4-B8E2-3736-FE5BB2A032E6}"/>
+                  </a:ext>
+                </a:extLst>
+              </p:cNvPr>
+              <p:cNvSpPr>
+                <a:spLocks noChangeShapeType="1"/>
+              </p:cNvSpPr>
+              <p:nvPr/>
+            </p:nvSpPr>
+            <p:spPr bwMode="auto">
+              <a:xfrm>
+                <a:off x="625" y="2544"/>
+                <a:ext cx="0" cy="230"/>
+              </a:xfrm>
+              <a:prstGeom prst="line">
+                <a:avLst/>
+              </a:prstGeom>
+              <a:noFill/>
+              <a:ln w="9525">
+                <a:solidFill>
+                  <a:schemeClr val="tx1"/>
+                </a:solidFill>
+                <a:round/>
+                <a:headEnd/>
+                <a:tailEnd/>
+              </a:ln>
+            </p:spPr>
+            <p:txBody>
+              <a:bodyPr wrap="none" lIns="92075" tIns="46038" rIns="92075" bIns="46038" anchor="ctr"/>
+              <a:lstStyle/>
+              <a:p>
+                <a:endParaRPr lang="en-US"/>
+              </a:p>
+            </p:txBody>
+          </p:sp>
+          <p:sp>
+            <p:nvSpPr>
+              <p:cNvPr id="50" name="Line 9">
+                <a:extLst>
+                  <a:ext uri="{FF2B5EF4-FFF2-40B4-BE49-F238E27FC236}">
+                    <a16:creationId xmlns:a16="http://schemas.microsoft.com/office/drawing/2014/main" id="{8F89DF1B-A31B-E697-4016-0D9C984881A3}"/>
+                  </a:ext>
+                </a:extLst>
+              </p:cNvPr>
+              <p:cNvSpPr>
+                <a:spLocks noChangeShapeType="1"/>
+              </p:cNvSpPr>
+              <p:nvPr/>
+            </p:nvSpPr>
+            <p:spPr bwMode="auto">
+              <a:xfrm>
+                <a:off x="1545" y="2544"/>
+                <a:ext cx="0" cy="230"/>
+              </a:xfrm>
+              <a:prstGeom prst="line">
+                <a:avLst/>
+              </a:prstGeom>
+              <a:noFill/>
+              <a:ln w="9525">
+                <a:solidFill>
+                  <a:schemeClr val="tx1"/>
+                </a:solidFill>
+                <a:round/>
+                <a:headEnd/>
+                <a:tailEnd/>
+              </a:ln>
+            </p:spPr>
+            <p:txBody>
+              <a:bodyPr wrap="none" lIns="92075" tIns="46038" rIns="92075" bIns="46038" anchor="ctr"/>
+              <a:lstStyle/>
+              <a:p>
+                <a:endParaRPr lang="en-US"/>
+              </a:p>
+            </p:txBody>
+          </p:sp>
+          <p:sp>
+            <p:nvSpPr>
+              <p:cNvPr id="51" name="Line 10">
+                <a:extLst>
+                  <a:ext uri="{FF2B5EF4-FFF2-40B4-BE49-F238E27FC236}">
+                    <a16:creationId xmlns:a16="http://schemas.microsoft.com/office/drawing/2014/main" id="{3EF2A282-33D4-DD78-6468-273082077242}"/>
+                  </a:ext>
+                </a:extLst>
+              </p:cNvPr>
+              <p:cNvSpPr>
+                <a:spLocks noChangeShapeType="1"/>
+              </p:cNvSpPr>
+              <p:nvPr/>
+            </p:nvSpPr>
+            <p:spPr bwMode="auto">
+              <a:xfrm>
+                <a:off x="797" y="2774"/>
+                <a:ext cx="0" cy="230"/>
+              </a:xfrm>
+              <a:prstGeom prst="line">
+                <a:avLst/>
+              </a:prstGeom>
+              <a:noFill/>
+              <a:ln w="9525">
+                <a:solidFill>
+                  <a:schemeClr val="tx1"/>
+                </a:solidFill>
+                <a:round/>
+                <a:headEnd/>
+                <a:tailEnd/>
+              </a:ln>
+            </p:spPr>
+            <p:txBody>
+              <a:bodyPr wrap="none" lIns="92075" tIns="46038" rIns="92075" bIns="46038" anchor="ctr"/>
+              <a:lstStyle/>
+              <a:p>
+                <a:endParaRPr lang="en-US"/>
+              </a:p>
+            </p:txBody>
+          </p:sp>
+          <p:sp>
+            <p:nvSpPr>
+              <p:cNvPr id="52" name="Line 11">
+                <a:extLst>
+                  <a:ext uri="{FF2B5EF4-FFF2-40B4-BE49-F238E27FC236}">
+                    <a16:creationId xmlns:a16="http://schemas.microsoft.com/office/drawing/2014/main" id="{21C819C5-2087-1AE1-AF4B-B9BA157056D3}"/>
+                  </a:ext>
+                </a:extLst>
+              </p:cNvPr>
+              <p:cNvSpPr>
+                <a:spLocks noChangeShapeType="1"/>
+              </p:cNvSpPr>
+              <p:nvPr/>
+            </p:nvSpPr>
+            <p:spPr bwMode="auto">
+              <a:xfrm>
+                <a:off x="1373" y="2774"/>
+                <a:ext cx="0" cy="230"/>
+              </a:xfrm>
+              <a:prstGeom prst="line">
+                <a:avLst/>
+              </a:prstGeom>
+              <a:noFill/>
+              <a:ln w="9525">
+                <a:solidFill>
+                  <a:schemeClr val="tx1"/>
+                </a:solidFill>
+                <a:round/>
+                <a:headEnd/>
+                <a:tailEnd/>
+              </a:ln>
+            </p:spPr>
+            <p:txBody>
+              <a:bodyPr wrap="none" lIns="92075" tIns="46038" rIns="92075" bIns="46038" anchor="ctr"/>
+              <a:lstStyle/>
+              <a:p>
+                <a:endParaRPr lang="en-US"/>
+              </a:p>
+            </p:txBody>
+          </p:sp>
+          <p:sp>
+            <p:nvSpPr>
+              <p:cNvPr id="53" name="Line 12">
+                <a:extLst>
+                  <a:ext uri="{FF2B5EF4-FFF2-40B4-BE49-F238E27FC236}">
+                    <a16:creationId xmlns:a16="http://schemas.microsoft.com/office/drawing/2014/main" id="{56D3064A-10AB-A431-64F6-97D3F372BFD8}"/>
+                  </a:ext>
+                </a:extLst>
+              </p:cNvPr>
+              <p:cNvSpPr>
+                <a:spLocks noChangeShapeType="1"/>
+              </p:cNvSpPr>
+              <p:nvPr/>
+            </p:nvSpPr>
+            <p:spPr bwMode="auto">
+              <a:xfrm>
+                <a:off x="624" y="2774"/>
+                <a:ext cx="173" cy="0"/>
+              </a:xfrm>
+              <a:prstGeom prst="line">
+                <a:avLst/>
+              </a:prstGeom>
+              <a:noFill/>
+              <a:ln w="9525">
+                <a:solidFill>
+                  <a:schemeClr val="tx1"/>
+                </a:solidFill>
+                <a:round/>
+                <a:headEnd/>
+                <a:tailEnd/>
+              </a:ln>
+            </p:spPr>
+            <p:txBody>
+              <a:bodyPr wrap="none" lIns="92075" tIns="46038" rIns="92075" bIns="46038" anchor="ctr"/>
+              <a:lstStyle/>
+              <a:p>
+                <a:endParaRPr lang="en-US"/>
+              </a:p>
+            </p:txBody>
+          </p:sp>
+          <p:sp>
+            <p:nvSpPr>
+              <p:cNvPr id="54" name="Line 13">
+                <a:extLst>
+                  <a:ext uri="{FF2B5EF4-FFF2-40B4-BE49-F238E27FC236}">
+                    <a16:creationId xmlns:a16="http://schemas.microsoft.com/office/drawing/2014/main" id="{F8F1F28D-48B1-FCE1-CCC4-6FF5D07B1FDA}"/>
+                  </a:ext>
+                </a:extLst>
+              </p:cNvPr>
+              <p:cNvSpPr>
+                <a:spLocks noChangeShapeType="1"/>
+              </p:cNvSpPr>
+              <p:nvPr/>
+            </p:nvSpPr>
+            <p:spPr bwMode="auto">
+              <a:xfrm>
+                <a:off x="1372" y="2774"/>
+                <a:ext cx="173" cy="0"/>
+              </a:xfrm>
+              <a:prstGeom prst="line">
+                <a:avLst/>
+              </a:prstGeom>
+              <a:noFill/>
+              <a:ln w="9525">
+                <a:solidFill>
+                  <a:schemeClr val="tx1"/>
+                </a:solidFill>
+                <a:round/>
+                <a:headEnd/>
+                <a:tailEnd/>
+              </a:ln>
+            </p:spPr>
+            <p:txBody>
+              <a:bodyPr wrap="none" lIns="92075" tIns="46038" rIns="92075" bIns="46038" anchor="ctr"/>
+              <a:lstStyle/>
+              <a:p>
+                <a:endParaRPr lang="en-US"/>
+              </a:p>
+            </p:txBody>
+          </p:sp>
+        </p:grpSp>
+        <p:sp>
+          <p:nvSpPr>
+            <p:cNvPr id="6" name="Text Box 14">
+              <a:extLst>
+                <a:ext uri="{FF2B5EF4-FFF2-40B4-BE49-F238E27FC236}">
+                  <a16:creationId xmlns:a16="http://schemas.microsoft.com/office/drawing/2014/main" id="{CBEACBFA-8E8F-4F05-5CBD-BB2A3AF02BEC}"/>
+                </a:ext>
+              </a:extLst>
+            </p:cNvPr>
+            <p:cNvSpPr txBox="1">
+              <a:spLocks noChangeArrowheads="1"/>
+            </p:cNvSpPr>
+            <p:nvPr/>
+          </p:nvSpPr>
+          <p:spPr bwMode="auto">
+            <a:xfrm>
+              <a:off x="2801261" y="1943827"/>
+              <a:ext cx="544513" cy="320675"/>
+            </a:xfrm>
+            <a:prstGeom prst="rect">
+              <a:avLst/>
+            </a:prstGeom>
+            <a:noFill/>
+            <a:ln w="9525">
+              <a:noFill/>
+              <a:miter lim="800000"/>
+              <a:headEnd/>
+              <a:tailEnd/>
+            </a:ln>
+          </p:spPr>
+          <p:txBody>
+            <a:bodyPr wrap="none" lIns="92075" tIns="46038" rIns="92075" bIns="46038">
+              <a:spAutoFit/>
+            </a:bodyPr>
+            <a:lstStyle/>
+            <a:p>
+              <a:r>
+                <a:rPr lang="en-US" sz="1500" dirty="0"/>
+                <a:t>C++</a:t>
+              </a:r>
+            </a:p>
+          </p:txBody>
+        </p:sp>
+        <p:sp>
+          <p:nvSpPr>
+            <p:cNvPr id="7" name="Text Box 15">
+              <a:extLst>
+                <a:ext uri="{FF2B5EF4-FFF2-40B4-BE49-F238E27FC236}">
+                  <a16:creationId xmlns:a16="http://schemas.microsoft.com/office/drawing/2014/main" id="{1F1E2100-FD3C-DCA4-D30F-D6241CCBD11E}"/>
+                </a:ext>
+              </a:extLst>
+            </p:cNvPr>
+            <p:cNvSpPr txBox="1">
+              <a:spLocks noChangeArrowheads="1"/>
+            </p:cNvSpPr>
+            <p:nvPr/>
+          </p:nvSpPr>
+          <p:spPr bwMode="auto">
+            <a:xfrm>
+              <a:off x="2574248" y="1583465"/>
+              <a:ext cx="995363" cy="320675"/>
+            </a:xfrm>
+            <a:prstGeom prst="rect">
+              <a:avLst/>
+            </a:prstGeom>
+            <a:noFill/>
+            <a:ln w="9525">
+              <a:noFill/>
+              <a:miter lim="800000"/>
+              <a:headEnd/>
+              <a:tailEnd/>
+            </a:ln>
+          </p:spPr>
+          <p:txBody>
+            <a:bodyPr wrap="none" lIns="92075" tIns="46038" rIns="92075" bIns="46038">
+              <a:spAutoFit/>
+            </a:bodyPr>
+            <a:lstStyle/>
+            <a:p>
+              <a:r>
+                <a:rPr lang="en-US" sz="1500" dirty="0"/>
+                <a:t>C++ </a:t>
+              </a:r>
+              <a:r>
+                <a:rPr lang="en-US" sz="1500" dirty="0">
+                  <a:sym typeface="Symbol" pitchFamily="18" charset="2"/>
+                </a:rPr>
+                <a:t> M</a:t>
+              </a:r>
+            </a:p>
+          </p:txBody>
+        </p:sp>
+        <p:grpSp>
+          <p:nvGrpSpPr>
+            <p:cNvPr id="8" name="Group 16">
+              <a:extLst>
+                <a:ext uri="{FF2B5EF4-FFF2-40B4-BE49-F238E27FC236}">
+                  <a16:creationId xmlns:a16="http://schemas.microsoft.com/office/drawing/2014/main" id="{9AA7F68C-EEB2-BC93-45DD-8C00C76E6C84}"/>
+                </a:ext>
+              </a:extLst>
+            </p:cNvPr>
+            <p:cNvGrpSpPr>
+              <a:grpSpLocks/>
+            </p:cNvGrpSpPr>
+            <p:nvPr/>
+          </p:nvGrpSpPr>
+          <p:grpSpPr bwMode="auto">
+            <a:xfrm>
+              <a:off x="3529923" y="1927952"/>
               <a:ext cx="1462088" cy="730250"/>
               <a:chOff x="624" y="2544"/>
               <a:chExt cx="921" cy="460"/>
@@ -31672,7 +32233,13 @@
           </p:grpSpPr>
           <p:grpSp>
             <p:nvGrpSpPr>
-              <p:cNvPr id="33833" name="Group 5"/>
+              <p:cNvPr id="36" name="Group 17">
+                <a:extLst>
+                  <a:ext uri="{FF2B5EF4-FFF2-40B4-BE49-F238E27FC236}">
+                    <a16:creationId xmlns:a16="http://schemas.microsoft.com/office/drawing/2014/main" id="{493C07F0-CBA0-DEDD-8587-E4DC39133FEE}"/>
+                  </a:ext>
+                </a:extLst>
+              </p:cNvPr>
               <p:cNvGrpSpPr>
                 <a:grpSpLocks/>
               </p:cNvGrpSpPr>
@@ -31688,7 +32255,13 @@
             </p:grpSpPr>
             <p:sp>
               <p:nvSpPr>
-                <p:cNvPr id="33836" name="Line 6"/>
+                <p:cNvPr id="39" name="Line 18">
+                  <a:extLst>
+                    <a:ext uri="{FF2B5EF4-FFF2-40B4-BE49-F238E27FC236}">
+                      <a16:creationId xmlns:a16="http://schemas.microsoft.com/office/drawing/2014/main" id="{7F3144FE-199F-00F1-EE2A-08AE51E51E1B}"/>
+                    </a:ext>
+                  </a:extLst>
+                </p:cNvPr>
                 <p:cNvSpPr>
                   <a:spLocks noChangeShapeType="1"/>
                 </p:cNvSpPr>
@@ -31722,7 +32295,13 @@
             </p:sp>
             <p:sp>
               <p:nvSpPr>
-                <p:cNvPr id="33837" name="Line 7"/>
+                <p:cNvPr id="40" name="Line 19">
+                  <a:extLst>
+                    <a:ext uri="{FF2B5EF4-FFF2-40B4-BE49-F238E27FC236}">
+                      <a16:creationId xmlns:a16="http://schemas.microsoft.com/office/drawing/2014/main" id="{A5BB400D-39AF-81CD-A4BC-AC5DA87D10FB}"/>
+                    </a:ext>
+                  </a:extLst>
+                </p:cNvPr>
                 <p:cNvSpPr>
                   <a:spLocks noChangeShapeType="1"/>
                 </p:cNvSpPr>
@@ -31756,7 +32335,13 @@
             </p:sp>
             <p:sp>
               <p:nvSpPr>
-                <p:cNvPr id="33838" name="Line 8"/>
+                <p:cNvPr id="41" name="Line 20">
+                  <a:extLst>
+                    <a:ext uri="{FF2B5EF4-FFF2-40B4-BE49-F238E27FC236}">
+                      <a16:creationId xmlns:a16="http://schemas.microsoft.com/office/drawing/2014/main" id="{88C6D2D5-3CBD-E0A9-2C79-39CD38C3DFB1}"/>
+                    </a:ext>
+                  </a:extLst>
+                </p:cNvPr>
                 <p:cNvSpPr>
                   <a:spLocks noChangeShapeType="1"/>
                 </p:cNvSpPr>
@@ -31790,7 +32375,13 @@
             </p:sp>
             <p:sp>
               <p:nvSpPr>
-                <p:cNvPr id="33839" name="Line 9"/>
+                <p:cNvPr id="42" name="Line 21">
+                  <a:extLst>
+                    <a:ext uri="{FF2B5EF4-FFF2-40B4-BE49-F238E27FC236}">
+                      <a16:creationId xmlns:a16="http://schemas.microsoft.com/office/drawing/2014/main" id="{CBE5ABB9-1FD7-877F-7CEF-7FAD21EF4436}"/>
+                    </a:ext>
+                  </a:extLst>
+                </p:cNvPr>
                 <p:cNvSpPr>
                   <a:spLocks noChangeShapeType="1"/>
                 </p:cNvSpPr>
@@ -31824,7 +32415,13 @@
             </p:sp>
             <p:sp>
               <p:nvSpPr>
-                <p:cNvPr id="33840" name="Line 10"/>
+                <p:cNvPr id="43" name="Line 22">
+                  <a:extLst>
+                    <a:ext uri="{FF2B5EF4-FFF2-40B4-BE49-F238E27FC236}">
+                      <a16:creationId xmlns:a16="http://schemas.microsoft.com/office/drawing/2014/main" id="{56A038B7-5AE6-01FE-57E7-0422A1769E9B}"/>
+                    </a:ext>
+                  </a:extLst>
+                </p:cNvPr>
                 <p:cNvSpPr>
                   <a:spLocks noChangeShapeType="1"/>
                 </p:cNvSpPr>
@@ -31858,7 +32455,13 @@
             </p:sp>
             <p:sp>
               <p:nvSpPr>
-                <p:cNvPr id="33841" name="Line 11"/>
+                <p:cNvPr id="44" name="Line 23">
+                  <a:extLst>
+                    <a:ext uri="{FF2B5EF4-FFF2-40B4-BE49-F238E27FC236}">
+                      <a16:creationId xmlns:a16="http://schemas.microsoft.com/office/drawing/2014/main" id="{C9D7295E-B292-09C2-5A6B-8DF05333C87F}"/>
+                    </a:ext>
+                  </a:extLst>
+                </p:cNvPr>
                 <p:cNvSpPr>
                   <a:spLocks noChangeShapeType="1"/>
                 </p:cNvSpPr>
@@ -31892,7 +32495,13 @@
             </p:sp>
             <p:sp>
               <p:nvSpPr>
-                <p:cNvPr id="33842" name="Line 12"/>
+                <p:cNvPr id="45" name="Line 24">
+                  <a:extLst>
+                    <a:ext uri="{FF2B5EF4-FFF2-40B4-BE49-F238E27FC236}">
+                      <a16:creationId xmlns:a16="http://schemas.microsoft.com/office/drawing/2014/main" id="{6FDDE1C4-A5AE-EBAB-7D60-80B8A99DC7FB}"/>
+                    </a:ext>
+                  </a:extLst>
+                </p:cNvPr>
                 <p:cNvSpPr>
                   <a:spLocks noChangeShapeType="1"/>
                 </p:cNvSpPr>
@@ -31926,7 +32535,13 @@
             </p:sp>
             <p:sp>
               <p:nvSpPr>
-                <p:cNvPr id="33843" name="Line 13"/>
+                <p:cNvPr id="46" name="Line 25">
+                  <a:extLst>
+                    <a:ext uri="{FF2B5EF4-FFF2-40B4-BE49-F238E27FC236}">
+                      <a16:creationId xmlns:a16="http://schemas.microsoft.com/office/drawing/2014/main" id="{8298C621-8563-79D3-833F-1AC8FC46BACE}"/>
+                    </a:ext>
+                  </a:extLst>
+                </p:cNvPr>
                 <p:cNvSpPr>
                   <a:spLocks noChangeShapeType="1"/>
                 </p:cNvSpPr>
@@ -31961,393 +32576,13 @@
           </p:grpSp>
           <p:sp>
             <p:nvSpPr>
-              <p:cNvPr id="33834" name="Text Box 14"/>
-              <p:cNvSpPr txBox="1">
-                <a:spLocks noChangeArrowheads="1"/>
-              </p:cNvSpPr>
-              <p:nvPr/>
-            </p:nvSpPr>
-            <p:spPr bwMode="auto">
-              <a:xfrm>
-                <a:off x="913" y="2784"/>
-                <a:ext cx="343" cy="202"/>
-              </a:xfrm>
-              <a:prstGeom prst="rect">
-                <a:avLst/>
-              </a:prstGeom>
-              <a:noFill/>
-              <a:ln w="9525">
-                <a:noFill/>
-                <a:miter lim="800000"/>
-                <a:headEnd/>
-                <a:tailEnd/>
-              </a:ln>
-            </p:spPr>
-            <p:txBody>
-              <a:bodyPr wrap="none" lIns="92075" tIns="46038" rIns="92075" bIns="46038">
-                <a:spAutoFit/>
-              </a:bodyPr>
-              <a:lstStyle/>
-              <a:p>
-                <a:r>
-                  <a:rPr lang="en-US" sz="1500"/>
-                  <a:t>C++</a:t>
-                </a:r>
-              </a:p>
-            </p:txBody>
-          </p:sp>
-          <p:sp>
-            <p:nvSpPr>
-              <p:cNvPr id="33835" name="Text Box 15"/>
-              <p:cNvSpPr txBox="1">
-                <a:spLocks noChangeArrowheads="1"/>
-              </p:cNvSpPr>
-              <p:nvPr/>
-            </p:nvSpPr>
-            <p:spPr bwMode="auto">
-              <a:xfrm>
-                <a:off x="770" y="2557"/>
-                <a:ext cx="627" cy="202"/>
-              </a:xfrm>
-              <a:prstGeom prst="rect">
-                <a:avLst/>
-              </a:prstGeom>
-              <a:noFill/>
-              <a:ln w="9525">
-                <a:noFill/>
-                <a:miter lim="800000"/>
-                <a:headEnd/>
-                <a:tailEnd/>
-              </a:ln>
-            </p:spPr>
-            <p:txBody>
-              <a:bodyPr wrap="none" lIns="92075" tIns="46038" rIns="92075" bIns="46038">
-                <a:spAutoFit/>
-              </a:bodyPr>
-              <a:lstStyle/>
-              <a:p>
-                <a:r>
-                  <a:rPr lang="en-US" sz="1500" dirty="0"/>
-                  <a:t>C++ </a:t>
-                </a:r>
-                <a:r>
-                  <a:rPr lang="en-US" sz="1500" dirty="0">
-                    <a:sym typeface="Symbol" pitchFamily="18" charset="2"/>
-                  </a:rPr>
-                  <a:t> M</a:t>
-                </a:r>
-              </a:p>
-            </p:txBody>
-          </p:sp>
-        </p:grpSp>
-        <p:grpSp>
-          <p:nvGrpSpPr>
-            <p:cNvPr id="33799" name="Group 16"/>
-            <p:cNvGrpSpPr>
-              <a:grpSpLocks/>
-            </p:cNvGrpSpPr>
-            <p:nvPr/>
-          </p:nvGrpSpPr>
-          <p:grpSpPr bwMode="auto">
-            <a:xfrm>
-              <a:off x="3514400" y="4080263"/>
-              <a:ext cx="1462088" cy="730250"/>
-              <a:chOff x="624" y="2544"/>
-              <a:chExt cx="921" cy="460"/>
-            </a:xfrm>
-          </p:grpSpPr>
-          <p:grpSp>
-            <p:nvGrpSpPr>
-              <p:cNvPr id="33822" name="Group 17"/>
-              <p:cNvGrpSpPr>
-                <a:grpSpLocks/>
-              </p:cNvGrpSpPr>
-              <p:nvPr/>
-            </p:nvGrpSpPr>
-            <p:grpSpPr bwMode="auto">
-              <a:xfrm>
-                <a:off x="624" y="2544"/>
-                <a:ext cx="921" cy="460"/>
-                <a:chOff x="624" y="2544"/>
-                <a:chExt cx="921" cy="460"/>
-              </a:xfrm>
-            </p:grpSpPr>
-            <p:sp>
-              <p:nvSpPr>
-                <p:cNvPr id="33825" name="Line 18"/>
-                <p:cNvSpPr>
-                  <a:spLocks noChangeShapeType="1"/>
-                </p:cNvSpPr>
-                <p:nvPr/>
-              </p:nvSpPr>
-              <p:spPr bwMode="auto">
-                <a:xfrm>
-                  <a:off x="624" y="2544"/>
-                  <a:ext cx="921" cy="0"/>
-                </a:xfrm>
-                <a:prstGeom prst="line">
-                  <a:avLst/>
-                </a:prstGeom>
-                <a:noFill/>
-                <a:ln w="9525">
-                  <a:solidFill>
-                    <a:schemeClr val="tx1"/>
-                  </a:solidFill>
-                  <a:round/>
-                  <a:headEnd/>
-                  <a:tailEnd/>
-                </a:ln>
-              </p:spPr>
-              <p:txBody>
-                <a:bodyPr wrap="none" lIns="92075" tIns="46038" rIns="92075" bIns="46038" anchor="ctr"/>
-                <a:lstStyle/>
-                <a:p>
-                  <a:endParaRPr lang="en-US"/>
-                </a:p>
-              </p:txBody>
-            </p:sp>
-            <p:sp>
-              <p:nvSpPr>
-                <p:cNvPr id="33826" name="Line 19"/>
-                <p:cNvSpPr>
-                  <a:spLocks noChangeShapeType="1"/>
-                </p:cNvSpPr>
-                <p:nvPr/>
-              </p:nvSpPr>
-              <p:spPr bwMode="auto">
-                <a:xfrm>
-                  <a:off x="797" y="3004"/>
-                  <a:ext cx="576" cy="0"/>
-                </a:xfrm>
-                <a:prstGeom prst="line">
-                  <a:avLst/>
-                </a:prstGeom>
-                <a:noFill/>
-                <a:ln w="9525">
-                  <a:solidFill>
-                    <a:schemeClr val="tx1"/>
-                  </a:solidFill>
-                  <a:round/>
-                  <a:headEnd/>
-                  <a:tailEnd/>
-                </a:ln>
-              </p:spPr>
-              <p:txBody>
-                <a:bodyPr wrap="none" lIns="92075" tIns="46038" rIns="92075" bIns="46038" anchor="ctr"/>
-                <a:lstStyle/>
-                <a:p>
-                  <a:endParaRPr lang="en-US"/>
-                </a:p>
-              </p:txBody>
-            </p:sp>
-            <p:sp>
-              <p:nvSpPr>
-                <p:cNvPr id="33827" name="Line 20"/>
-                <p:cNvSpPr>
-                  <a:spLocks noChangeShapeType="1"/>
-                </p:cNvSpPr>
-                <p:nvPr/>
-              </p:nvSpPr>
-              <p:spPr bwMode="auto">
-                <a:xfrm>
-                  <a:off x="625" y="2544"/>
-                  <a:ext cx="0" cy="230"/>
-                </a:xfrm>
-                <a:prstGeom prst="line">
-                  <a:avLst/>
-                </a:prstGeom>
-                <a:noFill/>
-                <a:ln w="9525">
-                  <a:solidFill>
-                    <a:schemeClr val="tx1"/>
-                  </a:solidFill>
-                  <a:round/>
-                  <a:headEnd/>
-                  <a:tailEnd/>
-                </a:ln>
-              </p:spPr>
-              <p:txBody>
-                <a:bodyPr wrap="none" lIns="92075" tIns="46038" rIns="92075" bIns="46038" anchor="ctr"/>
-                <a:lstStyle/>
-                <a:p>
-                  <a:endParaRPr lang="en-US"/>
-                </a:p>
-              </p:txBody>
-            </p:sp>
-            <p:sp>
-              <p:nvSpPr>
-                <p:cNvPr id="33828" name="Line 21"/>
-                <p:cNvSpPr>
-                  <a:spLocks noChangeShapeType="1"/>
-                </p:cNvSpPr>
-                <p:nvPr/>
-              </p:nvSpPr>
-              <p:spPr bwMode="auto">
-                <a:xfrm>
-                  <a:off x="1545" y="2544"/>
-                  <a:ext cx="0" cy="230"/>
-                </a:xfrm>
-                <a:prstGeom prst="line">
-                  <a:avLst/>
-                </a:prstGeom>
-                <a:noFill/>
-                <a:ln w="9525">
-                  <a:solidFill>
-                    <a:schemeClr val="tx1"/>
-                  </a:solidFill>
-                  <a:round/>
-                  <a:headEnd/>
-                  <a:tailEnd/>
-                </a:ln>
-              </p:spPr>
-              <p:txBody>
-                <a:bodyPr wrap="none" lIns="92075" tIns="46038" rIns="92075" bIns="46038" anchor="ctr"/>
-                <a:lstStyle/>
-                <a:p>
-                  <a:endParaRPr lang="en-US"/>
-                </a:p>
-              </p:txBody>
-            </p:sp>
-            <p:sp>
-              <p:nvSpPr>
-                <p:cNvPr id="33829" name="Line 22"/>
-                <p:cNvSpPr>
-                  <a:spLocks noChangeShapeType="1"/>
-                </p:cNvSpPr>
-                <p:nvPr/>
-              </p:nvSpPr>
-              <p:spPr bwMode="auto">
-                <a:xfrm>
-                  <a:off x="797" y="2774"/>
-                  <a:ext cx="0" cy="230"/>
-                </a:xfrm>
-                <a:prstGeom prst="line">
-                  <a:avLst/>
-                </a:prstGeom>
-                <a:noFill/>
-                <a:ln w="9525">
-                  <a:solidFill>
-                    <a:schemeClr val="tx1"/>
-                  </a:solidFill>
-                  <a:round/>
-                  <a:headEnd/>
-                  <a:tailEnd/>
-                </a:ln>
-              </p:spPr>
-              <p:txBody>
-                <a:bodyPr wrap="none" lIns="92075" tIns="46038" rIns="92075" bIns="46038" anchor="ctr"/>
-                <a:lstStyle/>
-                <a:p>
-                  <a:endParaRPr lang="en-US"/>
-                </a:p>
-              </p:txBody>
-            </p:sp>
-            <p:sp>
-              <p:nvSpPr>
-                <p:cNvPr id="33830" name="Line 23"/>
-                <p:cNvSpPr>
-                  <a:spLocks noChangeShapeType="1"/>
-                </p:cNvSpPr>
-                <p:nvPr/>
-              </p:nvSpPr>
-              <p:spPr bwMode="auto">
-                <a:xfrm>
-                  <a:off x="1373" y="2774"/>
-                  <a:ext cx="0" cy="230"/>
-                </a:xfrm>
-                <a:prstGeom prst="line">
-                  <a:avLst/>
-                </a:prstGeom>
-                <a:noFill/>
-                <a:ln w="9525">
-                  <a:solidFill>
-                    <a:schemeClr val="tx1"/>
-                  </a:solidFill>
-                  <a:round/>
-                  <a:headEnd/>
-                  <a:tailEnd/>
-                </a:ln>
-              </p:spPr>
-              <p:txBody>
-                <a:bodyPr wrap="none" lIns="92075" tIns="46038" rIns="92075" bIns="46038" anchor="ctr"/>
-                <a:lstStyle/>
-                <a:p>
-                  <a:endParaRPr lang="en-US"/>
-                </a:p>
-              </p:txBody>
-            </p:sp>
-            <p:sp>
-              <p:nvSpPr>
-                <p:cNvPr id="33831" name="Line 24"/>
-                <p:cNvSpPr>
-                  <a:spLocks noChangeShapeType="1"/>
-                </p:cNvSpPr>
-                <p:nvPr/>
-              </p:nvSpPr>
-              <p:spPr bwMode="auto">
-                <a:xfrm>
-                  <a:off x="624" y="2774"/>
-                  <a:ext cx="173" cy="0"/>
-                </a:xfrm>
-                <a:prstGeom prst="line">
-                  <a:avLst/>
-                </a:prstGeom>
-                <a:noFill/>
-                <a:ln w="9525">
-                  <a:solidFill>
-                    <a:schemeClr val="tx1"/>
-                  </a:solidFill>
-                  <a:round/>
-                  <a:headEnd/>
-                  <a:tailEnd/>
-                </a:ln>
-              </p:spPr>
-              <p:txBody>
-                <a:bodyPr wrap="none" lIns="92075" tIns="46038" rIns="92075" bIns="46038" anchor="ctr"/>
-                <a:lstStyle/>
-                <a:p>
-                  <a:endParaRPr lang="en-US"/>
-                </a:p>
-              </p:txBody>
-            </p:sp>
-            <p:sp>
-              <p:nvSpPr>
-                <p:cNvPr id="33832" name="Line 25"/>
-                <p:cNvSpPr>
-                  <a:spLocks noChangeShapeType="1"/>
-                </p:cNvSpPr>
-                <p:nvPr/>
-              </p:nvSpPr>
-              <p:spPr bwMode="auto">
-                <a:xfrm>
-                  <a:off x="1372" y="2774"/>
-                  <a:ext cx="173" cy="0"/>
-                </a:xfrm>
-                <a:prstGeom prst="line">
-                  <a:avLst/>
-                </a:prstGeom>
-                <a:noFill/>
-                <a:ln w="9525">
-                  <a:solidFill>
-                    <a:schemeClr val="tx1"/>
-                  </a:solidFill>
-                  <a:round/>
-                  <a:headEnd/>
-                  <a:tailEnd/>
-                </a:ln>
-              </p:spPr>
-              <p:txBody>
-                <a:bodyPr wrap="none" lIns="92075" tIns="46038" rIns="92075" bIns="46038" anchor="ctr"/>
-                <a:lstStyle/>
-                <a:p>
-                  <a:endParaRPr lang="en-US"/>
-                </a:p>
-              </p:txBody>
-            </p:sp>
-          </p:grpSp>
-          <p:sp>
-            <p:nvSpPr>
-              <p:cNvPr id="33823" name="Text Box 26"/>
+              <p:cNvPr id="37" name="Text Box 26">
+                <a:extLst>
+                  <a:ext uri="{FF2B5EF4-FFF2-40B4-BE49-F238E27FC236}">
+                    <a16:creationId xmlns:a16="http://schemas.microsoft.com/office/drawing/2014/main" id="{E04FD1B4-64F5-8909-EF9B-054C7D98450D}"/>
+                  </a:ext>
+                </a:extLst>
+              </p:cNvPr>
               <p:cNvSpPr txBox="1">
                 <a:spLocks noChangeArrowheads="1"/>
               </p:cNvSpPr>
@@ -32384,7 +32619,13 @@
           </p:sp>
           <p:sp>
             <p:nvSpPr>
-              <p:cNvPr id="33824" name="Text Box 27"/>
+              <p:cNvPr id="38" name="Text Box 27">
+                <a:extLst>
+                  <a:ext uri="{FF2B5EF4-FFF2-40B4-BE49-F238E27FC236}">
+                    <a16:creationId xmlns:a16="http://schemas.microsoft.com/office/drawing/2014/main" id="{F95B8B45-2C58-4B53-EE17-2FBBF191DDF0}"/>
+                  </a:ext>
+                </a:extLst>
+              </p:cNvPr>
               <p:cNvSpPr txBox="1">
                 <a:spLocks noChangeArrowheads="1"/>
               </p:cNvSpPr>
@@ -32428,7 +32669,13 @@
         </p:grpSp>
         <p:grpSp>
           <p:nvGrpSpPr>
-            <p:cNvPr id="33800" name="Group 28"/>
+            <p:cNvPr id="9" name="Group 29">
+              <a:extLst>
+                <a:ext uri="{FF2B5EF4-FFF2-40B4-BE49-F238E27FC236}">
+                  <a16:creationId xmlns:a16="http://schemas.microsoft.com/office/drawing/2014/main" id="{08D62426-AA53-E15E-0201-4F264E5AEA09}"/>
+                </a:ext>
+              </a:extLst>
+            </p:cNvPr>
             <p:cNvGrpSpPr>
               <a:grpSpLocks/>
             </p:cNvGrpSpPr>
@@ -32436,7 +32683,1676 @@
           </p:nvGrpSpPr>
           <p:grpSpPr bwMode="auto">
             <a:xfrm>
-              <a:off x="4701850" y="3715138"/>
+              <a:off x="4717373" y="1562827"/>
+              <a:ext cx="1462088" cy="730250"/>
+              <a:chOff x="624" y="2544"/>
+              <a:chExt cx="921" cy="460"/>
+            </a:xfrm>
+          </p:grpSpPr>
+          <p:sp>
+            <p:nvSpPr>
+              <p:cNvPr id="28" name="Line 30">
+                <a:extLst>
+                  <a:ext uri="{FF2B5EF4-FFF2-40B4-BE49-F238E27FC236}">
+                    <a16:creationId xmlns:a16="http://schemas.microsoft.com/office/drawing/2014/main" id="{184D80A6-0011-DBE0-E281-39F1059305FC}"/>
+                  </a:ext>
+                </a:extLst>
+              </p:cNvPr>
+              <p:cNvSpPr>
+                <a:spLocks noChangeShapeType="1"/>
+              </p:cNvSpPr>
+              <p:nvPr/>
+            </p:nvSpPr>
+            <p:spPr bwMode="auto">
+              <a:xfrm>
+                <a:off x="624" y="2544"/>
+                <a:ext cx="921" cy="0"/>
+              </a:xfrm>
+              <a:prstGeom prst="line">
+                <a:avLst/>
+              </a:prstGeom>
+              <a:noFill/>
+              <a:ln w="9525">
+                <a:solidFill>
+                  <a:schemeClr val="tx1"/>
+                </a:solidFill>
+                <a:round/>
+                <a:headEnd/>
+                <a:tailEnd/>
+              </a:ln>
+            </p:spPr>
+            <p:txBody>
+              <a:bodyPr wrap="none" lIns="92075" tIns="46038" rIns="92075" bIns="46038" anchor="ctr"/>
+              <a:lstStyle/>
+              <a:p>
+                <a:endParaRPr lang="en-US"/>
+              </a:p>
+            </p:txBody>
+          </p:sp>
+          <p:sp>
+            <p:nvSpPr>
+              <p:cNvPr id="29" name="Line 31">
+                <a:extLst>
+                  <a:ext uri="{FF2B5EF4-FFF2-40B4-BE49-F238E27FC236}">
+                    <a16:creationId xmlns:a16="http://schemas.microsoft.com/office/drawing/2014/main" id="{A7DE68D3-B035-9AE0-15A8-1099AB6ED9B5}"/>
+                  </a:ext>
+                </a:extLst>
+              </p:cNvPr>
+              <p:cNvSpPr>
+                <a:spLocks noChangeShapeType="1"/>
+              </p:cNvSpPr>
+              <p:nvPr/>
+            </p:nvSpPr>
+            <p:spPr bwMode="auto">
+              <a:xfrm>
+                <a:off x="797" y="3004"/>
+                <a:ext cx="576" cy="0"/>
+              </a:xfrm>
+              <a:prstGeom prst="line">
+                <a:avLst/>
+              </a:prstGeom>
+              <a:noFill/>
+              <a:ln w="9525">
+                <a:solidFill>
+                  <a:schemeClr val="tx1"/>
+                </a:solidFill>
+                <a:round/>
+                <a:headEnd/>
+                <a:tailEnd/>
+              </a:ln>
+            </p:spPr>
+            <p:txBody>
+              <a:bodyPr wrap="none" lIns="92075" tIns="46038" rIns="92075" bIns="46038" anchor="ctr"/>
+              <a:lstStyle/>
+              <a:p>
+                <a:endParaRPr lang="en-US"/>
+              </a:p>
+            </p:txBody>
+          </p:sp>
+          <p:sp>
+            <p:nvSpPr>
+              <p:cNvPr id="30" name="Line 32">
+                <a:extLst>
+                  <a:ext uri="{FF2B5EF4-FFF2-40B4-BE49-F238E27FC236}">
+                    <a16:creationId xmlns:a16="http://schemas.microsoft.com/office/drawing/2014/main" id="{4CE41DA0-D6FA-09FD-5A3B-A3AB7EDC5064}"/>
+                  </a:ext>
+                </a:extLst>
+              </p:cNvPr>
+              <p:cNvSpPr>
+                <a:spLocks noChangeShapeType="1"/>
+              </p:cNvSpPr>
+              <p:nvPr/>
+            </p:nvSpPr>
+            <p:spPr bwMode="auto">
+              <a:xfrm>
+                <a:off x="625" y="2544"/>
+                <a:ext cx="0" cy="230"/>
+              </a:xfrm>
+              <a:prstGeom prst="line">
+                <a:avLst/>
+              </a:prstGeom>
+              <a:noFill/>
+              <a:ln w="9525">
+                <a:solidFill>
+                  <a:schemeClr val="tx1"/>
+                </a:solidFill>
+                <a:round/>
+                <a:headEnd/>
+                <a:tailEnd/>
+              </a:ln>
+            </p:spPr>
+            <p:txBody>
+              <a:bodyPr wrap="none" lIns="92075" tIns="46038" rIns="92075" bIns="46038" anchor="ctr"/>
+              <a:lstStyle/>
+              <a:p>
+                <a:endParaRPr lang="en-US"/>
+              </a:p>
+            </p:txBody>
+          </p:sp>
+          <p:sp>
+            <p:nvSpPr>
+              <p:cNvPr id="31" name="Line 33">
+                <a:extLst>
+                  <a:ext uri="{FF2B5EF4-FFF2-40B4-BE49-F238E27FC236}">
+                    <a16:creationId xmlns:a16="http://schemas.microsoft.com/office/drawing/2014/main" id="{AA9E430A-3731-3AD7-E765-F9B830DF2CAC}"/>
+                  </a:ext>
+                </a:extLst>
+              </p:cNvPr>
+              <p:cNvSpPr>
+                <a:spLocks noChangeShapeType="1"/>
+              </p:cNvSpPr>
+              <p:nvPr/>
+            </p:nvSpPr>
+            <p:spPr bwMode="auto">
+              <a:xfrm>
+                <a:off x="1545" y="2544"/>
+                <a:ext cx="0" cy="230"/>
+              </a:xfrm>
+              <a:prstGeom prst="line">
+                <a:avLst/>
+              </a:prstGeom>
+              <a:noFill/>
+              <a:ln w="9525">
+                <a:solidFill>
+                  <a:schemeClr val="tx1"/>
+                </a:solidFill>
+                <a:round/>
+                <a:headEnd/>
+                <a:tailEnd/>
+              </a:ln>
+            </p:spPr>
+            <p:txBody>
+              <a:bodyPr wrap="none" lIns="92075" tIns="46038" rIns="92075" bIns="46038" anchor="ctr"/>
+              <a:lstStyle/>
+              <a:p>
+                <a:endParaRPr lang="en-US"/>
+              </a:p>
+            </p:txBody>
+          </p:sp>
+          <p:sp>
+            <p:nvSpPr>
+              <p:cNvPr id="32" name="Line 34">
+                <a:extLst>
+                  <a:ext uri="{FF2B5EF4-FFF2-40B4-BE49-F238E27FC236}">
+                    <a16:creationId xmlns:a16="http://schemas.microsoft.com/office/drawing/2014/main" id="{2CAED2E2-E631-3323-6DBD-678B835AF319}"/>
+                  </a:ext>
+                </a:extLst>
+              </p:cNvPr>
+              <p:cNvSpPr>
+                <a:spLocks noChangeShapeType="1"/>
+              </p:cNvSpPr>
+              <p:nvPr/>
+            </p:nvSpPr>
+            <p:spPr bwMode="auto">
+              <a:xfrm>
+                <a:off x="797" y="2774"/>
+                <a:ext cx="0" cy="230"/>
+              </a:xfrm>
+              <a:prstGeom prst="line">
+                <a:avLst/>
+              </a:prstGeom>
+              <a:noFill/>
+              <a:ln w="9525">
+                <a:solidFill>
+                  <a:schemeClr val="tx1"/>
+                </a:solidFill>
+                <a:round/>
+                <a:headEnd/>
+                <a:tailEnd/>
+              </a:ln>
+            </p:spPr>
+            <p:txBody>
+              <a:bodyPr wrap="none" lIns="92075" tIns="46038" rIns="92075" bIns="46038" anchor="ctr"/>
+              <a:lstStyle/>
+              <a:p>
+                <a:endParaRPr lang="en-US"/>
+              </a:p>
+            </p:txBody>
+          </p:sp>
+          <p:sp>
+            <p:nvSpPr>
+              <p:cNvPr id="33" name="Line 35">
+                <a:extLst>
+                  <a:ext uri="{FF2B5EF4-FFF2-40B4-BE49-F238E27FC236}">
+                    <a16:creationId xmlns:a16="http://schemas.microsoft.com/office/drawing/2014/main" id="{77929AB3-7596-2A08-E73B-A22DA0C17BAB}"/>
+                  </a:ext>
+                </a:extLst>
+              </p:cNvPr>
+              <p:cNvSpPr>
+                <a:spLocks noChangeShapeType="1"/>
+              </p:cNvSpPr>
+              <p:nvPr/>
+            </p:nvSpPr>
+            <p:spPr bwMode="auto">
+              <a:xfrm>
+                <a:off x="1373" y="2774"/>
+                <a:ext cx="0" cy="230"/>
+              </a:xfrm>
+              <a:prstGeom prst="line">
+                <a:avLst/>
+              </a:prstGeom>
+              <a:noFill/>
+              <a:ln w="9525">
+                <a:solidFill>
+                  <a:schemeClr val="tx1"/>
+                </a:solidFill>
+                <a:round/>
+                <a:headEnd/>
+                <a:tailEnd/>
+              </a:ln>
+            </p:spPr>
+            <p:txBody>
+              <a:bodyPr wrap="none" lIns="92075" tIns="46038" rIns="92075" bIns="46038" anchor="ctr"/>
+              <a:lstStyle/>
+              <a:p>
+                <a:endParaRPr lang="en-US"/>
+              </a:p>
+            </p:txBody>
+          </p:sp>
+          <p:sp>
+            <p:nvSpPr>
+              <p:cNvPr id="34" name="Line 36">
+                <a:extLst>
+                  <a:ext uri="{FF2B5EF4-FFF2-40B4-BE49-F238E27FC236}">
+                    <a16:creationId xmlns:a16="http://schemas.microsoft.com/office/drawing/2014/main" id="{3DA2A665-5F7B-129E-E0C9-9804B9EDDF58}"/>
+                  </a:ext>
+                </a:extLst>
+              </p:cNvPr>
+              <p:cNvSpPr>
+                <a:spLocks noChangeShapeType="1"/>
+              </p:cNvSpPr>
+              <p:nvPr/>
+            </p:nvSpPr>
+            <p:spPr bwMode="auto">
+              <a:xfrm>
+                <a:off x="624" y="2774"/>
+                <a:ext cx="173" cy="0"/>
+              </a:xfrm>
+              <a:prstGeom prst="line">
+                <a:avLst/>
+              </a:prstGeom>
+              <a:noFill/>
+              <a:ln w="9525">
+                <a:solidFill>
+                  <a:schemeClr val="tx1"/>
+                </a:solidFill>
+                <a:round/>
+                <a:headEnd/>
+                <a:tailEnd/>
+              </a:ln>
+            </p:spPr>
+            <p:txBody>
+              <a:bodyPr wrap="none" lIns="92075" tIns="46038" rIns="92075" bIns="46038" anchor="ctr"/>
+              <a:lstStyle/>
+              <a:p>
+                <a:endParaRPr lang="en-US"/>
+              </a:p>
+            </p:txBody>
+          </p:sp>
+          <p:sp>
+            <p:nvSpPr>
+              <p:cNvPr id="35" name="Line 37">
+                <a:extLst>
+                  <a:ext uri="{FF2B5EF4-FFF2-40B4-BE49-F238E27FC236}">
+                    <a16:creationId xmlns:a16="http://schemas.microsoft.com/office/drawing/2014/main" id="{62189AFB-CE79-87D7-CA1A-91F7F3AE2972}"/>
+                  </a:ext>
+                </a:extLst>
+              </p:cNvPr>
+              <p:cNvSpPr>
+                <a:spLocks noChangeShapeType="1"/>
+              </p:cNvSpPr>
+              <p:nvPr/>
+            </p:nvSpPr>
+            <p:spPr bwMode="auto">
+              <a:xfrm>
+                <a:off x="1372" y="2774"/>
+                <a:ext cx="173" cy="0"/>
+              </a:xfrm>
+              <a:prstGeom prst="line">
+                <a:avLst/>
+              </a:prstGeom>
+              <a:noFill/>
+              <a:ln w="9525">
+                <a:solidFill>
+                  <a:schemeClr val="tx1"/>
+                </a:solidFill>
+                <a:round/>
+                <a:headEnd/>
+                <a:tailEnd/>
+              </a:ln>
+            </p:spPr>
+            <p:txBody>
+              <a:bodyPr wrap="none" lIns="92075" tIns="46038" rIns="92075" bIns="46038" anchor="ctr"/>
+              <a:lstStyle/>
+              <a:p>
+                <a:endParaRPr lang="en-US"/>
+              </a:p>
+            </p:txBody>
+          </p:sp>
+        </p:grpSp>
+        <p:sp>
+          <p:nvSpPr>
+            <p:cNvPr id="10" name="Text Box 38">
+              <a:extLst>
+                <a:ext uri="{FF2B5EF4-FFF2-40B4-BE49-F238E27FC236}">
+                  <a16:creationId xmlns:a16="http://schemas.microsoft.com/office/drawing/2014/main" id="{25B56638-619A-F8DC-89AA-A192529C963A}"/>
+                </a:ext>
+              </a:extLst>
+            </p:cNvPr>
+            <p:cNvSpPr txBox="1">
+              <a:spLocks noChangeArrowheads="1"/>
+            </p:cNvSpPr>
+            <p:nvPr/>
+          </p:nvSpPr>
+          <p:spPr bwMode="auto">
+            <a:xfrm>
+              <a:off x="5276173" y="1943827"/>
+              <a:ext cx="342900" cy="320675"/>
+            </a:xfrm>
+            <a:prstGeom prst="rect">
+              <a:avLst/>
+            </a:prstGeom>
+            <a:noFill/>
+            <a:ln w="9525">
+              <a:noFill/>
+              <a:miter lim="800000"/>
+              <a:headEnd/>
+              <a:tailEnd/>
+            </a:ln>
+          </p:spPr>
+          <p:txBody>
+            <a:bodyPr wrap="none" lIns="92075" tIns="46038" rIns="92075" bIns="46038">
+              <a:spAutoFit/>
+            </a:bodyPr>
+            <a:lstStyle/>
+            <a:p>
+              <a:r>
+                <a:rPr lang="en-US" sz="1500"/>
+                <a:t>M</a:t>
+              </a:r>
+            </a:p>
+          </p:txBody>
+        </p:sp>
+        <p:sp>
+          <p:nvSpPr>
+            <p:cNvPr id="11" name="Text Box 39">
+              <a:extLst>
+                <a:ext uri="{FF2B5EF4-FFF2-40B4-BE49-F238E27FC236}">
+                  <a16:creationId xmlns:a16="http://schemas.microsoft.com/office/drawing/2014/main" id="{DF70D3B0-9518-8855-C302-1A85FB2E2718}"/>
+                </a:ext>
+              </a:extLst>
+            </p:cNvPr>
+            <p:cNvSpPr txBox="1">
+              <a:spLocks noChangeArrowheads="1"/>
+            </p:cNvSpPr>
+            <p:nvPr/>
+          </p:nvSpPr>
+          <p:spPr bwMode="auto">
+            <a:xfrm>
+              <a:off x="4949148" y="1583465"/>
+              <a:ext cx="995363" cy="320675"/>
+            </a:xfrm>
+            <a:prstGeom prst="rect">
+              <a:avLst/>
+            </a:prstGeom>
+            <a:noFill/>
+            <a:ln w="9525">
+              <a:noFill/>
+              <a:miter lim="800000"/>
+              <a:headEnd/>
+              <a:tailEnd/>
+            </a:ln>
+          </p:spPr>
+          <p:txBody>
+            <a:bodyPr wrap="none" lIns="92075" tIns="46038" rIns="92075" bIns="46038">
+              <a:spAutoFit/>
+            </a:bodyPr>
+            <a:lstStyle/>
+            <a:p>
+              <a:r>
+                <a:rPr lang="en-US" sz="1500" dirty="0"/>
+                <a:t>C++ </a:t>
+              </a:r>
+              <a:r>
+                <a:rPr lang="en-US" sz="1500" dirty="0">
+                  <a:sym typeface="Symbol" pitchFamily="18" charset="2"/>
+                </a:rPr>
+                <a:t> M</a:t>
+              </a:r>
+            </a:p>
+          </p:txBody>
+        </p:sp>
+        <p:sp>
+          <p:nvSpPr>
+            <p:cNvPr id="12" name="Text Box 40">
+              <a:extLst>
+                <a:ext uri="{FF2B5EF4-FFF2-40B4-BE49-F238E27FC236}">
+                  <a16:creationId xmlns:a16="http://schemas.microsoft.com/office/drawing/2014/main" id="{E1F6C53F-E5A2-2E30-6052-F71AA1FE114C}"/>
+                </a:ext>
+              </a:extLst>
+            </p:cNvPr>
+            <p:cNvSpPr txBox="1">
+              <a:spLocks noChangeArrowheads="1"/>
+            </p:cNvSpPr>
+            <p:nvPr/>
+          </p:nvSpPr>
+          <p:spPr bwMode="auto">
+            <a:xfrm>
+              <a:off x="655511" y="2363654"/>
+              <a:ext cx="2028439" cy="646973"/>
+            </a:xfrm>
+            <a:prstGeom prst="rect">
+              <a:avLst/>
+            </a:prstGeom>
+            <a:noFill/>
+            <a:ln w="9525">
+              <a:noFill/>
+              <a:miter lim="800000"/>
+              <a:headEnd/>
+              <a:tailEnd/>
+            </a:ln>
+          </p:spPr>
+          <p:txBody>
+            <a:bodyPr wrap="none" lIns="92075" tIns="46038" rIns="92075" bIns="46038">
+              <a:spAutoFit/>
+            </a:bodyPr>
+            <a:lstStyle/>
+            <a:p>
+              <a:r>
+                <a:rPr lang="en-US" sz="1800" dirty="0"/>
+                <a:t>Rewritten to</a:t>
+              </a:r>
+            </a:p>
+            <a:p>
+              <a:r>
+                <a:rPr lang="en-US" sz="1800" dirty="0"/>
+                <a:t>improve efficiency</a:t>
+              </a:r>
+            </a:p>
+          </p:txBody>
+        </p:sp>
+        <p:sp>
+          <p:nvSpPr>
+            <p:cNvPr id="13" name="AutoShape 44">
+              <a:extLst>
+                <a:ext uri="{FF2B5EF4-FFF2-40B4-BE49-F238E27FC236}">
+                  <a16:creationId xmlns:a16="http://schemas.microsoft.com/office/drawing/2014/main" id="{E09C398A-3874-EB05-F0C5-B6F64210895C}"/>
+                </a:ext>
+              </a:extLst>
+            </p:cNvPr>
+            <p:cNvSpPr>
+              <a:spLocks noChangeArrowheads="1"/>
+            </p:cNvSpPr>
+            <p:nvPr/>
+          </p:nvSpPr>
+          <p:spPr bwMode="auto">
+            <a:xfrm>
+              <a:off x="2622231" y="2026920"/>
+              <a:ext cx="182880" cy="182880"/>
+            </a:xfrm>
+            <a:prstGeom prst="diamond">
+              <a:avLst/>
+            </a:prstGeom>
+            <a:noFill/>
+            <a:ln w="9525">
+              <a:noFill/>
+              <a:miter lim="800000"/>
+              <a:headEnd/>
+              <a:tailEnd/>
+            </a:ln>
+          </p:spPr>
+          <p:txBody>
+            <a:bodyPr wrap="none" lIns="92075" tIns="46038" rIns="92075" bIns="46038" anchor="ctr"/>
+            <a:lstStyle/>
+            <a:p>
+              <a:endParaRPr lang="en-US"/>
+            </a:p>
+          </p:txBody>
+        </p:sp>
+        <p:sp>
+          <p:nvSpPr>
+            <p:cNvPr id="14" name="AutoShape 45">
+              <a:extLst>
+                <a:ext uri="{FF2B5EF4-FFF2-40B4-BE49-F238E27FC236}">
+                  <a16:creationId xmlns:a16="http://schemas.microsoft.com/office/drawing/2014/main" id="{B38EC69F-CB8B-408E-BDA4-92BD345B75B7}"/>
+                </a:ext>
+              </a:extLst>
+            </p:cNvPr>
+            <p:cNvSpPr>
+              <a:spLocks noChangeArrowheads="1"/>
+            </p:cNvSpPr>
+            <p:nvPr/>
+          </p:nvSpPr>
+          <p:spPr bwMode="auto">
+            <a:xfrm>
+              <a:off x="5729516" y="2026920"/>
+              <a:ext cx="182880" cy="182880"/>
+            </a:xfrm>
+            <a:prstGeom prst="diamond">
+              <a:avLst/>
+            </a:prstGeom>
+            <a:noFill/>
+            <a:ln w="9525">
+              <a:noFill/>
+              <a:miter lim="800000"/>
+              <a:headEnd/>
+              <a:tailEnd/>
+            </a:ln>
+          </p:spPr>
+          <p:txBody>
+            <a:bodyPr wrap="none" lIns="92075" tIns="46038" rIns="92075" bIns="46038" anchor="ctr"/>
+            <a:lstStyle/>
+            <a:p>
+              <a:endParaRPr lang="en-US"/>
+            </a:p>
+          </p:txBody>
+        </p:sp>
+        <p:cxnSp>
+          <p:nvCxnSpPr>
+            <p:cNvPr id="15" name="AutoShape 46">
+              <a:extLst>
+                <a:ext uri="{FF2B5EF4-FFF2-40B4-BE49-F238E27FC236}">
+                  <a16:creationId xmlns:a16="http://schemas.microsoft.com/office/drawing/2014/main" id="{1A6E8BE0-2016-3B5E-C3E9-EED2C2277A5C}"/>
+                </a:ext>
+              </a:extLst>
+            </p:cNvPr>
+            <p:cNvCxnSpPr>
+              <a:cxnSpLocks noChangeShapeType="1"/>
+              <a:stCxn id="12" idx="0"/>
+              <a:endCxn id="13" idx="1"/>
+            </p:cNvCxnSpPr>
+            <p:nvPr/>
+          </p:nvCxnSpPr>
+          <p:spPr bwMode="auto">
+            <a:xfrm rot="5400000" flipH="1" flipV="1">
+              <a:off x="2023334" y="1764757"/>
+              <a:ext cx="245294" cy="952500"/>
+            </a:xfrm>
+            <a:prstGeom prst="bentConnector2">
+              <a:avLst/>
+            </a:prstGeom>
+            <a:noFill/>
+            <a:ln w="9525">
+              <a:solidFill>
+                <a:schemeClr val="tx1"/>
+              </a:solidFill>
+              <a:miter lim="800000"/>
+              <a:headEnd/>
+              <a:tailEnd type="triangle" w="med" len="med"/>
+            </a:ln>
+          </p:spPr>
+        </p:cxnSp>
+        <p:sp>
+          <p:nvSpPr>
+            <p:cNvPr id="16" name="AutoShape 49">
+              <a:extLst>
+                <a:ext uri="{FF2B5EF4-FFF2-40B4-BE49-F238E27FC236}">
+                  <a16:creationId xmlns:a16="http://schemas.microsoft.com/office/drawing/2014/main" id="{17CE2197-ED13-2396-EB7C-3D5475ADF334}"/>
+                </a:ext>
+              </a:extLst>
+            </p:cNvPr>
+            <p:cNvSpPr>
+              <a:spLocks noChangeArrowheads="1"/>
+            </p:cNvSpPr>
+            <p:nvPr/>
+          </p:nvSpPr>
+          <p:spPr bwMode="auto">
+            <a:xfrm>
+              <a:off x="5654231" y="2747023"/>
+              <a:ext cx="92075" cy="92075"/>
+            </a:xfrm>
+            <a:prstGeom prst="diamond">
+              <a:avLst/>
+            </a:prstGeom>
+            <a:noFill/>
+            <a:ln w="9525">
+              <a:noFill/>
+              <a:miter lim="800000"/>
+              <a:headEnd/>
+              <a:tailEnd/>
+            </a:ln>
+          </p:spPr>
+          <p:txBody>
+            <a:bodyPr wrap="none" lIns="92075" tIns="46038" rIns="92075" bIns="46038" anchor="ctr"/>
+            <a:lstStyle/>
+            <a:p>
+              <a:endParaRPr lang="en-US"/>
+            </a:p>
+          </p:txBody>
+        </p:sp>
+        <p:cxnSp>
+          <p:nvCxnSpPr>
+            <p:cNvPr id="17" name="AutoShape 51">
+              <a:extLst>
+                <a:ext uri="{FF2B5EF4-FFF2-40B4-BE49-F238E27FC236}">
+                  <a16:creationId xmlns:a16="http://schemas.microsoft.com/office/drawing/2014/main" id="{05381323-0623-70D7-0B0C-25A3B2E4E679}"/>
+                </a:ext>
+              </a:extLst>
+            </p:cNvPr>
+            <p:cNvCxnSpPr>
+              <a:cxnSpLocks noChangeShapeType="1"/>
+              <a:stCxn id="26" idx="1"/>
+              <a:endCxn id="20" idx="3"/>
+            </p:cNvCxnSpPr>
+            <p:nvPr/>
+          </p:nvCxnSpPr>
+          <p:spPr bwMode="auto">
+            <a:xfrm rot="10800000">
+              <a:off x="4715587" y="2489758"/>
+              <a:ext cx="710004" cy="1132056"/>
+            </a:xfrm>
+            <a:prstGeom prst="bentConnector3">
+              <a:avLst>
+                <a:gd name="adj1" fmla="val 50000"/>
+              </a:avLst>
+            </a:prstGeom>
+            <a:noFill/>
+            <a:ln w="9525">
+              <a:solidFill>
+                <a:schemeClr val="tx1"/>
+              </a:solidFill>
+              <a:miter lim="800000"/>
+              <a:headEnd/>
+              <a:tailEnd type="triangle" w="med" len="med"/>
+            </a:ln>
+          </p:spPr>
+        </p:cxnSp>
+        <p:sp>
+          <p:nvSpPr>
+            <p:cNvPr id="18" name="Text Box 41">
+              <a:extLst>
+                <a:ext uri="{FF2B5EF4-FFF2-40B4-BE49-F238E27FC236}">
+                  <a16:creationId xmlns:a16="http://schemas.microsoft.com/office/drawing/2014/main" id="{F7BF1BDC-6429-89CB-B724-AFA2F142F2EA}"/>
+                </a:ext>
+              </a:extLst>
+            </p:cNvPr>
+            <p:cNvSpPr txBox="1">
+              <a:spLocks noChangeArrowheads="1"/>
+            </p:cNvSpPr>
+            <p:nvPr/>
+          </p:nvSpPr>
+          <p:spPr bwMode="auto">
+            <a:xfrm>
+              <a:off x="1238975" y="3125654"/>
+              <a:ext cx="2032608" cy="646973"/>
+            </a:xfrm>
+            <a:prstGeom prst="rect">
+              <a:avLst/>
+            </a:prstGeom>
+            <a:noFill/>
+            <a:ln w="9525">
+              <a:noFill/>
+              <a:miter lim="800000"/>
+              <a:headEnd/>
+              <a:tailEnd/>
+            </a:ln>
+          </p:spPr>
+          <p:txBody>
+            <a:bodyPr wrap="none" lIns="92075" tIns="46038" rIns="92075" bIns="46038">
+              <a:spAutoFit/>
+            </a:bodyPr>
+            <a:lstStyle/>
+            <a:p>
+              <a:r>
+                <a:rPr lang="en-US" sz="1800" dirty="0"/>
+                <a:t>Compile using the</a:t>
+              </a:r>
+            </a:p>
+            <a:p>
+              <a:r>
+                <a:rPr lang="en-US" sz="1800" dirty="0"/>
+                <a:t>existing compiler</a:t>
+              </a:r>
+            </a:p>
+          </p:txBody>
+        </p:sp>
+        <p:cxnSp>
+          <p:nvCxnSpPr>
+            <p:cNvPr id="19" name="AutoShape 47">
+              <a:extLst>
+                <a:ext uri="{FF2B5EF4-FFF2-40B4-BE49-F238E27FC236}">
+                  <a16:creationId xmlns:a16="http://schemas.microsoft.com/office/drawing/2014/main" id="{705F5FD9-0C8B-3C4B-A403-968CCBB12940}"/>
+                </a:ext>
+              </a:extLst>
+            </p:cNvPr>
+            <p:cNvCxnSpPr>
+              <a:cxnSpLocks noChangeShapeType="1"/>
+              <a:stCxn id="18" idx="3"/>
+              <a:endCxn id="24" idx="1"/>
+            </p:cNvCxnSpPr>
+            <p:nvPr/>
+          </p:nvCxnSpPr>
+          <p:spPr bwMode="auto">
+            <a:xfrm flipV="1">
+              <a:off x="3271583" y="2489758"/>
+              <a:ext cx="538417" cy="959383"/>
+            </a:xfrm>
+            <a:prstGeom prst="bentConnector3">
+              <a:avLst>
+                <a:gd name="adj1" fmla="val 50000"/>
+              </a:avLst>
+            </a:prstGeom>
+            <a:noFill/>
+            <a:ln w="9525">
+              <a:solidFill>
+                <a:schemeClr val="tx1"/>
+              </a:solidFill>
+              <a:miter lim="800000"/>
+              <a:headEnd/>
+              <a:tailEnd type="triangle" w="med" len="med"/>
+            </a:ln>
+          </p:spPr>
+        </p:cxnSp>
+        <p:sp>
+          <p:nvSpPr>
+            <p:cNvPr id="20" name="AutoShape 49">
+              <a:extLst>
+                <a:ext uri="{FF2B5EF4-FFF2-40B4-BE49-F238E27FC236}">
+                  <a16:creationId xmlns:a16="http://schemas.microsoft.com/office/drawing/2014/main" id="{E83CE0D2-3A2A-A4AF-99F4-3572442D6452}"/>
+                </a:ext>
+              </a:extLst>
+            </p:cNvPr>
+            <p:cNvSpPr>
+              <a:spLocks noChangeArrowheads="1"/>
+            </p:cNvSpPr>
+            <p:nvPr/>
+          </p:nvSpPr>
+          <p:spPr bwMode="auto">
+            <a:xfrm>
+              <a:off x="4532707" y="2398318"/>
+              <a:ext cx="182880" cy="182880"/>
+            </a:xfrm>
+            <a:prstGeom prst="diamond">
+              <a:avLst/>
+            </a:prstGeom>
+            <a:noFill/>
+            <a:ln w="9525">
+              <a:noFill/>
+              <a:miter lim="800000"/>
+              <a:headEnd/>
+              <a:tailEnd/>
+            </a:ln>
+          </p:spPr>
+          <p:txBody>
+            <a:bodyPr wrap="none" lIns="92075" tIns="46038" rIns="92075" bIns="46038" anchor="ctr"/>
+            <a:lstStyle/>
+            <a:p>
+              <a:endParaRPr lang="en-US" dirty="0"/>
+            </a:p>
+          </p:txBody>
+        </p:sp>
+        <p:sp>
+          <p:nvSpPr>
+            <p:cNvPr id="21" name="Flowchart: Off-page Connector 20">
+              <a:extLst>
+                <a:ext uri="{FF2B5EF4-FFF2-40B4-BE49-F238E27FC236}">
+                  <a16:creationId xmlns:a16="http://schemas.microsoft.com/office/drawing/2014/main" id="{59A97BBF-6C83-1872-B36F-2A2E920981E0}"/>
+                </a:ext>
+              </a:extLst>
+            </p:cNvPr>
+            <p:cNvSpPr/>
+            <p:nvPr/>
+          </p:nvSpPr>
+          <p:spPr bwMode="auto">
+            <a:xfrm>
+              <a:off x="3804107" y="2657662"/>
+              <a:ext cx="914400" cy="731520"/>
+            </a:xfrm>
+            <a:prstGeom prst="flowChartOffpageConnector">
+              <a:avLst/>
+            </a:prstGeom>
+            <a:noFill/>
+            <a:ln w="9525">
+              <a:solidFill>
+                <a:schemeClr val="tx1"/>
+              </a:solidFill>
+              <a:round/>
+              <a:headEnd/>
+              <a:tailEnd/>
+            </a:ln>
+          </p:spPr>
+          <p:txBody>
+            <a:bodyPr wrap="none" lIns="92075" tIns="46038" rIns="92075" bIns="46038" rtlCol="0" anchor="ctr"/>
+            <a:lstStyle/>
+            <a:p>
+              <a:pPr algn="ctr"/>
+              <a:r>
+                <a:rPr lang="en-US" sz="1500" dirty="0"/>
+                <a:t>M</a:t>
+              </a:r>
+            </a:p>
+          </p:txBody>
+        </p:sp>
+        <p:grpSp>
+          <p:nvGrpSpPr>
+            <p:cNvPr id="22" name="Group 21">
+              <a:extLst>
+                <a:ext uri="{FF2B5EF4-FFF2-40B4-BE49-F238E27FC236}">
+                  <a16:creationId xmlns:a16="http://schemas.microsoft.com/office/drawing/2014/main" id="{C56B8256-6955-98C2-1191-BB498DC0BE35}"/>
+                </a:ext>
+              </a:extLst>
+            </p:cNvPr>
+            <p:cNvGrpSpPr/>
+            <p:nvPr/>
+          </p:nvGrpSpPr>
+          <p:grpSpPr>
+            <a:xfrm>
+              <a:off x="5425591" y="2605215"/>
+              <a:ext cx="2340449" cy="1200971"/>
+              <a:chOff x="3962400" y="3810000"/>
+              <a:chExt cx="2340449" cy="1200971"/>
+            </a:xfrm>
+          </p:grpSpPr>
+          <p:sp>
+            <p:nvSpPr>
+              <p:cNvPr id="25" name="Text Box 42">
+                <a:extLst>
+                  <a:ext uri="{FF2B5EF4-FFF2-40B4-BE49-F238E27FC236}">
+                    <a16:creationId xmlns:a16="http://schemas.microsoft.com/office/drawing/2014/main" id="{79287AA6-3ADA-19EE-91C7-872AA762D547}"/>
+                  </a:ext>
+                </a:extLst>
+              </p:cNvPr>
+              <p:cNvSpPr txBox="1">
+                <a:spLocks noChangeArrowheads="1"/>
+              </p:cNvSpPr>
+              <p:nvPr/>
+            </p:nvSpPr>
+            <p:spPr bwMode="auto">
+              <a:xfrm>
+                <a:off x="3962400" y="3810000"/>
+                <a:ext cx="2340449" cy="1200971"/>
+              </a:xfrm>
+              <a:prstGeom prst="rect">
+                <a:avLst/>
+              </a:prstGeom>
+              <a:noFill/>
+              <a:ln w="9525">
+                <a:noFill/>
+                <a:miter lim="800000"/>
+                <a:headEnd/>
+                <a:tailEnd/>
+              </a:ln>
+            </p:spPr>
+            <p:txBody>
+              <a:bodyPr wrap="none" lIns="92075" tIns="46038" rIns="92075" bIns="46038">
+                <a:spAutoFit/>
+              </a:bodyPr>
+              <a:lstStyle/>
+              <a:p>
+                <a:pPr algn="l"/>
+                <a:r>
+                  <a:rPr lang="en-US" sz="1800" dirty="0"/>
+                  <a:t>The new compiler</a:t>
+                </a:r>
+              </a:p>
+              <a:p>
+                <a:pPr algn="l"/>
+                <a:r>
+                  <a:rPr lang="en-US" sz="1800" dirty="0"/>
+                  <a:t>generates more</a:t>
+                </a:r>
+              </a:p>
+              <a:p>
+                <a:pPr algn="l"/>
+                <a:r>
+                  <a:rPr lang="en-US" sz="1800" dirty="0"/>
+                  <a:t>efficient code than</a:t>
+                </a:r>
+              </a:p>
+              <a:p>
+                <a:pPr algn="l"/>
+                <a:r>
+                  <a:rPr lang="en-US" sz="1800" dirty="0"/>
+                  <a:t>the existing compiler.</a:t>
+                </a:r>
+              </a:p>
+            </p:txBody>
+          </p:sp>
+          <p:sp>
+            <p:nvSpPr>
+              <p:cNvPr id="26" name="AutoShape 50">
+                <a:extLst>
+                  <a:ext uri="{FF2B5EF4-FFF2-40B4-BE49-F238E27FC236}">
+                    <a16:creationId xmlns:a16="http://schemas.microsoft.com/office/drawing/2014/main" id="{2227B1BC-A8A4-A42A-D632-009B863340CC}"/>
+                  </a:ext>
+                </a:extLst>
+              </p:cNvPr>
+              <p:cNvSpPr>
+                <a:spLocks noChangeArrowheads="1"/>
+              </p:cNvSpPr>
+              <p:nvPr/>
+            </p:nvSpPr>
+            <p:spPr bwMode="auto">
+              <a:xfrm>
+                <a:off x="3962400" y="4735158"/>
+                <a:ext cx="182880" cy="182881"/>
+              </a:xfrm>
+              <a:prstGeom prst="diamond">
+                <a:avLst/>
+              </a:prstGeom>
+              <a:noFill/>
+              <a:ln w="9525">
+                <a:noFill/>
+                <a:miter lim="800000"/>
+                <a:headEnd/>
+                <a:tailEnd/>
+              </a:ln>
+            </p:spPr>
+            <p:txBody>
+              <a:bodyPr wrap="none" lIns="92075" tIns="46038" rIns="92075" bIns="46038" anchor="ctr"/>
+              <a:lstStyle/>
+              <a:p>
+                <a:endParaRPr lang="en-US"/>
+              </a:p>
+            </p:txBody>
+          </p:sp>
+          <p:sp>
+            <p:nvSpPr>
+              <p:cNvPr id="27" name="Diamond 26">
+                <a:extLst>
+                  <a:ext uri="{FF2B5EF4-FFF2-40B4-BE49-F238E27FC236}">
+                    <a16:creationId xmlns:a16="http://schemas.microsoft.com/office/drawing/2014/main" id="{C9F74A02-77E8-C1D8-5704-EBF69BE0DA7C}"/>
+                  </a:ext>
+                </a:extLst>
+              </p:cNvPr>
+              <p:cNvSpPr/>
+              <p:nvPr/>
+            </p:nvSpPr>
+            <p:spPr bwMode="auto">
+              <a:xfrm>
+                <a:off x="4198586" y="3810000"/>
+                <a:ext cx="182880" cy="182880"/>
+              </a:xfrm>
+              <a:prstGeom prst="diamond">
+                <a:avLst/>
+              </a:prstGeom>
+              <a:noFill/>
+              <a:ln w="9525">
+                <a:noFill/>
+                <a:round/>
+                <a:headEnd/>
+                <a:tailEnd/>
+              </a:ln>
+            </p:spPr>
+            <p:txBody>
+              <a:bodyPr wrap="none" lIns="92075" tIns="46038" rIns="92075" bIns="46038" rtlCol="0" anchor="ctr"/>
+              <a:lstStyle/>
+              <a:p>
+                <a:pPr algn="ctr"/>
+                <a:endParaRPr lang="en-US"/>
+              </a:p>
+            </p:txBody>
+          </p:sp>
+        </p:grpSp>
+        <p:cxnSp>
+          <p:nvCxnSpPr>
+            <p:cNvPr id="23" name="Straight Arrow Connector 32">
+              <a:extLst>
+                <a:ext uri="{FF2B5EF4-FFF2-40B4-BE49-F238E27FC236}">
+                  <a16:creationId xmlns:a16="http://schemas.microsoft.com/office/drawing/2014/main" id="{30D200D9-57A4-B24B-258E-4AF592EF9763}"/>
+                </a:ext>
+              </a:extLst>
+            </p:cNvPr>
+            <p:cNvCxnSpPr>
+              <a:cxnSpLocks/>
+              <a:stCxn id="25" idx="0"/>
+              <a:endCxn id="14" idx="3"/>
+            </p:cNvCxnSpPr>
+            <p:nvPr/>
+          </p:nvCxnSpPr>
+          <p:spPr bwMode="auto">
+            <a:xfrm rot="16200000" flipV="1">
+              <a:off x="6010679" y="2020078"/>
+              <a:ext cx="486855" cy="683420"/>
+            </a:xfrm>
+            <a:prstGeom prst="bentConnector2">
+              <a:avLst/>
+            </a:prstGeom>
+            <a:noFill/>
+            <a:ln w="9525" cap="flat" cmpd="sng" algn="ctr">
+              <a:solidFill>
+                <a:schemeClr val="tx1"/>
+              </a:solidFill>
+              <a:prstDash val="solid"/>
+              <a:round/>
+              <a:headEnd type="none" w="med" len="med"/>
+              <a:tailEnd type="triangle"/>
+            </a:ln>
+            <a:effectLst/>
+          </p:spPr>
+        </p:cxnSp>
+        <p:sp>
+          <p:nvSpPr>
+            <p:cNvPr id="24" name="AutoShape 44">
+              <a:extLst>
+                <a:ext uri="{FF2B5EF4-FFF2-40B4-BE49-F238E27FC236}">
+                  <a16:creationId xmlns:a16="http://schemas.microsoft.com/office/drawing/2014/main" id="{27A3C9B5-8BC3-4CC4-5877-7301C807013B}"/>
+                </a:ext>
+              </a:extLst>
+            </p:cNvPr>
+            <p:cNvSpPr>
+              <a:spLocks noChangeArrowheads="1"/>
+            </p:cNvSpPr>
+            <p:nvPr/>
+          </p:nvSpPr>
+          <p:spPr bwMode="auto">
+            <a:xfrm>
+              <a:off x="3810000" y="2398318"/>
+              <a:ext cx="182880" cy="182880"/>
+            </a:xfrm>
+            <a:prstGeom prst="diamond">
+              <a:avLst/>
+            </a:prstGeom>
+            <a:noFill/>
+            <a:ln w="9525">
+              <a:noFill/>
+              <a:miter lim="800000"/>
+              <a:headEnd/>
+              <a:tailEnd/>
+            </a:ln>
+          </p:spPr>
+          <p:txBody>
+            <a:bodyPr wrap="none" lIns="92075" tIns="46038" rIns="92075" bIns="46038" anchor="ctr"/>
+            <a:lstStyle/>
+            <a:p>
+              <a:endParaRPr lang="en-US"/>
+            </a:p>
+          </p:txBody>
+        </p:sp>
+      </p:grpSp>
+    </p:spTree>
+    <p:extLst>
+      <p:ext uri="{BB962C8B-B14F-4D97-AF65-F5344CB8AC3E}">
+        <p14:creationId xmlns:p14="http://schemas.microsoft.com/office/powerpoint/2010/main" val="1192622248"/>
+      </p:ext>
+    </p:extLst>
+  </p:cSld>
+  <p:clrMapOvr>
+    <a:masterClrMapping/>
+  </p:clrMapOvr>
+</p:sld>
+</file>
+
+<file path=ppt/slides/slide31.xml><?xml version="1.0" encoding="utf-8"?>
+<p:sld xmlns:a="http://schemas.openxmlformats.org/drawingml/2006/main" xmlns:r="http://schemas.openxmlformats.org/officeDocument/2006/relationships" xmlns:p="http://schemas.openxmlformats.org/presentationml/2006/main">
+  <p:cSld>
+    <p:spTree>
+      <p:nvGrpSpPr>
+        <p:cNvPr id="1" name=""/>
+        <p:cNvGrpSpPr/>
+        <p:nvPr/>
+      </p:nvGrpSpPr>
+      <p:grpSpPr>
+        <a:xfrm>
+          <a:off x="0" y="0"/>
+          <a:ext cx="0" cy="0"/>
+          <a:chOff x="0" y="0"/>
+          <a:chExt cx="0" cy="0"/>
+        </a:xfrm>
+      </p:grpSpPr>
+      <p:sp>
+        <p:nvSpPr>
+          <p:cNvPr id="33794" name="Footer Placeholder 3"/>
+          <p:cNvSpPr>
+            <a:spLocks noGrp="1"/>
+          </p:cNvSpPr>
+          <p:nvPr>
+            <p:ph type="ftr" sz="quarter" idx="10"/>
+          </p:nvPr>
+        </p:nvSpPr>
+        <p:spPr>
+          <a:noFill/>
+        </p:spPr>
+        <p:txBody>
+          <a:bodyPr/>
+          <a:lstStyle/>
+          <a:p>
+            <a:r>
+              <a:rPr lang="en-US"/>
+              <a:t>©SoftMoore Consulting</a:t>
+            </a:r>
+          </a:p>
+        </p:txBody>
+      </p:sp>
+      <p:sp>
+        <p:nvSpPr>
+          <p:cNvPr id="33795" name="Slide Number Placeholder 4"/>
+          <p:cNvSpPr>
+            <a:spLocks noGrp="1"/>
+          </p:cNvSpPr>
+          <p:nvPr>
+            <p:ph type="sldNum" sz="quarter" idx="11"/>
+          </p:nvPr>
+        </p:nvSpPr>
+        <p:spPr>
+          <a:noFill/>
+        </p:spPr>
+        <p:txBody>
+          <a:bodyPr/>
+          <a:lstStyle/>
+          <a:p>
+            <a:r>
+              <a:rPr lang="en-US"/>
+              <a:t>Slide </a:t>
+            </a:r>
+            <a:fld id="{6B892657-F6C6-4A90-B818-B298D3E265B8}" type="slidenum">
+              <a:rPr lang="en-US" smtClean="0"/>
+              <a:pPr/>
+              <a:t>31</a:t>
+            </a:fld>
+            <a:endParaRPr lang="en-US"/>
+          </a:p>
+        </p:txBody>
+      </p:sp>
+      <p:sp>
+        <p:nvSpPr>
+          <p:cNvPr id="33796" name="Rectangle 2"/>
+          <p:cNvSpPr>
+            <a:spLocks noGrp="1" noChangeArrowheads="1"/>
+          </p:cNvSpPr>
+          <p:nvPr>
+            <p:ph type="title"/>
+          </p:nvPr>
+        </p:nvSpPr>
+        <p:spPr/>
+        <p:txBody>
+          <a:bodyPr/>
+          <a:lstStyle/>
+          <a:p>
+            <a:r>
+              <a:rPr lang="en-US" dirty="0"/>
+              <a:t>Improving Efficiency of a Compiler</a:t>
+            </a:r>
+            <a:br>
+              <a:rPr lang="en-US" dirty="0"/>
+            </a:br>
+            <a:r>
+              <a:rPr lang="en-US" sz="2400" dirty="0"/>
+              <a:t>(continued)</a:t>
+            </a:r>
+          </a:p>
+        </p:txBody>
+      </p:sp>
+      <p:sp>
+        <p:nvSpPr>
+          <p:cNvPr id="33797" name="Rectangle 3"/>
+          <p:cNvSpPr>
+            <a:spLocks noGrp="1" noChangeArrowheads="1"/>
+          </p:cNvSpPr>
+          <p:nvPr>
+            <p:ph type="body" idx="1"/>
+          </p:nvPr>
+        </p:nvSpPr>
+        <p:spPr/>
+        <p:txBody>
+          <a:bodyPr/>
+          <a:lstStyle/>
+          <a:p>
+            <a:r>
+              <a:rPr lang="en-US" dirty="0"/>
+              <a:t>But the compiler itself does not run with the new improvements.  Only code compiled with the new compiler is more efficient.</a:t>
+            </a:r>
+          </a:p>
+          <a:p>
+            <a:r>
+              <a:rPr lang="en-US" dirty="0"/>
+              <a:t>Recompile the compiler again to obtain a more efficient compiler.</a:t>
+            </a:r>
+          </a:p>
+        </p:txBody>
+      </p:sp>
+      <p:grpSp>
+        <p:nvGrpSpPr>
+          <p:cNvPr id="54" name="Group 53">
+            <a:extLst>
+              <a:ext uri="{FF2B5EF4-FFF2-40B4-BE49-F238E27FC236}">
+                <a16:creationId xmlns:a16="http://schemas.microsoft.com/office/drawing/2014/main" id="{18AC53E7-9E3C-CB59-A664-645612C69FAB}"/>
+              </a:ext>
+            </a:extLst>
+          </p:cNvPr>
+          <p:cNvGrpSpPr/>
+          <p:nvPr/>
+        </p:nvGrpSpPr>
+        <p:grpSpPr>
+          <a:xfrm>
+            <a:off x="1199252" y="3657600"/>
+            <a:ext cx="6510496" cy="2243359"/>
+            <a:chOff x="1752600" y="3852641"/>
+            <a:chExt cx="6510496" cy="2243359"/>
+          </a:xfrm>
+        </p:grpSpPr>
+        <p:grpSp>
+          <p:nvGrpSpPr>
+            <p:cNvPr id="3" name="Group 5">
+              <a:extLst>
+                <a:ext uri="{FF2B5EF4-FFF2-40B4-BE49-F238E27FC236}">
+                  <a16:creationId xmlns:a16="http://schemas.microsoft.com/office/drawing/2014/main" id="{7052D050-5E1D-7F0F-F049-59BC6745432F}"/>
+                </a:ext>
+              </a:extLst>
+            </p:cNvPr>
+            <p:cNvGrpSpPr>
+              <a:grpSpLocks/>
+            </p:cNvGrpSpPr>
+            <p:nvPr/>
+          </p:nvGrpSpPr>
+          <p:grpSpPr bwMode="auto">
+            <a:xfrm>
+              <a:off x="2882233" y="3852641"/>
+              <a:ext cx="1462088" cy="730250"/>
+              <a:chOff x="624" y="2544"/>
+              <a:chExt cx="921" cy="460"/>
+            </a:xfrm>
+          </p:grpSpPr>
+          <p:sp>
+            <p:nvSpPr>
+              <p:cNvPr id="45" name="Line 6">
+                <a:extLst>
+                  <a:ext uri="{FF2B5EF4-FFF2-40B4-BE49-F238E27FC236}">
+                    <a16:creationId xmlns:a16="http://schemas.microsoft.com/office/drawing/2014/main" id="{B47CBA6D-F61B-9CC0-4324-4B550F1BB51B}"/>
+                  </a:ext>
+                </a:extLst>
+              </p:cNvPr>
+              <p:cNvSpPr>
+                <a:spLocks noChangeShapeType="1"/>
+              </p:cNvSpPr>
+              <p:nvPr/>
+            </p:nvSpPr>
+            <p:spPr bwMode="auto">
+              <a:xfrm>
+                <a:off x="624" y="2544"/>
+                <a:ext cx="921" cy="0"/>
+              </a:xfrm>
+              <a:prstGeom prst="line">
+                <a:avLst/>
+              </a:prstGeom>
+              <a:noFill/>
+              <a:ln w="9525">
+                <a:solidFill>
+                  <a:schemeClr val="tx1"/>
+                </a:solidFill>
+                <a:round/>
+                <a:headEnd/>
+                <a:tailEnd/>
+              </a:ln>
+            </p:spPr>
+            <p:txBody>
+              <a:bodyPr wrap="none" lIns="92075" tIns="46038" rIns="92075" bIns="46038" anchor="ctr"/>
+              <a:lstStyle/>
+              <a:p>
+                <a:endParaRPr lang="en-US"/>
+              </a:p>
+            </p:txBody>
+          </p:sp>
+          <p:sp>
+            <p:nvSpPr>
+              <p:cNvPr id="46" name="Line 7">
+                <a:extLst>
+                  <a:ext uri="{FF2B5EF4-FFF2-40B4-BE49-F238E27FC236}">
+                    <a16:creationId xmlns:a16="http://schemas.microsoft.com/office/drawing/2014/main" id="{4338AB51-6600-E372-4284-8A639C6BC838}"/>
+                  </a:ext>
+                </a:extLst>
+              </p:cNvPr>
+              <p:cNvSpPr>
+                <a:spLocks noChangeShapeType="1"/>
+              </p:cNvSpPr>
+              <p:nvPr/>
+            </p:nvSpPr>
+            <p:spPr bwMode="auto">
+              <a:xfrm>
+                <a:off x="797" y="3004"/>
+                <a:ext cx="576" cy="0"/>
+              </a:xfrm>
+              <a:prstGeom prst="line">
+                <a:avLst/>
+              </a:prstGeom>
+              <a:noFill/>
+              <a:ln w="9525">
+                <a:solidFill>
+                  <a:schemeClr val="tx1"/>
+                </a:solidFill>
+                <a:round/>
+                <a:headEnd/>
+                <a:tailEnd/>
+              </a:ln>
+            </p:spPr>
+            <p:txBody>
+              <a:bodyPr wrap="none" lIns="92075" tIns="46038" rIns="92075" bIns="46038" anchor="ctr"/>
+              <a:lstStyle/>
+              <a:p>
+                <a:endParaRPr lang="en-US"/>
+              </a:p>
+            </p:txBody>
+          </p:sp>
+          <p:sp>
+            <p:nvSpPr>
+              <p:cNvPr id="47" name="Line 8">
+                <a:extLst>
+                  <a:ext uri="{FF2B5EF4-FFF2-40B4-BE49-F238E27FC236}">
+                    <a16:creationId xmlns:a16="http://schemas.microsoft.com/office/drawing/2014/main" id="{35E96AF7-3025-162B-88FA-F9B3537C9CD3}"/>
+                  </a:ext>
+                </a:extLst>
+              </p:cNvPr>
+              <p:cNvSpPr>
+                <a:spLocks noChangeShapeType="1"/>
+              </p:cNvSpPr>
+              <p:nvPr/>
+            </p:nvSpPr>
+            <p:spPr bwMode="auto">
+              <a:xfrm>
+                <a:off x="625" y="2544"/>
+                <a:ext cx="0" cy="230"/>
+              </a:xfrm>
+              <a:prstGeom prst="line">
+                <a:avLst/>
+              </a:prstGeom>
+              <a:noFill/>
+              <a:ln w="9525">
+                <a:solidFill>
+                  <a:schemeClr val="tx1"/>
+                </a:solidFill>
+                <a:round/>
+                <a:headEnd/>
+                <a:tailEnd/>
+              </a:ln>
+            </p:spPr>
+            <p:txBody>
+              <a:bodyPr wrap="none" lIns="92075" tIns="46038" rIns="92075" bIns="46038" anchor="ctr"/>
+              <a:lstStyle/>
+              <a:p>
+                <a:endParaRPr lang="en-US"/>
+              </a:p>
+            </p:txBody>
+          </p:sp>
+          <p:sp>
+            <p:nvSpPr>
+              <p:cNvPr id="48" name="Line 9">
+                <a:extLst>
+                  <a:ext uri="{FF2B5EF4-FFF2-40B4-BE49-F238E27FC236}">
+                    <a16:creationId xmlns:a16="http://schemas.microsoft.com/office/drawing/2014/main" id="{41C91132-6A48-4171-A850-A27057F0F1F8}"/>
+                  </a:ext>
+                </a:extLst>
+              </p:cNvPr>
+              <p:cNvSpPr>
+                <a:spLocks noChangeShapeType="1"/>
+              </p:cNvSpPr>
+              <p:nvPr/>
+            </p:nvSpPr>
+            <p:spPr bwMode="auto">
+              <a:xfrm>
+                <a:off x="1545" y="2544"/>
+                <a:ext cx="0" cy="230"/>
+              </a:xfrm>
+              <a:prstGeom prst="line">
+                <a:avLst/>
+              </a:prstGeom>
+              <a:noFill/>
+              <a:ln w="9525">
+                <a:solidFill>
+                  <a:schemeClr val="tx1"/>
+                </a:solidFill>
+                <a:round/>
+                <a:headEnd/>
+                <a:tailEnd/>
+              </a:ln>
+            </p:spPr>
+            <p:txBody>
+              <a:bodyPr wrap="none" lIns="92075" tIns="46038" rIns="92075" bIns="46038" anchor="ctr"/>
+              <a:lstStyle/>
+              <a:p>
+                <a:endParaRPr lang="en-US"/>
+              </a:p>
+            </p:txBody>
+          </p:sp>
+          <p:sp>
+            <p:nvSpPr>
+              <p:cNvPr id="49" name="Line 10">
+                <a:extLst>
+                  <a:ext uri="{FF2B5EF4-FFF2-40B4-BE49-F238E27FC236}">
+                    <a16:creationId xmlns:a16="http://schemas.microsoft.com/office/drawing/2014/main" id="{C5DD7C95-DB52-C345-07B5-2C85254C597A}"/>
+                  </a:ext>
+                </a:extLst>
+              </p:cNvPr>
+              <p:cNvSpPr>
+                <a:spLocks noChangeShapeType="1"/>
+              </p:cNvSpPr>
+              <p:nvPr/>
+            </p:nvSpPr>
+            <p:spPr bwMode="auto">
+              <a:xfrm>
+                <a:off x="797" y="2774"/>
+                <a:ext cx="0" cy="230"/>
+              </a:xfrm>
+              <a:prstGeom prst="line">
+                <a:avLst/>
+              </a:prstGeom>
+              <a:noFill/>
+              <a:ln w="9525">
+                <a:solidFill>
+                  <a:schemeClr val="tx1"/>
+                </a:solidFill>
+                <a:round/>
+                <a:headEnd/>
+                <a:tailEnd/>
+              </a:ln>
+            </p:spPr>
+            <p:txBody>
+              <a:bodyPr wrap="none" lIns="92075" tIns="46038" rIns="92075" bIns="46038" anchor="ctr"/>
+              <a:lstStyle/>
+              <a:p>
+                <a:endParaRPr lang="en-US"/>
+              </a:p>
+            </p:txBody>
+          </p:sp>
+          <p:sp>
+            <p:nvSpPr>
+              <p:cNvPr id="50" name="Line 11">
+                <a:extLst>
+                  <a:ext uri="{FF2B5EF4-FFF2-40B4-BE49-F238E27FC236}">
+                    <a16:creationId xmlns:a16="http://schemas.microsoft.com/office/drawing/2014/main" id="{FC3F336F-51BB-2261-8DBD-4AA34B63EC32}"/>
+                  </a:ext>
+                </a:extLst>
+              </p:cNvPr>
+              <p:cNvSpPr>
+                <a:spLocks noChangeShapeType="1"/>
+              </p:cNvSpPr>
+              <p:nvPr/>
+            </p:nvSpPr>
+            <p:spPr bwMode="auto">
+              <a:xfrm>
+                <a:off x="1373" y="2774"/>
+                <a:ext cx="0" cy="230"/>
+              </a:xfrm>
+              <a:prstGeom prst="line">
+                <a:avLst/>
+              </a:prstGeom>
+              <a:noFill/>
+              <a:ln w="9525">
+                <a:solidFill>
+                  <a:schemeClr val="tx1"/>
+                </a:solidFill>
+                <a:round/>
+                <a:headEnd/>
+                <a:tailEnd/>
+              </a:ln>
+            </p:spPr>
+            <p:txBody>
+              <a:bodyPr wrap="none" lIns="92075" tIns="46038" rIns="92075" bIns="46038" anchor="ctr"/>
+              <a:lstStyle/>
+              <a:p>
+                <a:endParaRPr lang="en-US"/>
+              </a:p>
+            </p:txBody>
+          </p:sp>
+          <p:sp>
+            <p:nvSpPr>
+              <p:cNvPr id="51" name="Line 12">
+                <a:extLst>
+                  <a:ext uri="{FF2B5EF4-FFF2-40B4-BE49-F238E27FC236}">
+                    <a16:creationId xmlns:a16="http://schemas.microsoft.com/office/drawing/2014/main" id="{C5B59008-6543-3F77-5CCD-9F68B51C8E77}"/>
+                  </a:ext>
+                </a:extLst>
+              </p:cNvPr>
+              <p:cNvSpPr>
+                <a:spLocks noChangeShapeType="1"/>
+              </p:cNvSpPr>
+              <p:nvPr/>
+            </p:nvSpPr>
+            <p:spPr bwMode="auto">
+              <a:xfrm>
+                <a:off x="624" y="2774"/>
+                <a:ext cx="173" cy="0"/>
+              </a:xfrm>
+              <a:prstGeom prst="line">
+                <a:avLst/>
+              </a:prstGeom>
+              <a:noFill/>
+              <a:ln w="9525">
+                <a:solidFill>
+                  <a:schemeClr val="tx1"/>
+                </a:solidFill>
+                <a:round/>
+                <a:headEnd/>
+                <a:tailEnd/>
+              </a:ln>
+            </p:spPr>
+            <p:txBody>
+              <a:bodyPr wrap="none" lIns="92075" tIns="46038" rIns="92075" bIns="46038" anchor="ctr"/>
+              <a:lstStyle/>
+              <a:p>
+                <a:endParaRPr lang="en-US"/>
+              </a:p>
+            </p:txBody>
+          </p:sp>
+          <p:sp>
+            <p:nvSpPr>
+              <p:cNvPr id="52" name="Line 13">
+                <a:extLst>
+                  <a:ext uri="{FF2B5EF4-FFF2-40B4-BE49-F238E27FC236}">
+                    <a16:creationId xmlns:a16="http://schemas.microsoft.com/office/drawing/2014/main" id="{BC920FB6-1664-C322-4ED8-C34825C6CB41}"/>
+                  </a:ext>
+                </a:extLst>
+              </p:cNvPr>
+              <p:cNvSpPr>
+                <a:spLocks noChangeShapeType="1"/>
+              </p:cNvSpPr>
+              <p:nvPr/>
+            </p:nvSpPr>
+            <p:spPr bwMode="auto">
+              <a:xfrm>
+                <a:off x="1372" y="2774"/>
+                <a:ext cx="173" cy="0"/>
+              </a:xfrm>
+              <a:prstGeom prst="line">
+                <a:avLst/>
+              </a:prstGeom>
+              <a:noFill/>
+              <a:ln w="9525">
+                <a:solidFill>
+                  <a:schemeClr val="tx1"/>
+                </a:solidFill>
+                <a:round/>
+                <a:headEnd/>
+                <a:tailEnd/>
+              </a:ln>
+            </p:spPr>
+            <p:txBody>
+              <a:bodyPr wrap="none" lIns="92075" tIns="46038" rIns="92075" bIns="46038" anchor="ctr"/>
+              <a:lstStyle/>
+              <a:p>
+                <a:endParaRPr lang="en-US"/>
+              </a:p>
+            </p:txBody>
+          </p:sp>
+        </p:grpSp>
+        <p:sp>
+          <p:nvSpPr>
+            <p:cNvPr id="4" name="Text Box 14">
+              <a:extLst>
+                <a:ext uri="{FF2B5EF4-FFF2-40B4-BE49-F238E27FC236}">
+                  <a16:creationId xmlns:a16="http://schemas.microsoft.com/office/drawing/2014/main" id="{77F70C8E-DDAF-2120-DBC8-965DDFAE426D}"/>
+                </a:ext>
+              </a:extLst>
+            </p:cNvPr>
+            <p:cNvSpPr txBox="1">
+              <a:spLocks noChangeArrowheads="1"/>
+            </p:cNvSpPr>
+            <p:nvPr/>
+          </p:nvSpPr>
+          <p:spPr bwMode="auto">
+            <a:xfrm>
+              <a:off x="3341021" y="4233641"/>
+              <a:ext cx="544513" cy="320675"/>
+            </a:xfrm>
+            <a:prstGeom prst="rect">
+              <a:avLst/>
+            </a:prstGeom>
+            <a:noFill/>
+            <a:ln w="9525">
+              <a:noFill/>
+              <a:miter lim="800000"/>
+              <a:headEnd/>
+              <a:tailEnd/>
+            </a:ln>
+          </p:spPr>
+          <p:txBody>
+            <a:bodyPr wrap="none" lIns="92075" tIns="46038" rIns="92075" bIns="46038">
+              <a:spAutoFit/>
+            </a:bodyPr>
+            <a:lstStyle/>
+            <a:p>
+              <a:r>
+                <a:rPr lang="en-US" sz="1500" dirty="0"/>
+                <a:t>C++</a:t>
+              </a:r>
+            </a:p>
+          </p:txBody>
+        </p:sp>
+        <p:sp>
+          <p:nvSpPr>
+            <p:cNvPr id="5" name="Text Box 15">
+              <a:extLst>
+                <a:ext uri="{FF2B5EF4-FFF2-40B4-BE49-F238E27FC236}">
+                  <a16:creationId xmlns:a16="http://schemas.microsoft.com/office/drawing/2014/main" id="{3159C089-8E41-602A-CF4B-1B70E7F53636}"/>
+                </a:ext>
+              </a:extLst>
+            </p:cNvPr>
+            <p:cNvSpPr txBox="1">
+              <a:spLocks noChangeArrowheads="1"/>
+            </p:cNvSpPr>
+            <p:nvPr/>
+          </p:nvSpPr>
+          <p:spPr bwMode="auto">
+            <a:xfrm>
+              <a:off x="3114008" y="3873279"/>
+              <a:ext cx="995363" cy="320675"/>
+            </a:xfrm>
+            <a:prstGeom prst="rect">
+              <a:avLst/>
+            </a:prstGeom>
+            <a:noFill/>
+            <a:ln w="9525">
+              <a:noFill/>
+              <a:miter lim="800000"/>
+              <a:headEnd/>
+              <a:tailEnd/>
+            </a:ln>
+          </p:spPr>
+          <p:txBody>
+            <a:bodyPr wrap="none" lIns="92075" tIns="46038" rIns="92075" bIns="46038">
+              <a:spAutoFit/>
+            </a:bodyPr>
+            <a:lstStyle/>
+            <a:p>
+              <a:r>
+                <a:rPr lang="en-US" sz="1500" dirty="0"/>
+                <a:t>C++ </a:t>
+              </a:r>
+              <a:r>
+                <a:rPr lang="en-US" sz="1500" dirty="0">
+                  <a:sym typeface="Symbol" pitchFamily="18" charset="2"/>
+                </a:rPr>
+                <a:t> M</a:t>
+              </a:r>
+            </a:p>
+          </p:txBody>
+        </p:sp>
+        <p:grpSp>
+          <p:nvGrpSpPr>
+            <p:cNvPr id="6" name="Group 16">
+              <a:extLst>
+                <a:ext uri="{FF2B5EF4-FFF2-40B4-BE49-F238E27FC236}">
+                  <a16:creationId xmlns:a16="http://schemas.microsoft.com/office/drawing/2014/main" id="{2633CA0C-8BFC-CFE7-4060-A4D9E08E4648}"/>
+                </a:ext>
+              </a:extLst>
+            </p:cNvPr>
+            <p:cNvGrpSpPr>
+              <a:grpSpLocks/>
+            </p:cNvGrpSpPr>
+            <p:nvPr/>
+          </p:nvGrpSpPr>
+          <p:grpSpPr bwMode="auto">
+            <a:xfrm>
+              <a:off x="4069683" y="4217766"/>
               <a:ext cx="1462088" cy="730250"/>
               <a:chOff x="624" y="2544"/>
               <a:chExt cx="921" cy="460"/>
@@ -32444,7 +34360,13 @@
           </p:grpSpPr>
           <p:grpSp>
             <p:nvGrpSpPr>
-              <p:cNvPr id="33811" name="Group 29"/>
+              <p:cNvPr id="34" name="Group 17">
+                <a:extLst>
+                  <a:ext uri="{FF2B5EF4-FFF2-40B4-BE49-F238E27FC236}">
+                    <a16:creationId xmlns:a16="http://schemas.microsoft.com/office/drawing/2014/main" id="{8CE3A3B8-BD39-6C24-CE51-283064A4B587}"/>
+                  </a:ext>
+                </a:extLst>
+              </p:cNvPr>
               <p:cNvGrpSpPr>
                 <a:grpSpLocks/>
               </p:cNvGrpSpPr>
@@ -32460,7 +34382,13 @@
             </p:grpSpPr>
             <p:sp>
               <p:nvSpPr>
-                <p:cNvPr id="33814" name="Line 30"/>
+                <p:cNvPr id="37" name="Line 18">
+                  <a:extLst>
+                    <a:ext uri="{FF2B5EF4-FFF2-40B4-BE49-F238E27FC236}">
+                      <a16:creationId xmlns:a16="http://schemas.microsoft.com/office/drawing/2014/main" id="{567F6EEF-8C63-1E4D-AFD2-8E5779ED8A2D}"/>
+                    </a:ext>
+                  </a:extLst>
+                </p:cNvPr>
                 <p:cNvSpPr>
                   <a:spLocks noChangeShapeType="1"/>
                 </p:cNvSpPr>
@@ -32494,7 +34422,13 @@
             </p:sp>
             <p:sp>
               <p:nvSpPr>
-                <p:cNvPr id="33815" name="Line 31"/>
+                <p:cNvPr id="38" name="Line 19">
+                  <a:extLst>
+                    <a:ext uri="{FF2B5EF4-FFF2-40B4-BE49-F238E27FC236}">
+                      <a16:creationId xmlns:a16="http://schemas.microsoft.com/office/drawing/2014/main" id="{CDF1C351-7A38-BA22-FC1C-2F098A320B2C}"/>
+                    </a:ext>
+                  </a:extLst>
+                </p:cNvPr>
                 <p:cNvSpPr>
                   <a:spLocks noChangeShapeType="1"/>
                 </p:cNvSpPr>
@@ -32528,7 +34462,13 @@
             </p:sp>
             <p:sp>
               <p:nvSpPr>
-                <p:cNvPr id="33816" name="Line 32"/>
+                <p:cNvPr id="39" name="Line 20">
+                  <a:extLst>
+                    <a:ext uri="{FF2B5EF4-FFF2-40B4-BE49-F238E27FC236}">
+                      <a16:creationId xmlns:a16="http://schemas.microsoft.com/office/drawing/2014/main" id="{A50D955A-4EF5-4D58-2713-F51EECF59CD5}"/>
+                    </a:ext>
+                  </a:extLst>
+                </p:cNvPr>
                 <p:cNvSpPr>
                   <a:spLocks noChangeShapeType="1"/>
                 </p:cNvSpPr>
@@ -32562,7 +34502,13 @@
             </p:sp>
             <p:sp>
               <p:nvSpPr>
-                <p:cNvPr id="33817" name="Line 33"/>
+                <p:cNvPr id="40" name="Line 21">
+                  <a:extLst>
+                    <a:ext uri="{FF2B5EF4-FFF2-40B4-BE49-F238E27FC236}">
+                      <a16:creationId xmlns:a16="http://schemas.microsoft.com/office/drawing/2014/main" id="{19B2D072-5D2B-DD08-8334-B10093DEC2D4}"/>
+                    </a:ext>
+                  </a:extLst>
+                </p:cNvPr>
                 <p:cNvSpPr>
                   <a:spLocks noChangeShapeType="1"/>
                 </p:cNvSpPr>
@@ -32596,7 +34542,13 @@
             </p:sp>
             <p:sp>
               <p:nvSpPr>
-                <p:cNvPr id="33818" name="Line 34"/>
+                <p:cNvPr id="41" name="Line 22">
+                  <a:extLst>
+                    <a:ext uri="{FF2B5EF4-FFF2-40B4-BE49-F238E27FC236}">
+                      <a16:creationId xmlns:a16="http://schemas.microsoft.com/office/drawing/2014/main" id="{3C42146A-25F0-88D6-4F7C-1F57C68154F2}"/>
+                    </a:ext>
+                  </a:extLst>
+                </p:cNvPr>
                 <p:cNvSpPr>
                   <a:spLocks noChangeShapeType="1"/>
                 </p:cNvSpPr>
@@ -32630,7 +34582,13 @@
             </p:sp>
             <p:sp>
               <p:nvSpPr>
-                <p:cNvPr id="33819" name="Line 35"/>
+                <p:cNvPr id="42" name="Line 23">
+                  <a:extLst>
+                    <a:ext uri="{FF2B5EF4-FFF2-40B4-BE49-F238E27FC236}">
+                      <a16:creationId xmlns:a16="http://schemas.microsoft.com/office/drawing/2014/main" id="{EBDFBFFF-3289-435B-E5FE-CB066FBE4CF3}"/>
+                    </a:ext>
+                  </a:extLst>
+                </p:cNvPr>
                 <p:cNvSpPr>
                   <a:spLocks noChangeShapeType="1"/>
                 </p:cNvSpPr>
@@ -32664,7 +34622,13 @@
             </p:sp>
             <p:sp>
               <p:nvSpPr>
-                <p:cNvPr id="33820" name="Line 36"/>
+                <p:cNvPr id="43" name="Line 24">
+                  <a:extLst>
+                    <a:ext uri="{FF2B5EF4-FFF2-40B4-BE49-F238E27FC236}">
+                      <a16:creationId xmlns:a16="http://schemas.microsoft.com/office/drawing/2014/main" id="{FDC65D4C-96FD-5951-576A-4BEE152B65C7}"/>
+                    </a:ext>
+                  </a:extLst>
+                </p:cNvPr>
                 <p:cNvSpPr>
                   <a:spLocks noChangeShapeType="1"/>
                 </p:cNvSpPr>
@@ -32698,7 +34662,13 @@
             </p:sp>
             <p:sp>
               <p:nvSpPr>
-                <p:cNvPr id="33821" name="Line 37"/>
+                <p:cNvPr id="44" name="Line 25">
+                  <a:extLst>
+                    <a:ext uri="{FF2B5EF4-FFF2-40B4-BE49-F238E27FC236}">
+                      <a16:creationId xmlns:a16="http://schemas.microsoft.com/office/drawing/2014/main" id="{9413CFB6-44F3-5849-0C84-FE7E8EE4D40F}"/>
+                    </a:ext>
+                  </a:extLst>
+                </p:cNvPr>
                 <p:cNvSpPr>
                   <a:spLocks noChangeShapeType="1"/>
                 </p:cNvSpPr>
@@ -32733,7 +34703,13 @@
           </p:grpSp>
           <p:sp>
             <p:nvSpPr>
-              <p:cNvPr id="33812" name="Text Box 38"/>
+              <p:cNvPr id="35" name="Text Box 26">
+                <a:extLst>
+                  <a:ext uri="{FF2B5EF4-FFF2-40B4-BE49-F238E27FC236}">
+                    <a16:creationId xmlns:a16="http://schemas.microsoft.com/office/drawing/2014/main" id="{401E4F01-5B1C-862D-4F1A-BC0DCA82819B}"/>
+                  </a:ext>
+                </a:extLst>
+              </p:cNvPr>
               <p:cNvSpPr txBox="1">
                 <a:spLocks noChangeArrowheads="1"/>
               </p:cNvSpPr>
@@ -32770,7 +34746,13 @@
           </p:sp>
           <p:sp>
             <p:nvSpPr>
-              <p:cNvPr id="33813" name="Text Box 39"/>
+              <p:cNvPr id="36" name="Text Box 27">
+                <a:extLst>
+                  <a:ext uri="{FF2B5EF4-FFF2-40B4-BE49-F238E27FC236}">
+                    <a16:creationId xmlns:a16="http://schemas.microsoft.com/office/drawing/2014/main" id="{89CB4F95-8069-83C9-8EFB-6C05535D1745}"/>
+                  </a:ext>
+                </a:extLst>
+              </p:cNvPr>
               <p:cNvSpPr txBox="1">
                 <a:spLocks noChangeArrowheads="1"/>
               </p:cNvSpPr>
@@ -32812,9 +34794,358 @@
             </p:txBody>
           </p:sp>
         </p:grpSp>
+        <p:grpSp>
+          <p:nvGrpSpPr>
+            <p:cNvPr id="7" name="Group 29">
+              <a:extLst>
+                <a:ext uri="{FF2B5EF4-FFF2-40B4-BE49-F238E27FC236}">
+                  <a16:creationId xmlns:a16="http://schemas.microsoft.com/office/drawing/2014/main" id="{D0F0664E-E695-BD05-4230-7385A45D5ECA}"/>
+                </a:ext>
+              </a:extLst>
+            </p:cNvPr>
+            <p:cNvGrpSpPr>
+              <a:grpSpLocks/>
+            </p:cNvGrpSpPr>
+            <p:nvPr/>
+          </p:nvGrpSpPr>
+          <p:grpSpPr bwMode="auto">
+            <a:xfrm>
+              <a:off x="5257133" y="3852641"/>
+              <a:ext cx="1462088" cy="730250"/>
+              <a:chOff x="624" y="2544"/>
+              <a:chExt cx="921" cy="460"/>
+            </a:xfrm>
+          </p:grpSpPr>
+          <p:sp>
+            <p:nvSpPr>
+              <p:cNvPr id="26" name="Line 30">
+                <a:extLst>
+                  <a:ext uri="{FF2B5EF4-FFF2-40B4-BE49-F238E27FC236}">
+                    <a16:creationId xmlns:a16="http://schemas.microsoft.com/office/drawing/2014/main" id="{CEBDE93A-F604-BB2D-35B7-429D7CAC28BB}"/>
+                  </a:ext>
+                </a:extLst>
+              </p:cNvPr>
+              <p:cNvSpPr>
+                <a:spLocks noChangeShapeType="1"/>
+              </p:cNvSpPr>
+              <p:nvPr/>
+            </p:nvSpPr>
+            <p:spPr bwMode="auto">
+              <a:xfrm>
+                <a:off x="624" y="2544"/>
+                <a:ext cx="921" cy="0"/>
+              </a:xfrm>
+              <a:prstGeom prst="line">
+                <a:avLst/>
+              </a:prstGeom>
+              <a:noFill/>
+              <a:ln w="9525">
+                <a:solidFill>
+                  <a:schemeClr val="tx1"/>
+                </a:solidFill>
+                <a:round/>
+                <a:headEnd/>
+                <a:tailEnd/>
+              </a:ln>
+            </p:spPr>
+            <p:txBody>
+              <a:bodyPr wrap="none" lIns="92075" tIns="46038" rIns="92075" bIns="46038" anchor="ctr"/>
+              <a:lstStyle/>
+              <a:p>
+                <a:endParaRPr lang="en-US"/>
+              </a:p>
+            </p:txBody>
+          </p:sp>
+          <p:sp>
+            <p:nvSpPr>
+              <p:cNvPr id="27" name="Line 31">
+                <a:extLst>
+                  <a:ext uri="{FF2B5EF4-FFF2-40B4-BE49-F238E27FC236}">
+                    <a16:creationId xmlns:a16="http://schemas.microsoft.com/office/drawing/2014/main" id="{08772C5C-2B22-0CE5-BA6A-5A3EBA1C580B}"/>
+                  </a:ext>
+                </a:extLst>
+              </p:cNvPr>
+              <p:cNvSpPr>
+                <a:spLocks noChangeShapeType="1"/>
+              </p:cNvSpPr>
+              <p:nvPr/>
+            </p:nvSpPr>
+            <p:spPr bwMode="auto">
+              <a:xfrm>
+                <a:off x="797" y="3004"/>
+                <a:ext cx="576" cy="0"/>
+              </a:xfrm>
+              <a:prstGeom prst="line">
+                <a:avLst/>
+              </a:prstGeom>
+              <a:noFill/>
+              <a:ln w="9525">
+                <a:solidFill>
+                  <a:schemeClr val="tx1"/>
+                </a:solidFill>
+                <a:round/>
+                <a:headEnd/>
+                <a:tailEnd/>
+              </a:ln>
+            </p:spPr>
+            <p:txBody>
+              <a:bodyPr wrap="none" lIns="92075" tIns="46038" rIns="92075" bIns="46038" anchor="ctr"/>
+              <a:lstStyle/>
+              <a:p>
+                <a:endParaRPr lang="en-US"/>
+              </a:p>
+            </p:txBody>
+          </p:sp>
+          <p:sp>
+            <p:nvSpPr>
+              <p:cNvPr id="28" name="Line 32">
+                <a:extLst>
+                  <a:ext uri="{FF2B5EF4-FFF2-40B4-BE49-F238E27FC236}">
+                    <a16:creationId xmlns:a16="http://schemas.microsoft.com/office/drawing/2014/main" id="{F4E9E950-DD10-885B-C22F-E4944212CB79}"/>
+                  </a:ext>
+                </a:extLst>
+              </p:cNvPr>
+              <p:cNvSpPr>
+                <a:spLocks noChangeShapeType="1"/>
+              </p:cNvSpPr>
+              <p:nvPr/>
+            </p:nvSpPr>
+            <p:spPr bwMode="auto">
+              <a:xfrm>
+                <a:off x="625" y="2544"/>
+                <a:ext cx="0" cy="230"/>
+              </a:xfrm>
+              <a:prstGeom prst="line">
+                <a:avLst/>
+              </a:prstGeom>
+              <a:noFill/>
+              <a:ln w="9525">
+                <a:solidFill>
+                  <a:schemeClr val="tx1"/>
+                </a:solidFill>
+                <a:round/>
+                <a:headEnd/>
+                <a:tailEnd/>
+              </a:ln>
+            </p:spPr>
+            <p:txBody>
+              <a:bodyPr wrap="none" lIns="92075" tIns="46038" rIns="92075" bIns="46038" anchor="ctr"/>
+              <a:lstStyle/>
+              <a:p>
+                <a:endParaRPr lang="en-US"/>
+              </a:p>
+            </p:txBody>
+          </p:sp>
+          <p:sp>
+            <p:nvSpPr>
+              <p:cNvPr id="29" name="Line 33">
+                <a:extLst>
+                  <a:ext uri="{FF2B5EF4-FFF2-40B4-BE49-F238E27FC236}">
+                    <a16:creationId xmlns:a16="http://schemas.microsoft.com/office/drawing/2014/main" id="{762554EA-9B83-D32B-B3E3-379593AFDB1B}"/>
+                  </a:ext>
+                </a:extLst>
+              </p:cNvPr>
+              <p:cNvSpPr>
+                <a:spLocks noChangeShapeType="1"/>
+              </p:cNvSpPr>
+              <p:nvPr/>
+            </p:nvSpPr>
+            <p:spPr bwMode="auto">
+              <a:xfrm>
+                <a:off x="1545" y="2544"/>
+                <a:ext cx="0" cy="230"/>
+              </a:xfrm>
+              <a:prstGeom prst="line">
+                <a:avLst/>
+              </a:prstGeom>
+              <a:noFill/>
+              <a:ln w="9525">
+                <a:solidFill>
+                  <a:schemeClr val="tx1"/>
+                </a:solidFill>
+                <a:round/>
+                <a:headEnd/>
+                <a:tailEnd/>
+              </a:ln>
+            </p:spPr>
+            <p:txBody>
+              <a:bodyPr wrap="none" lIns="92075" tIns="46038" rIns="92075" bIns="46038" anchor="ctr"/>
+              <a:lstStyle/>
+              <a:p>
+                <a:endParaRPr lang="en-US"/>
+              </a:p>
+            </p:txBody>
+          </p:sp>
+          <p:sp>
+            <p:nvSpPr>
+              <p:cNvPr id="30" name="Line 34">
+                <a:extLst>
+                  <a:ext uri="{FF2B5EF4-FFF2-40B4-BE49-F238E27FC236}">
+                    <a16:creationId xmlns:a16="http://schemas.microsoft.com/office/drawing/2014/main" id="{08AA4874-FAF0-4A5C-B579-A1F6FBC226C9}"/>
+                  </a:ext>
+                </a:extLst>
+              </p:cNvPr>
+              <p:cNvSpPr>
+                <a:spLocks noChangeShapeType="1"/>
+              </p:cNvSpPr>
+              <p:nvPr/>
+            </p:nvSpPr>
+            <p:spPr bwMode="auto">
+              <a:xfrm>
+                <a:off x="797" y="2774"/>
+                <a:ext cx="0" cy="230"/>
+              </a:xfrm>
+              <a:prstGeom prst="line">
+                <a:avLst/>
+              </a:prstGeom>
+              <a:noFill/>
+              <a:ln w="9525">
+                <a:solidFill>
+                  <a:schemeClr val="tx1"/>
+                </a:solidFill>
+                <a:round/>
+                <a:headEnd/>
+                <a:tailEnd/>
+              </a:ln>
+            </p:spPr>
+            <p:txBody>
+              <a:bodyPr wrap="none" lIns="92075" tIns="46038" rIns="92075" bIns="46038" anchor="ctr"/>
+              <a:lstStyle/>
+              <a:p>
+                <a:endParaRPr lang="en-US"/>
+              </a:p>
+            </p:txBody>
+          </p:sp>
+          <p:sp>
+            <p:nvSpPr>
+              <p:cNvPr id="31" name="Line 35">
+                <a:extLst>
+                  <a:ext uri="{FF2B5EF4-FFF2-40B4-BE49-F238E27FC236}">
+                    <a16:creationId xmlns:a16="http://schemas.microsoft.com/office/drawing/2014/main" id="{66049B3B-CC03-3779-75EC-D92C00A29E92}"/>
+                  </a:ext>
+                </a:extLst>
+              </p:cNvPr>
+              <p:cNvSpPr>
+                <a:spLocks noChangeShapeType="1"/>
+              </p:cNvSpPr>
+              <p:nvPr/>
+            </p:nvSpPr>
+            <p:spPr bwMode="auto">
+              <a:xfrm>
+                <a:off x="1373" y="2774"/>
+                <a:ext cx="0" cy="230"/>
+              </a:xfrm>
+              <a:prstGeom prst="line">
+                <a:avLst/>
+              </a:prstGeom>
+              <a:noFill/>
+              <a:ln w="9525">
+                <a:solidFill>
+                  <a:schemeClr val="tx1"/>
+                </a:solidFill>
+                <a:round/>
+                <a:headEnd/>
+                <a:tailEnd/>
+              </a:ln>
+            </p:spPr>
+            <p:txBody>
+              <a:bodyPr wrap="none" lIns="92075" tIns="46038" rIns="92075" bIns="46038" anchor="ctr"/>
+              <a:lstStyle/>
+              <a:p>
+                <a:endParaRPr lang="en-US"/>
+              </a:p>
+            </p:txBody>
+          </p:sp>
+          <p:sp>
+            <p:nvSpPr>
+              <p:cNvPr id="32" name="Line 36">
+                <a:extLst>
+                  <a:ext uri="{FF2B5EF4-FFF2-40B4-BE49-F238E27FC236}">
+                    <a16:creationId xmlns:a16="http://schemas.microsoft.com/office/drawing/2014/main" id="{9BD43488-7975-E703-B81D-FE7C6925E7AC}"/>
+                  </a:ext>
+                </a:extLst>
+              </p:cNvPr>
+              <p:cNvSpPr>
+                <a:spLocks noChangeShapeType="1"/>
+              </p:cNvSpPr>
+              <p:nvPr/>
+            </p:nvSpPr>
+            <p:spPr bwMode="auto">
+              <a:xfrm>
+                <a:off x="624" y="2774"/>
+                <a:ext cx="173" cy="0"/>
+              </a:xfrm>
+              <a:prstGeom prst="line">
+                <a:avLst/>
+              </a:prstGeom>
+              <a:noFill/>
+              <a:ln w="9525">
+                <a:solidFill>
+                  <a:schemeClr val="tx1"/>
+                </a:solidFill>
+                <a:round/>
+                <a:headEnd/>
+                <a:tailEnd/>
+              </a:ln>
+            </p:spPr>
+            <p:txBody>
+              <a:bodyPr wrap="none" lIns="92075" tIns="46038" rIns="92075" bIns="46038" anchor="ctr"/>
+              <a:lstStyle/>
+              <a:p>
+                <a:endParaRPr lang="en-US"/>
+              </a:p>
+            </p:txBody>
+          </p:sp>
+          <p:sp>
+            <p:nvSpPr>
+              <p:cNvPr id="33" name="Line 37">
+                <a:extLst>
+                  <a:ext uri="{FF2B5EF4-FFF2-40B4-BE49-F238E27FC236}">
+                    <a16:creationId xmlns:a16="http://schemas.microsoft.com/office/drawing/2014/main" id="{D93AB447-7F14-FB26-95D6-81B0ACBA4249}"/>
+                  </a:ext>
+                </a:extLst>
+              </p:cNvPr>
+              <p:cNvSpPr>
+                <a:spLocks noChangeShapeType="1"/>
+              </p:cNvSpPr>
+              <p:nvPr/>
+            </p:nvSpPr>
+            <p:spPr bwMode="auto">
+              <a:xfrm>
+                <a:off x="1372" y="2774"/>
+                <a:ext cx="173" cy="0"/>
+              </a:xfrm>
+              <a:prstGeom prst="line">
+                <a:avLst/>
+              </a:prstGeom>
+              <a:noFill/>
+              <a:ln w="9525">
+                <a:solidFill>
+                  <a:schemeClr val="tx1"/>
+                </a:solidFill>
+                <a:round/>
+                <a:headEnd/>
+                <a:tailEnd/>
+              </a:ln>
+            </p:spPr>
+            <p:txBody>
+              <a:bodyPr wrap="none" lIns="92075" tIns="46038" rIns="92075" bIns="46038" anchor="ctr"/>
+              <a:lstStyle/>
+              <a:p>
+                <a:endParaRPr lang="en-US"/>
+              </a:p>
+            </p:txBody>
+          </p:sp>
+        </p:grpSp>
         <p:sp>
           <p:nvSpPr>
-            <p:cNvPr id="33801" name="Text Box 40"/>
+            <p:cNvPr id="8" name="Text Box 38">
+              <a:extLst>
+                <a:ext uri="{FF2B5EF4-FFF2-40B4-BE49-F238E27FC236}">
+                  <a16:creationId xmlns:a16="http://schemas.microsoft.com/office/drawing/2014/main" id="{43FD8C39-0717-633B-77F8-5AAAC9AE1877}"/>
+                </a:ext>
+              </a:extLst>
+            </p:cNvPr>
             <p:cNvSpPr txBox="1">
               <a:spLocks noChangeArrowheads="1"/>
             </p:cNvSpPr>
@@ -32822,8 +35153,8 @@
           </p:nvSpPr>
           <p:spPr bwMode="auto">
             <a:xfrm>
-              <a:off x="1371468" y="4783526"/>
-              <a:ext cx="2028439" cy="646973"/>
+              <a:off x="5815933" y="4233641"/>
+              <a:ext cx="342900" cy="320675"/>
             </a:xfrm>
             <a:prstGeom prst="rect">
               <a:avLst/>
@@ -32843,21 +35174,21 @@
             <a:lstStyle/>
             <a:p>
               <a:r>
-                <a:rPr lang="en-US" sz="1800" dirty="0"/>
-                <a:t>Rewritten to</a:t>
-              </a:r>
-            </a:p>
-            <a:p>
-              <a:r>
-                <a:rPr lang="en-US" sz="1800" dirty="0"/>
-                <a:t>improve efficiency</a:t>
+                <a:rPr lang="en-US" sz="1500"/>
+                <a:t>M</a:t>
               </a:r>
             </a:p>
           </p:txBody>
         </p:sp>
         <p:sp>
           <p:nvSpPr>
-            <p:cNvPr id="33802" name="Text Box 42"/>
+            <p:cNvPr id="9" name="Text Box 39">
+              <a:extLst>
+                <a:ext uri="{FF2B5EF4-FFF2-40B4-BE49-F238E27FC236}">
+                  <a16:creationId xmlns:a16="http://schemas.microsoft.com/office/drawing/2014/main" id="{0247247A-CAB8-C461-A712-F77CA44DDE4F}"/>
+                </a:ext>
+              </a:extLst>
+            </p:cNvPr>
             <p:cNvSpPr txBox="1">
               <a:spLocks noChangeArrowheads="1"/>
             </p:cNvSpPr>
@@ -32865,8 +35196,8 @@
           </p:nvSpPr>
           <p:spPr bwMode="auto">
             <a:xfrm>
-              <a:off x="5587222" y="4705738"/>
-              <a:ext cx="3080074" cy="1477970"/>
+              <a:off x="5488908" y="3873279"/>
+              <a:ext cx="995363" cy="320675"/>
             </a:xfrm>
             <a:prstGeom prst="rect">
               <a:avLst/>
@@ -32885,45 +35216,28 @@
             </a:bodyPr>
             <a:lstStyle/>
             <a:p>
-              <a:pPr algn="l"/>
               <a:r>
-                <a:rPr lang="en-US" sz="1800" dirty="0"/>
-                <a:t>This version generates</a:t>
+                <a:rPr lang="en-US" sz="1500" dirty="0"/>
+                <a:t>C++ </a:t>
               </a:r>
-            </a:p>
-            <a:p>
-              <a:pPr algn="l"/>
               <a:r>
-                <a:rPr lang="en-US" sz="1800" dirty="0"/>
-                <a:t>more efficient code than</a:t>
-              </a:r>
-            </a:p>
-            <a:p>
-              <a:pPr algn="l"/>
-              <a:r>
-                <a:rPr lang="en-US" sz="1800" dirty="0"/>
-                <a:t>this version.  Use it to</a:t>
-              </a:r>
-            </a:p>
-            <a:p>
-              <a:pPr algn="l"/>
-              <a:r>
-                <a:rPr lang="en-US" sz="1800" dirty="0"/>
-                <a:t>recompile the C++ version</a:t>
-              </a:r>
-            </a:p>
-            <a:p>
-              <a:pPr algn="l"/>
-              <a:r>
-                <a:rPr lang="en-US" sz="1800" dirty="0"/>
-                <a:t>for a more efficient compiler.</a:t>
+                <a:rPr lang="en-US" sz="1500" dirty="0">
+                  <a:sym typeface="Symbol" pitchFamily="18" charset="2"/>
+                </a:rPr>
+                <a:t> M</a:t>
               </a:r>
             </a:p>
           </p:txBody>
         </p:sp>
         <p:sp>
           <p:nvSpPr>
-            <p:cNvPr id="33804" name="AutoShape 44"/>
+            <p:cNvPr id="11" name="AutoShape 44">
+              <a:extLst>
+                <a:ext uri="{FF2B5EF4-FFF2-40B4-BE49-F238E27FC236}">
+                  <a16:creationId xmlns:a16="http://schemas.microsoft.com/office/drawing/2014/main" id="{F714D72E-9EB4-C39A-F8DF-FB6DE64A84B8}"/>
+                </a:ext>
+              </a:extLst>
+            </p:cNvPr>
             <p:cNvSpPr>
               <a:spLocks noChangeArrowheads="1"/>
             </p:cNvSpPr>
@@ -32931,8 +35245,8 @@
           </p:nvSpPr>
           <p:spPr bwMode="auto">
             <a:xfrm>
-              <a:off x="3012750" y="4356488"/>
-              <a:ext cx="92075" cy="92075"/>
+              <a:off x="3161991" y="4316734"/>
+              <a:ext cx="182880" cy="182880"/>
             </a:xfrm>
             <a:prstGeom prst="diamond">
               <a:avLst/>
@@ -32955,7 +35269,13 @@
         </p:sp>
         <p:sp>
           <p:nvSpPr>
-            <p:cNvPr id="33805" name="AutoShape 45"/>
+            <p:cNvPr id="12" name="AutoShape 45">
+              <a:extLst>
+                <a:ext uri="{FF2B5EF4-FFF2-40B4-BE49-F238E27FC236}">
+                  <a16:creationId xmlns:a16="http://schemas.microsoft.com/office/drawing/2014/main" id="{1C852EC7-B4C1-3842-BCA6-54DCF391193E}"/>
+                </a:ext>
+              </a:extLst>
+            </p:cNvPr>
             <p:cNvSpPr>
               <a:spLocks noChangeArrowheads="1"/>
             </p:cNvSpPr>
@@ -32963,8 +35283,8 @@
           </p:nvSpPr>
           <p:spPr bwMode="auto">
             <a:xfrm>
-              <a:off x="5374950" y="4356488"/>
-              <a:ext cx="92075" cy="92075"/>
+              <a:off x="6269276" y="4316734"/>
+              <a:ext cx="182880" cy="182880"/>
             </a:xfrm>
             <a:prstGeom prst="diamond">
               <a:avLst/>
@@ -32987,142 +35307,24 @@
         </p:sp>
         <p:cxnSp>
           <p:nvCxnSpPr>
-            <p:cNvPr id="33806" name="AutoShape 46"/>
+            <p:cNvPr id="15" name="AutoShape 51">
+              <a:extLst>
+                <a:ext uri="{FF2B5EF4-FFF2-40B4-BE49-F238E27FC236}">
+                  <a16:creationId xmlns:a16="http://schemas.microsoft.com/office/drawing/2014/main" id="{57FA5D37-5C91-D471-694E-A5FD8E7BA955}"/>
+                </a:ext>
+              </a:extLst>
+            </p:cNvPr>
             <p:cNvCxnSpPr>
               <a:cxnSpLocks noChangeShapeType="1"/>
-              <a:stCxn id="33801" idx="0"/>
-              <a:endCxn id="33804" idx="2"/>
-            </p:cNvCxnSpPr>
-            <p:nvPr/>
-          </p:nvCxnSpPr>
-          <p:spPr bwMode="auto">
-            <a:xfrm rot="5400000" flipH="1" flipV="1">
-              <a:off x="2554757" y="4279495"/>
-              <a:ext cx="334963" cy="673100"/>
-            </a:xfrm>
-            <a:prstGeom prst="bentConnector3">
-              <a:avLst>
-                <a:gd name="adj1" fmla="val 50000"/>
-              </a:avLst>
-            </a:prstGeom>
-            <a:noFill/>
-            <a:ln w="9525">
-              <a:solidFill>
-                <a:schemeClr val="tx1"/>
-              </a:solidFill>
-              <a:miter lim="800000"/>
-              <a:headEnd/>
-              <a:tailEnd type="triangle" w="med" len="med"/>
-            </a:ln>
-          </p:spPr>
-        </p:cxnSp>
-        <p:cxnSp>
-          <p:nvCxnSpPr>
-            <p:cNvPr id="33807" name="AutoShape 48"/>
-            <p:cNvCxnSpPr>
-              <a:cxnSpLocks noChangeShapeType="1"/>
-              <a:stCxn id="3" idx="1"/>
-              <a:endCxn id="33805" idx="2"/>
+              <a:stCxn id="24" idx="1"/>
+              <a:endCxn id="18" idx="3"/>
             </p:cNvCxnSpPr>
             <p:nvPr/>
           </p:nvCxnSpPr>
           <p:spPr bwMode="auto">
             <a:xfrm rot="10800000">
-              <a:off x="5420988" y="4448564"/>
-              <a:ext cx="187332" cy="456923"/>
-            </a:xfrm>
-            <a:prstGeom prst="bentConnector2">
-              <a:avLst/>
-            </a:prstGeom>
-            <a:noFill/>
-            <a:ln w="9525">
-              <a:solidFill>
-                <a:schemeClr val="tx1"/>
-              </a:solidFill>
-              <a:miter lim="800000"/>
-              <a:headEnd/>
-              <a:tailEnd type="triangle" w="med" len="med"/>
-            </a:ln>
-          </p:spPr>
-        </p:cxnSp>
-        <p:sp>
-          <p:nvSpPr>
-            <p:cNvPr id="33808" name="AutoShape 49"/>
-            <p:cNvSpPr>
-              <a:spLocks noChangeArrowheads="1"/>
-            </p:cNvSpPr>
-            <p:nvPr/>
-          </p:nvSpPr>
-          <p:spPr bwMode="auto">
-            <a:xfrm>
-              <a:off x="5638708" y="4899334"/>
-              <a:ext cx="92075" cy="92075"/>
-            </a:xfrm>
-            <a:prstGeom prst="diamond">
-              <a:avLst/>
-            </a:prstGeom>
-            <a:noFill/>
-            <a:ln w="9525">
-              <a:noFill/>
-              <a:miter lim="800000"/>
-              <a:headEnd/>
-              <a:tailEnd/>
-            </a:ln>
-          </p:spPr>
-          <p:txBody>
-            <a:bodyPr wrap="none" lIns="92075" tIns="46038" rIns="92075" bIns="46038" anchor="ctr"/>
-            <a:lstStyle/>
-            <a:p>
-              <a:endParaRPr lang="en-US"/>
-            </a:p>
-          </p:txBody>
-        </p:sp>
-        <p:sp>
-          <p:nvSpPr>
-            <p:cNvPr id="33809" name="AutoShape 50"/>
-            <p:cNvSpPr>
-              <a:spLocks noChangeArrowheads="1"/>
-            </p:cNvSpPr>
-            <p:nvPr/>
-          </p:nvSpPr>
-          <p:spPr bwMode="auto">
-            <a:xfrm>
-              <a:off x="5617610" y="5467738"/>
-              <a:ext cx="92075" cy="92075"/>
-            </a:xfrm>
-            <a:prstGeom prst="diamond">
-              <a:avLst/>
-            </a:prstGeom>
-            <a:noFill/>
-            <a:ln w="9525">
-              <a:noFill/>
-              <a:miter lim="800000"/>
-              <a:headEnd/>
-              <a:tailEnd/>
-            </a:ln>
-          </p:spPr>
-          <p:txBody>
-            <a:bodyPr wrap="none" lIns="92075" tIns="46038" rIns="92075" bIns="46038" anchor="ctr"/>
-            <a:lstStyle/>
-            <a:p>
-              <a:endParaRPr lang="en-US"/>
-            </a:p>
-          </p:txBody>
-        </p:sp>
-        <p:cxnSp>
-          <p:nvCxnSpPr>
-            <p:cNvPr id="33810" name="AutoShape 51"/>
-            <p:cNvCxnSpPr>
-              <a:cxnSpLocks noChangeShapeType="1"/>
-              <a:stCxn id="33809" idx="1"/>
-              <a:endCxn id="65" idx="3"/>
-            </p:cNvCxnSpPr>
-            <p:nvPr/>
-          </p:nvCxnSpPr>
-          <p:spPr bwMode="auto">
-            <a:xfrm rot="10800000">
-              <a:off x="4702758" y="4623040"/>
-              <a:ext cx="914852" cy="890736"/>
+              <a:off x="5255347" y="4779573"/>
+              <a:ext cx="710004" cy="874469"/>
             </a:xfrm>
             <a:prstGeom prst="bentConnector3">
               <a:avLst>
@@ -33142,7 +35344,13 @@
         </p:cxnSp>
         <p:sp>
           <p:nvSpPr>
-            <p:cNvPr id="61" name="Text Box 41"/>
+            <p:cNvPr id="16" name="Text Box 41">
+              <a:extLst>
+                <a:ext uri="{FF2B5EF4-FFF2-40B4-BE49-F238E27FC236}">
+                  <a16:creationId xmlns:a16="http://schemas.microsoft.com/office/drawing/2014/main" id="{8521F960-C99D-6314-81D1-6316C29EFBCB}"/>
+                </a:ext>
+              </a:extLst>
+            </p:cNvPr>
             <p:cNvSpPr txBox="1">
               <a:spLocks noChangeArrowheads="1"/>
             </p:cNvSpPr>
@@ -33150,8 +35358,8 @@
           </p:nvSpPr>
           <p:spPr bwMode="auto">
             <a:xfrm>
-              <a:off x="1676441" y="5558353"/>
-              <a:ext cx="1904367" cy="646973"/>
+              <a:off x="1752600" y="5033529"/>
+              <a:ext cx="1930016" cy="646973"/>
             </a:xfrm>
             <a:prstGeom prst="rect">
               <a:avLst/>
@@ -33172,34 +35380,42 @@
             <a:p>
               <a:r>
                 <a:rPr lang="en-US" sz="1800" dirty="0"/>
-                <a:t>Compile it using</a:t>
+                <a:t>Recompile using</a:t>
               </a:r>
             </a:p>
             <a:p>
               <a:r>
                 <a:rPr lang="en-US" sz="1800" dirty="0"/>
-                <a:t>existing compiler</a:t>
+                <a:t>the new compiler</a:t>
               </a:r>
             </a:p>
           </p:txBody>
         </p:sp>
         <p:cxnSp>
           <p:nvCxnSpPr>
-            <p:cNvPr id="62" name="AutoShape 47"/>
+            <p:cNvPr id="17" name="AutoShape 47">
+              <a:extLst>
+                <a:ext uri="{FF2B5EF4-FFF2-40B4-BE49-F238E27FC236}">
+                  <a16:creationId xmlns:a16="http://schemas.microsoft.com/office/drawing/2014/main" id="{FEBA249C-AC85-FF1B-549E-87A0C0A1A9F9}"/>
+                </a:ext>
+              </a:extLst>
+            </p:cNvPr>
             <p:cNvCxnSpPr>
               <a:cxnSpLocks noChangeShapeType="1"/>
-              <a:stCxn id="61" idx="3"/>
-              <a:endCxn id="63" idx="2"/>
+              <a:stCxn id="16" idx="3"/>
+              <a:endCxn id="22" idx="1"/>
             </p:cNvCxnSpPr>
             <p:nvPr/>
           </p:nvCxnSpPr>
           <p:spPr bwMode="auto">
             <a:xfrm flipV="1">
-              <a:off x="3580808" y="5544424"/>
-              <a:ext cx="664976" cy="337416"/>
+              <a:off x="3682616" y="4779572"/>
+              <a:ext cx="667144" cy="577444"/>
             </a:xfrm>
-            <a:prstGeom prst="bentConnector2">
-              <a:avLst/>
+            <a:prstGeom prst="bentConnector3">
+              <a:avLst>
+                <a:gd name="adj1" fmla="val 50000"/>
+              </a:avLst>
             </a:prstGeom>
             <a:noFill/>
             <a:ln w="9525">
@@ -33214,7 +35430,13 @@
         </p:cxnSp>
         <p:sp>
           <p:nvSpPr>
-            <p:cNvPr id="65" name="AutoShape 49"/>
+            <p:cNvPr id="18" name="AutoShape 49">
+              <a:extLst>
+                <a:ext uri="{FF2B5EF4-FFF2-40B4-BE49-F238E27FC236}">
+                  <a16:creationId xmlns:a16="http://schemas.microsoft.com/office/drawing/2014/main" id="{F743D819-45F9-523B-8982-95D98DC8E07A}"/>
+                </a:ext>
+              </a:extLst>
+            </p:cNvPr>
             <p:cNvSpPr>
               <a:spLocks noChangeArrowheads="1"/>
             </p:cNvSpPr>
@@ -33222,8 +35444,8 @@
           </p:nvSpPr>
           <p:spPr bwMode="auto">
             <a:xfrm>
-              <a:off x="4610683" y="4577002"/>
-              <a:ext cx="92075" cy="92075"/>
+              <a:off x="5072467" y="4688132"/>
+              <a:ext cx="182880" cy="182880"/>
             </a:xfrm>
             <a:prstGeom prst="diamond">
               <a:avLst/>
@@ -33240,19 +35462,25 @@
             <a:bodyPr wrap="none" lIns="92075" tIns="46038" rIns="92075" bIns="46038" anchor="ctr"/>
             <a:lstStyle/>
             <a:p>
-              <a:endParaRPr lang="en-US"/>
+              <a:endParaRPr lang="en-US" dirty="0"/>
             </a:p>
           </p:txBody>
         </p:sp>
         <p:sp>
           <p:nvSpPr>
-            <p:cNvPr id="63" name="Flowchart: Off-page Connector 62"/>
+            <p:cNvPr id="19" name="Flowchart: Off-page Connector 18">
+              <a:extLst>
+                <a:ext uri="{FF2B5EF4-FFF2-40B4-BE49-F238E27FC236}">
+                  <a16:creationId xmlns:a16="http://schemas.microsoft.com/office/drawing/2014/main" id="{4195748F-9913-635F-E65B-DE3A7E3C1E97}"/>
+                </a:ext>
+              </a:extLst>
+            </p:cNvPr>
             <p:cNvSpPr/>
             <p:nvPr/>
           </p:nvSpPr>
           <p:spPr bwMode="auto">
             <a:xfrm>
-              <a:off x="3788584" y="4812904"/>
+              <a:off x="4343867" y="4947476"/>
               <a:ext cx="914400" cy="731520"/>
             </a:xfrm>
             <a:prstGeom prst="flowChartOffpageConnector">
@@ -33280,21 +35508,184 @@
             </a:p>
           </p:txBody>
         </p:sp>
-        <p:sp>
-          <p:nvSpPr>
-            <p:cNvPr id="3" name="Diamond 2">
+        <p:grpSp>
+          <p:nvGrpSpPr>
+            <p:cNvPr id="53" name="Group 52">
               <a:extLst>
                 <a:ext uri="{FF2B5EF4-FFF2-40B4-BE49-F238E27FC236}">
-                  <a16:creationId xmlns:a16="http://schemas.microsoft.com/office/drawing/2014/main" id="{F4A621D2-73FC-9B45-1311-B6708BB1332F}"/>
+                  <a16:creationId xmlns:a16="http://schemas.microsoft.com/office/drawing/2014/main" id="{CBD1E7E8-91E6-5706-8D18-FFC41C6FF968}"/>
                 </a:ext>
               </a:extLst>
             </p:cNvPr>
-            <p:cNvSpPr/>
+            <p:cNvGrpSpPr/>
+            <p:nvPr/>
+          </p:nvGrpSpPr>
+          <p:grpSpPr>
+            <a:xfrm>
+              <a:off x="5965351" y="4895029"/>
+              <a:ext cx="2297745" cy="1200971"/>
+              <a:chOff x="5965351" y="4895029"/>
+              <a:chExt cx="2297745" cy="1200971"/>
+            </a:xfrm>
+          </p:grpSpPr>
+          <p:sp>
+            <p:nvSpPr>
+              <p:cNvPr id="23" name="Text Box 42">
+                <a:extLst>
+                  <a:ext uri="{FF2B5EF4-FFF2-40B4-BE49-F238E27FC236}">
+                    <a16:creationId xmlns:a16="http://schemas.microsoft.com/office/drawing/2014/main" id="{6E2318B8-8A73-8DF3-4597-96856D7B6D08}"/>
+                  </a:ext>
+                </a:extLst>
+              </p:cNvPr>
+              <p:cNvSpPr txBox="1">
+                <a:spLocks noChangeArrowheads="1"/>
+              </p:cNvSpPr>
+              <p:nvPr/>
+            </p:nvSpPr>
+            <p:spPr bwMode="auto">
+              <a:xfrm>
+                <a:off x="5965351" y="4895029"/>
+                <a:ext cx="2297745" cy="1200971"/>
+              </a:xfrm>
+              <a:prstGeom prst="rect">
+                <a:avLst/>
+              </a:prstGeom>
+              <a:noFill/>
+              <a:ln w="9525">
+                <a:noFill/>
+                <a:miter lim="800000"/>
+                <a:headEnd/>
+                <a:tailEnd/>
+              </a:ln>
+            </p:spPr>
+            <p:txBody>
+              <a:bodyPr wrap="none" lIns="92075" tIns="46038" rIns="92075" bIns="46038">
+                <a:spAutoFit/>
+              </a:bodyPr>
+              <a:lstStyle/>
+              <a:p>
+                <a:pPr algn="l"/>
+                <a:r>
+                  <a:rPr lang="en-US" sz="1800" dirty="0"/>
+                  <a:t>This third version of</a:t>
+                </a:r>
+              </a:p>
+              <a:p>
+                <a:pPr algn="l"/>
+                <a:r>
+                  <a:rPr lang="en-US" sz="1800" dirty="0"/>
+                  <a:t>the compiler runs</a:t>
+                </a:r>
+              </a:p>
+              <a:p>
+                <a:pPr algn="l"/>
+                <a:r>
+                  <a:rPr lang="en-US" sz="1800" dirty="0"/>
+                  <a:t>more efficiently code</a:t>
+                </a:r>
+              </a:p>
+              <a:p>
+                <a:pPr algn="l"/>
+                <a:r>
+                  <a:rPr lang="en-US" sz="1800" dirty="0"/>
+                  <a:t>than this compiler.</a:t>
+                </a:r>
+              </a:p>
+            </p:txBody>
+          </p:sp>
+          <p:sp>
+            <p:nvSpPr>
+              <p:cNvPr id="24" name="AutoShape 50">
+                <a:extLst>
+                  <a:ext uri="{FF2B5EF4-FFF2-40B4-BE49-F238E27FC236}">
+                    <a16:creationId xmlns:a16="http://schemas.microsoft.com/office/drawing/2014/main" id="{38CC4776-63E4-E6A5-63E5-0A18C1B6E8F2}"/>
+                  </a:ext>
+                </a:extLst>
+              </p:cNvPr>
+              <p:cNvSpPr>
+                <a:spLocks noChangeArrowheads="1"/>
+              </p:cNvSpPr>
+              <p:nvPr/>
+            </p:nvSpPr>
+            <p:spPr bwMode="auto">
+              <a:xfrm>
+                <a:off x="5965351" y="5562600"/>
+                <a:ext cx="182880" cy="182881"/>
+              </a:xfrm>
+              <a:prstGeom prst="diamond">
+                <a:avLst/>
+              </a:prstGeom>
+              <a:noFill/>
+              <a:ln w="9525">
+                <a:noFill/>
+                <a:miter lim="800000"/>
+                <a:headEnd/>
+                <a:tailEnd/>
+              </a:ln>
+            </p:spPr>
+            <p:txBody>
+              <a:bodyPr wrap="none" lIns="92075" tIns="46038" rIns="92075" bIns="46038" anchor="ctr"/>
+              <a:lstStyle/>
+              <a:p>
+                <a:endParaRPr lang="en-US"/>
+              </a:p>
+            </p:txBody>
+          </p:sp>
+        </p:grpSp>
+        <p:cxnSp>
+          <p:nvCxnSpPr>
+            <p:cNvPr id="21" name="Straight Arrow Connector 32">
+              <a:extLst>
+                <a:ext uri="{FF2B5EF4-FFF2-40B4-BE49-F238E27FC236}">
+                  <a16:creationId xmlns:a16="http://schemas.microsoft.com/office/drawing/2014/main" id="{5EBE3B2F-1B73-517C-9A93-A18DC914F887}"/>
+                </a:ext>
+              </a:extLst>
+            </p:cNvPr>
+            <p:cNvCxnSpPr>
+              <a:cxnSpLocks/>
+              <a:stCxn id="23" idx="0"/>
+              <a:endCxn id="12" idx="3"/>
+            </p:cNvCxnSpPr>
+            <p:nvPr/>
+          </p:nvCxnSpPr>
+          <p:spPr bwMode="auto">
+            <a:xfrm rot="16200000" flipV="1">
+              <a:off x="6539763" y="4320568"/>
+              <a:ext cx="486855" cy="662068"/>
+            </a:xfrm>
+            <a:prstGeom prst="bentConnector2">
+              <a:avLst/>
+            </a:prstGeom>
+            <a:noFill/>
+            <a:ln w="9525" cap="flat" cmpd="sng" algn="ctr">
+              <a:solidFill>
+                <a:schemeClr val="tx1"/>
+              </a:solidFill>
+              <a:prstDash val="solid"/>
+              <a:round/>
+              <a:headEnd type="none" w="med" len="med"/>
+              <a:tailEnd type="triangle"/>
+            </a:ln>
+            <a:effectLst/>
+          </p:spPr>
+        </p:cxnSp>
+        <p:sp>
+          <p:nvSpPr>
+            <p:cNvPr id="22" name="AutoShape 44">
+              <a:extLst>
+                <a:ext uri="{FF2B5EF4-FFF2-40B4-BE49-F238E27FC236}">
+                  <a16:creationId xmlns:a16="http://schemas.microsoft.com/office/drawing/2014/main" id="{94E5560F-8E1F-E9B3-DE43-9A0B2B33238F}"/>
+                </a:ext>
+              </a:extLst>
+            </p:cNvPr>
+            <p:cNvSpPr>
+              <a:spLocks noChangeArrowheads="1"/>
+            </p:cNvSpPr>
             <p:nvPr/>
           </p:nvSpPr>
           <p:spPr bwMode="auto">
             <a:xfrm>
-              <a:off x="5608320" y="4814046"/>
+              <a:off x="4349760" y="4688132"/>
               <a:ext cx="182880" cy="182880"/>
             </a:xfrm>
             <a:prstGeom prst="diamond">
@@ -33303,22 +35694,26 @@
             <a:noFill/>
             <a:ln w="9525">
               <a:noFill/>
-              <a:round/>
+              <a:miter lim="800000"/>
               <a:headEnd/>
               <a:tailEnd/>
             </a:ln>
           </p:spPr>
           <p:txBody>
-            <a:bodyPr wrap="none" lIns="92075" tIns="46038" rIns="92075" bIns="46038" rtlCol="0" anchor="ctr"/>
+            <a:bodyPr wrap="none" lIns="92075" tIns="46038" rIns="92075" bIns="46038" anchor="ctr"/>
             <a:lstStyle/>
             <a:p>
-              <a:pPr algn="ctr"/>
               <a:endParaRPr lang="en-US"/>
             </a:p>
           </p:txBody>
         </p:sp>
       </p:grpSp>
     </p:spTree>
+    <p:extLst>
+      <p:ext uri="{BB962C8B-B14F-4D97-AF65-F5344CB8AC3E}">
+        <p14:creationId xmlns:p14="http://schemas.microsoft.com/office/powerpoint/2010/main" val="3013305682"/>
+      </p:ext>
+    </p:extLst>
   </p:cSld>
   <p:clrMapOvr>
     <a:masterClrMapping/>
@@ -33326,7 +35721,7 @@
 </p:sld>
 </file>
 
-<file path=ppt/slides/slide31.xml><?xml version="1.0" encoding="utf-8"?>
+<file path=ppt/slides/slide32.xml><?xml version="1.0" encoding="utf-8"?>
 <p:sld xmlns:a="http://schemas.openxmlformats.org/drawingml/2006/main" xmlns:r="http://schemas.openxmlformats.org/officeDocument/2006/relationships" xmlns:p="http://schemas.openxmlformats.org/presentationml/2006/main">
   <p:cSld>
     <p:spTree>
@@ -33391,7 +35786,7 @@
             <a:fld id="{380FA25E-8339-4B04-9CBA-5DFCC61268EA}" type="slidenum">
               <a:rPr lang="en-US" smtClean="0"/>
               <a:pPr/>
-              <a:t>31</a:t>
+              <a:t>32</a:t>
             </a:fld>
             <a:endParaRPr lang="en-US"/>
           </a:p>
@@ -33671,7 +36066,7 @@
 </p:sld>
 </file>
 
-<file path=ppt/slides/slide32.xml><?xml version="1.0" encoding="utf-8"?>
+<file path=ppt/slides/slide33.xml><?xml version="1.0" encoding="utf-8"?>
 <p:sld xmlns:a="http://schemas.openxmlformats.org/drawingml/2006/main" xmlns:r="http://schemas.openxmlformats.org/officeDocument/2006/relationships" xmlns:p="http://schemas.openxmlformats.org/presentationml/2006/main">
   <p:cSld>
     <p:spTree>
@@ -33736,7 +36131,7 @@
             <a:fld id="{664EEF59-2466-41B1-A25C-7DF9D683EC78}" type="slidenum">
               <a:rPr lang="en-US" smtClean="0"/>
               <a:pPr/>
-              <a:t>32</a:t>
+              <a:t>33</a:t>
             </a:fld>
             <a:endParaRPr lang="en-US"/>
           </a:p>
@@ -34555,7 +36950,7 @@
 </p:sld>
 </file>
 
-<file path=ppt/slides/slide33.xml><?xml version="1.0" encoding="utf-8"?>
+<file path=ppt/slides/slide34.xml><?xml version="1.0" encoding="utf-8"?>
 <p:sld xmlns:a="http://schemas.openxmlformats.org/drawingml/2006/main" xmlns:r="http://schemas.openxmlformats.org/officeDocument/2006/relationships" xmlns:p="http://schemas.openxmlformats.org/presentationml/2006/main">
   <p:cSld>
     <p:spTree>
@@ -34620,7 +37015,7 @@
             <a:fld id="{BA60C916-759F-41D1-AB4C-ACDEAA9E9251}" type="slidenum">
               <a:rPr lang="en-US" smtClean="0"/>
               <a:pPr/>
-              <a:t>33</a:t>
+              <a:t>34</a:t>
             </a:fld>
             <a:endParaRPr lang="en-US"/>
           </a:p>
@@ -36824,7 +39219,7 @@
 </p:sld>
 </file>
 
-<file path=ppt/slides/slide34.xml><?xml version="1.0" encoding="utf-8"?>
+<file path=ppt/slides/slide35.xml><?xml version="1.0" encoding="utf-8"?>
 <p:sld xmlns:a="http://schemas.openxmlformats.org/drawingml/2006/main" xmlns:r="http://schemas.openxmlformats.org/officeDocument/2006/relationships" xmlns:p="http://schemas.openxmlformats.org/presentationml/2006/main">
   <p:cSld>
     <p:spTree>
@@ -36889,7 +39284,7 @@
             <a:fld id="{7E969F8D-5909-4C9F-840E-A6F55F635B13}" type="slidenum">
               <a:rPr lang="en-US" smtClean="0"/>
               <a:pPr/>
-              <a:t>34</a:t>
+              <a:t>35</a:t>
             </a:fld>
             <a:endParaRPr lang="en-US"/>
           </a:p>
@@ -36978,7 +39373,7 @@
 </p:sld>
 </file>
 
-<file path=ppt/slides/slide35.xml><?xml version="1.0" encoding="utf-8"?>
+<file path=ppt/slides/slide36.xml><?xml version="1.0" encoding="utf-8"?>
 <p:sld xmlns:a="http://schemas.openxmlformats.org/drawingml/2006/main" xmlns:r="http://schemas.openxmlformats.org/officeDocument/2006/relationships" xmlns:p="http://schemas.openxmlformats.org/presentationml/2006/main">
   <p:cSld>
     <p:spTree>
@@ -37043,7 +39438,7 @@
             <a:fld id="{7E969F8D-5909-4C9F-840E-A6F55F635B13}" type="slidenum">
               <a:rPr lang="en-US" smtClean="0"/>
               <a:pPr/>
-              <a:t>35</a:t>
+              <a:t>36</a:t>
             </a:fld>
             <a:endParaRPr lang="en-US"/>
           </a:p>
@@ -38469,7 +40864,7 @@
 </p:sld>
 </file>
 
-<file path=ppt/slides/slide36.xml><?xml version="1.0" encoding="utf-8"?>
+<file path=ppt/slides/slide37.xml><?xml version="1.0" encoding="utf-8"?>
 <p:sld xmlns:a="http://schemas.openxmlformats.org/drawingml/2006/main" xmlns:r="http://schemas.openxmlformats.org/officeDocument/2006/relationships" xmlns:p="http://schemas.openxmlformats.org/presentationml/2006/main">
   <p:cSld>
     <p:spTree>
@@ -38534,7 +40929,7 @@
             <a:fld id="{D9553B3F-2640-4B19-8022-F68A61F7EE86}" type="slidenum">
               <a:rPr lang="en-US" smtClean="0"/>
               <a:pPr/>
-              <a:t>36</a:t>
+              <a:t>37</a:t>
             </a:fld>
             <a:endParaRPr lang="en-US"/>
           </a:p>
@@ -40925,7 +43320,7 @@
 </p:sld>
 </file>
 
-<file path=ppt/slides/slide37.xml><?xml version="1.0" encoding="utf-8"?>
+<file path=ppt/slides/slide38.xml><?xml version="1.0" encoding="utf-8"?>
 <p:sld xmlns:a="http://schemas.openxmlformats.org/drawingml/2006/main" xmlns:r="http://schemas.openxmlformats.org/officeDocument/2006/relationships" xmlns:p="http://schemas.openxmlformats.org/presentationml/2006/main">
   <p:cSld>
     <p:spTree>
@@ -40990,7 +43385,7 @@
             <a:fld id="{886EEF83-9573-4C6A-A1DA-4BBA5A4368E3}" type="slidenum">
               <a:rPr lang="en-US" smtClean="0"/>
               <a:pPr/>
-              <a:t>37</a:t>
+              <a:t>38</a:t>
             </a:fld>
             <a:endParaRPr lang="en-US"/>
           </a:p>

</xml_diff>

<commit_message>
minor change to one PowerPoint slide
</commit_message>
<xml_diff>
--- a/PowerPoints/01 - Overview of Compilers.pptx
+++ b/PowerPoints/01 - Overview of Compilers.pptx
@@ -33475,7 +33475,7 @@
           </p:nvSpPr>
           <p:spPr bwMode="auto">
             <a:xfrm>
-              <a:off x="3804107" y="2657662"/>
+              <a:off x="3804107" y="2661377"/>
               <a:ext cx="914400" cy="731520"/>
             </a:xfrm>
             <a:prstGeom prst="flowChartOffpageConnector">
@@ -35480,7 +35480,7 @@
           </p:nvSpPr>
           <p:spPr bwMode="auto">
             <a:xfrm>
-              <a:off x="4343867" y="4947476"/>
+              <a:off x="4343867" y="4953826"/>
               <a:ext cx="914400" cy="731520"/>
             </a:xfrm>
             <a:prstGeom prst="flowChartOffpageConnector">
@@ -39481,7 +39481,7 @@
         </p:nvGrpSpPr>
         <p:grpSpPr>
           <a:xfrm>
-            <a:off x="987655" y="1965324"/>
+            <a:off x="987655" y="1676400"/>
             <a:ext cx="7168690" cy="3063876"/>
             <a:chOff x="979166" y="1965324"/>
             <a:chExt cx="7168690" cy="3063876"/>
@@ -40851,6 +40851,67 @@
           </p:txBody>
         </p:sp>
       </p:grpSp>
+      <p:sp>
+        <p:nvSpPr>
+          <p:cNvPr id="3" name="TextBox 2">
+            <a:extLst>
+              <a:ext uri="{FF2B5EF4-FFF2-40B4-BE49-F238E27FC236}">
+                <a16:creationId xmlns:a16="http://schemas.microsoft.com/office/drawing/2014/main" id="{A0A1E149-935C-78DD-6080-614E1F4B9F51}"/>
+              </a:ext>
+            </a:extLst>
+          </p:cNvPr>
+          <p:cNvSpPr txBox="1"/>
+          <p:nvPr/>
+        </p:nvSpPr>
+        <p:spPr>
+          <a:xfrm>
+            <a:off x="1338583" y="5105400"/>
+            <a:ext cx="6466835" cy="1015663"/>
+          </a:xfrm>
+          <a:prstGeom prst="rect">
+            <a:avLst/>
+          </a:prstGeom>
+          <a:noFill/>
+          <a:ln>
+            <a:solidFill>
+              <a:schemeClr val="tx1"/>
+            </a:solidFill>
+          </a:ln>
+        </p:spPr>
+        <p:txBody>
+          <a:bodyPr wrap="none" rtlCol="0">
+            <a:spAutoFit/>
+          </a:bodyPr>
+          <a:lstStyle/>
+          <a:p>
+            <a:pPr algn="l"/>
+            <a:r>
+              <a:rPr lang="en-US" sz="2000" dirty="0"/>
+              <a:t>Two versions of your compiler</a:t>
+            </a:r>
+          </a:p>
+          <a:p>
+            <a:pPr marL="342900" indent="-342900" algn="l">
+              <a:buFont typeface="Arial" panose="020B0604020202020204" pitchFamily="34" charset="0"/>
+              <a:buChar char="•"/>
+            </a:pPr>
+            <a:r>
+              <a:rPr lang="en-US" sz="2000" dirty="0"/>
+              <a:t>Source code version written in Java (on the left)</a:t>
+            </a:r>
+          </a:p>
+          <a:p>
+            <a:pPr marL="342900" indent="-342900" algn="l">
+              <a:buFont typeface="Arial" panose="020B0604020202020204" pitchFamily="34" charset="0"/>
+              <a:buChar char="•"/>
+            </a:pPr>
+            <a:r>
+              <a:rPr lang="en-US" sz="2000" dirty="0"/>
+              <a:t>Compiled version that runs on the JVM (on the right)</a:t>
+            </a:r>
+          </a:p>
+        </p:txBody>
+      </p:sp>
     </p:spTree>
     <p:extLst>
       <p:ext uri="{BB962C8B-B14F-4D97-AF65-F5344CB8AC3E}">

</xml_diff>

<commit_message>
minor corrections to a couple of PowerPoint slides
</commit_message>
<xml_diff>
--- a/PowerPoints/01 - Overview of Compilers.pptx
+++ b/PowerPoints/01 - Overview of Compilers.pptx
@@ -8267,7 +8267,7 @@
             </a:r>
             <a:r>
               <a:rPr lang="en-US" dirty="0"/>
-              <a:t> is a compiler that converts program source code into native machine code as the program is running.</a:t>
+              <a:t> is a compiler that converts program code into native machine code as the program is running.</a:t>
             </a:r>
           </a:p>
           <a:p>
@@ -8294,8 +8294,13 @@
             <a:pPr lvl="1"/>
             <a:r>
               <a:rPr lang="en-US" dirty="0"/>
-              <a:t>Execution switches to the compiled version once it becomes available,</a:t>
+              <a:t>Execution switches to the compiled version once it </a:t>
             </a:r>
+            <a:r>
+              <a:rPr lang="en-US"/>
+              <a:t>becomes available.</a:t>
+            </a:r>
+            <a:endParaRPr lang="en-US" dirty="0"/>
           </a:p>
           <a:p>
             <a:pPr lvl="1"/>

</xml_diff>

<commit_message>
minor changes to a couple of PowerPoint slides
</commit_message>
<xml_diff>
--- a/PowerPoints/01 - Overview of Compilers.pptx
+++ b/PowerPoints/01 - Overview of Compilers.pptx
@@ -5,10 +5,10 @@
     <p:sldMasterId id="2147483651" r:id="rId1"/>
   </p:sldMasterIdLst>
   <p:notesMasterIdLst>
-    <p:notesMasterId r:id="rId40"/>
+    <p:notesMasterId r:id="rId41"/>
   </p:notesMasterIdLst>
   <p:handoutMasterIdLst>
-    <p:handoutMasterId r:id="rId41"/>
+    <p:handoutMasterId r:id="rId42"/>
   </p:handoutMasterIdLst>
   <p:sldIdLst>
     <p:sldId id="256" r:id="rId2"/>
@@ -33,22 +33,23 @@
     <p:sldId id="274" r:id="rId21"/>
     <p:sldId id="275" r:id="rId22"/>
     <p:sldId id="316" r:id="rId23"/>
-    <p:sldId id="317" r:id="rId24"/>
-    <p:sldId id="319" r:id="rId25"/>
-    <p:sldId id="313" r:id="rId26"/>
-    <p:sldId id="300" r:id="rId27"/>
-    <p:sldId id="301" r:id="rId28"/>
-    <p:sldId id="302" r:id="rId29"/>
-    <p:sldId id="305" r:id="rId30"/>
-    <p:sldId id="323" r:id="rId31"/>
-    <p:sldId id="324" r:id="rId32"/>
-    <p:sldId id="280" r:id="rId33"/>
-    <p:sldId id="283" r:id="rId34"/>
-    <p:sldId id="320" r:id="rId35"/>
-    <p:sldId id="279" r:id="rId36"/>
-    <p:sldId id="314" r:id="rId37"/>
-    <p:sldId id="299" r:id="rId38"/>
-    <p:sldId id="321" r:id="rId39"/>
+    <p:sldId id="327" r:id="rId24"/>
+    <p:sldId id="317" r:id="rId25"/>
+    <p:sldId id="319" r:id="rId26"/>
+    <p:sldId id="313" r:id="rId27"/>
+    <p:sldId id="300" r:id="rId28"/>
+    <p:sldId id="301" r:id="rId29"/>
+    <p:sldId id="302" r:id="rId30"/>
+    <p:sldId id="305" r:id="rId31"/>
+    <p:sldId id="323" r:id="rId32"/>
+    <p:sldId id="324" r:id="rId33"/>
+    <p:sldId id="280" r:id="rId34"/>
+    <p:sldId id="283" r:id="rId35"/>
+    <p:sldId id="320" r:id="rId36"/>
+    <p:sldId id="279" r:id="rId37"/>
+    <p:sldId id="314" r:id="rId38"/>
+    <p:sldId id="299" r:id="rId39"/>
+    <p:sldId id="321" r:id="rId40"/>
   </p:sldIdLst>
   <p:sldSz cx="9144000" cy="6858000" type="screen4x3"/>
   <p:notesSz cx="7315200" cy="9601200"/>
@@ -2651,7 +2652,7 @@
             <a:fld id="{1FF6247D-41C7-4BCE-B154-38DFE048D5AC}" type="slidenum">
               <a:rPr lang="en-US" smtClean="0"/>
               <a:pPr/>
-              <a:t>23</a:t>
+              <a:t>24</a:t>
             </a:fld>
             <a:endParaRPr lang="en-US"/>
           </a:p>
@@ -2767,7 +2768,7 @@
             <a:fld id="{C705EADC-A745-4D8D-9281-240493859A8D}" type="slidenum">
               <a:rPr lang="en-US" smtClean="0"/>
               <a:pPr/>
-              <a:t>24</a:t>
+              <a:t>25</a:t>
             </a:fld>
             <a:endParaRPr lang="en-US"/>
           </a:p>
@@ -2883,7 +2884,7 @@
             <a:fld id="{AAC3755A-A091-4215-9CA9-6B4634B71900}" type="slidenum">
               <a:rPr lang="en-US" smtClean="0"/>
               <a:pPr/>
-              <a:t>26</a:t>
+              <a:t>27</a:t>
             </a:fld>
             <a:endParaRPr lang="en-US"/>
           </a:p>
@@ -2999,7 +3000,7 @@
             <a:fld id="{C9694F0E-4EF1-47E0-A04E-88097CBE2BE6}" type="slidenum">
               <a:rPr lang="en-US" smtClean="0"/>
               <a:pPr/>
-              <a:t>27</a:t>
+              <a:t>28</a:t>
             </a:fld>
             <a:endParaRPr lang="en-US"/>
           </a:p>
@@ -3115,7 +3116,7 @@
             <a:fld id="{D35982E1-6B39-45CA-8B2D-4D94E03E64E0}" type="slidenum">
               <a:rPr lang="en-US" smtClean="0"/>
               <a:pPr/>
-              <a:t>28</a:t>
+              <a:t>29</a:t>
             </a:fld>
             <a:endParaRPr lang="en-US"/>
           </a:p>
@@ -3231,7 +3232,7 @@
             <a:fld id="{354A762B-23FC-4D9C-9319-E32DE86B7413}" type="slidenum">
               <a:rPr lang="en-US" smtClean="0"/>
               <a:pPr/>
-              <a:t>29</a:t>
+              <a:t>30</a:t>
             </a:fld>
             <a:endParaRPr lang="en-US"/>
           </a:p>
@@ -3347,7 +3348,7 @@
             <a:fld id="{09D79773-CB6F-4D89-AF3C-07F6CE881356}" type="slidenum">
               <a:rPr lang="en-US" smtClean="0"/>
               <a:pPr/>
-              <a:t>30</a:t>
+              <a:t>31</a:t>
             </a:fld>
             <a:endParaRPr lang="en-US"/>
           </a:p>
@@ -3579,7 +3580,7 @@
             <a:fld id="{09D79773-CB6F-4D89-AF3C-07F6CE881356}" type="slidenum">
               <a:rPr lang="en-US" smtClean="0"/>
               <a:pPr/>
-              <a:t>31</a:t>
+              <a:t>32</a:t>
             </a:fld>
             <a:endParaRPr lang="en-US"/>
           </a:p>
@@ -3695,7 +3696,7 @@
             <a:fld id="{1F1285EA-4A9D-4B15-B096-1494399431D9}" type="slidenum">
               <a:rPr lang="en-US" smtClean="0"/>
               <a:pPr/>
-              <a:t>32</a:t>
+              <a:t>33</a:t>
             </a:fld>
             <a:endParaRPr lang="en-US"/>
           </a:p>
@@ -3811,7 +3812,7 @@
             <a:fld id="{F0F645E5-B9F7-4648-B3AC-98A592BFCAD0}" type="slidenum">
               <a:rPr lang="en-US" smtClean="0"/>
               <a:pPr/>
-              <a:t>33</a:t>
+              <a:t>34</a:t>
             </a:fld>
             <a:endParaRPr lang="en-US"/>
           </a:p>
@@ -3927,7 +3928,7 @@
             <a:fld id="{40F15E97-BBB5-46F5-8553-0D64B963256E}" type="slidenum">
               <a:rPr lang="en-US" smtClean="0"/>
               <a:pPr/>
-              <a:t>34</a:t>
+              <a:t>35</a:t>
             </a:fld>
             <a:endParaRPr lang="en-US"/>
           </a:p>
@@ -4043,7 +4044,7 @@
             <a:fld id="{1CD4857E-C895-4437-BF03-1B106071D256}" type="slidenum">
               <a:rPr lang="en-US" smtClean="0"/>
               <a:pPr/>
-              <a:t>35</a:t>
+              <a:t>36</a:t>
             </a:fld>
             <a:endParaRPr lang="en-US"/>
           </a:p>
@@ -4159,7 +4160,7 @@
             <a:fld id="{1CD4857E-C895-4437-BF03-1B106071D256}" type="slidenum">
               <a:rPr lang="en-US" smtClean="0"/>
               <a:pPr/>
-              <a:t>36</a:t>
+              <a:t>37</a:t>
             </a:fld>
             <a:endParaRPr lang="en-US"/>
           </a:p>
@@ -4275,7 +4276,7 @@
             <a:fld id="{891F7CF7-5ECF-4AF8-8F03-7616AB30EBD0}" type="slidenum">
               <a:rPr lang="en-US" smtClean="0"/>
               <a:pPr/>
-              <a:t>37</a:t>
+              <a:t>38</a:t>
             </a:fld>
             <a:endParaRPr lang="en-US"/>
           </a:p>
@@ -4391,7 +4392,7 @@
             <a:fld id="{9B0ACD02-6F40-4E73-B8A6-AB01A613B27D}" type="slidenum">
               <a:rPr lang="en-US" smtClean="0"/>
               <a:pPr/>
-              <a:t>38</a:t>
+              <a:t>39</a:t>
             </a:fld>
             <a:endParaRPr lang="en-US"/>
           </a:p>
@@ -8267,7 +8268,7 @@
             </a:r>
             <a:r>
               <a:rPr lang="en-US" dirty="0"/>
-              <a:t> is a compiler that converts program code into native machine code as the program is running.</a:t>
+              <a:t> is a compiler that converts program source code into native machine code as the program is running.</a:t>
             </a:r>
           </a:p>
           <a:p>
@@ -8294,13 +8295,8 @@
             <a:pPr lvl="1"/>
             <a:r>
               <a:rPr lang="en-US" dirty="0"/>
-              <a:t>Execution switches to the compiled version once it </a:t>
+              <a:t>Execution switches to the compiled version once it becomes available.</a:t>
             </a:r>
-            <a:r>
-              <a:rPr lang="en-US"/>
-              <a:t>becomes available.</a:t>
-            </a:r>
-            <a:endParaRPr lang="en-US" dirty="0"/>
           </a:p>
           <a:p>
             <a:pPr lvl="1"/>
@@ -19337,6 +19333,3023 @@
       </p:grpSpPr>
       <p:sp>
         <p:nvSpPr>
+          <p:cNvPr id="2" name="Title 1">
+            <a:extLst>
+              <a:ext uri="{FF2B5EF4-FFF2-40B4-BE49-F238E27FC236}">
+                <a16:creationId xmlns:a16="http://schemas.microsoft.com/office/drawing/2014/main" id="{B5965636-00EC-27C6-6228-21E5D9B92481}"/>
+              </a:ext>
+            </a:extLst>
+          </p:cNvPr>
+          <p:cNvSpPr>
+            <a:spLocks noGrp="1"/>
+          </p:cNvSpPr>
+          <p:nvPr>
+            <p:ph type="title"/>
+          </p:nvPr>
+        </p:nvSpPr>
+        <p:spPr/>
+        <p:txBody>
+          <a:bodyPr/>
+          <a:lstStyle/>
+          <a:p>
+            <a:r>
+              <a:rPr lang="en-US" dirty="0"/>
+              <a:t>Two Versions of a Compiler</a:t>
+            </a:r>
+          </a:p>
+        </p:txBody>
+      </p:sp>
+      <p:sp>
+        <p:nvSpPr>
+          <p:cNvPr id="5" name="Content Placeholder 4">
+            <a:extLst>
+              <a:ext uri="{FF2B5EF4-FFF2-40B4-BE49-F238E27FC236}">
+                <a16:creationId xmlns:a16="http://schemas.microsoft.com/office/drawing/2014/main" id="{CE8F8761-B64C-477A-0353-E98E80DFDF66}"/>
+              </a:ext>
+            </a:extLst>
+          </p:cNvPr>
+          <p:cNvSpPr>
+            <a:spLocks noGrp="1"/>
+          </p:cNvSpPr>
+          <p:nvPr>
+            <p:ph idx="1"/>
+          </p:nvPr>
+        </p:nvSpPr>
+        <p:spPr/>
+        <p:txBody>
+          <a:bodyPr/>
+          <a:lstStyle/>
+          <a:p>
+            <a:r>
+              <a:rPr lang="en-US" dirty="0"/>
+              <a:t>The source code version written in the high-level language.</a:t>
+            </a:r>
+          </a:p>
+          <a:p>
+            <a:r>
+              <a:rPr lang="en-US" dirty="0"/>
+              <a:t>The object code version obtained by compiling it.</a:t>
+            </a:r>
+          </a:p>
+          <a:p>
+            <a:endParaRPr lang="en-US" dirty="0"/>
+          </a:p>
+        </p:txBody>
+      </p:sp>
+      <p:sp>
+        <p:nvSpPr>
+          <p:cNvPr id="3" name="Footer Placeholder 2">
+            <a:extLst>
+              <a:ext uri="{FF2B5EF4-FFF2-40B4-BE49-F238E27FC236}">
+                <a16:creationId xmlns:a16="http://schemas.microsoft.com/office/drawing/2014/main" id="{C530C588-35EA-1886-51C3-21C5711889CC}"/>
+              </a:ext>
+            </a:extLst>
+          </p:cNvPr>
+          <p:cNvSpPr>
+            <a:spLocks noGrp="1"/>
+          </p:cNvSpPr>
+          <p:nvPr>
+            <p:ph type="ftr" sz="quarter" idx="10"/>
+          </p:nvPr>
+        </p:nvSpPr>
+        <p:spPr/>
+        <p:txBody>
+          <a:bodyPr/>
+          <a:lstStyle/>
+          <a:p>
+            <a:pPr>
+              <a:defRPr/>
+            </a:pPr>
+            <a:r>
+              <a:rPr lang="en-US"/>
+              <a:t>©SoftMoore Consulting</a:t>
+            </a:r>
+          </a:p>
+        </p:txBody>
+      </p:sp>
+      <p:sp>
+        <p:nvSpPr>
+          <p:cNvPr id="4" name="Slide Number Placeholder 3">
+            <a:extLst>
+              <a:ext uri="{FF2B5EF4-FFF2-40B4-BE49-F238E27FC236}">
+                <a16:creationId xmlns:a16="http://schemas.microsoft.com/office/drawing/2014/main" id="{988688B3-24A5-4CBF-EE35-80764E7E49A6}"/>
+              </a:ext>
+            </a:extLst>
+          </p:cNvPr>
+          <p:cNvSpPr>
+            <a:spLocks noGrp="1"/>
+          </p:cNvSpPr>
+          <p:nvPr>
+            <p:ph type="sldNum" sz="quarter" idx="11"/>
+          </p:nvPr>
+        </p:nvSpPr>
+        <p:spPr/>
+        <p:txBody>
+          <a:bodyPr/>
+          <a:lstStyle/>
+          <a:p>
+            <a:pPr>
+              <a:defRPr/>
+            </a:pPr>
+            <a:r>
+              <a:rPr lang="en-US"/>
+              <a:t>Slide </a:t>
+            </a:r>
+            <a:fld id="{265AFCFC-04E8-4892-9E14-12CBB263C61B}" type="slidenum">
+              <a:rPr lang="en-US" smtClean="0"/>
+              <a:pPr>
+                <a:defRPr/>
+              </a:pPr>
+              <a:t>23</a:t>
+            </a:fld>
+            <a:endParaRPr lang="en-US"/>
+          </a:p>
+        </p:txBody>
+      </p:sp>
+      <p:grpSp>
+        <p:nvGrpSpPr>
+          <p:cNvPr id="6" name="Group 5">
+            <a:extLst>
+              <a:ext uri="{FF2B5EF4-FFF2-40B4-BE49-F238E27FC236}">
+                <a16:creationId xmlns:a16="http://schemas.microsoft.com/office/drawing/2014/main" id="{C77509FD-E141-2B3E-2B6C-F28D50C63D04}"/>
+              </a:ext>
+            </a:extLst>
+          </p:cNvPr>
+          <p:cNvGrpSpPr/>
+          <p:nvPr/>
+        </p:nvGrpSpPr>
+        <p:grpSpPr>
+          <a:xfrm>
+            <a:off x="1082047" y="3048000"/>
+            <a:ext cx="6979907" cy="2244196"/>
+            <a:chOff x="2705564" y="2287554"/>
+            <a:chExt cx="6979907" cy="2244196"/>
+          </a:xfrm>
+        </p:grpSpPr>
+        <p:grpSp>
+          <p:nvGrpSpPr>
+            <p:cNvPr id="7" name="Group 44">
+              <a:extLst>
+                <a:ext uri="{FF2B5EF4-FFF2-40B4-BE49-F238E27FC236}">
+                  <a16:creationId xmlns:a16="http://schemas.microsoft.com/office/drawing/2014/main" id="{195AB9EE-8CD1-9078-1473-C1982CC854B3}"/>
+                </a:ext>
+              </a:extLst>
+            </p:cNvPr>
+            <p:cNvGrpSpPr>
+              <a:grpSpLocks/>
+            </p:cNvGrpSpPr>
+            <p:nvPr/>
+          </p:nvGrpSpPr>
+          <p:grpSpPr bwMode="auto">
+            <a:xfrm>
+              <a:off x="4255375" y="2287554"/>
+              <a:ext cx="1552576" cy="730250"/>
+              <a:chOff x="595" y="2544"/>
+              <a:chExt cx="978" cy="460"/>
+            </a:xfrm>
+          </p:grpSpPr>
+          <p:grpSp>
+            <p:nvGrpSpPr>
+              <p:cNvPr id="42" name="Group 45">
+                <a:extLst>
+                  <a:ext uri="{FF2B5EF4-FFF2-40B4-BE49-F238E27FC236}">
+                    <a16:creationId xmlns:a16="http://schemas.microsoft.com/office/drawing/2014/main" id="{1B4CFC53-3473-6F9C-568A-80ED7125F341}"/>
+                  </a:ext>
+                </a:extLst>
+              </p:cNvPr>
+              <p:cNvGrpSpPr>
+                <a:grpSpLocks/>
+              </p:cNvGrpSpPr>
+              <p:nvPr/>
+            </p:nvGrpSpPr>
+            <p:grpSpPr bwMode="auto">
+              <a:xfrm>
+                <a:off x="624" y="2544"/>
+                <a:ext cx="921" cy="460"/>
+                <a:chOff x="624" y="2544"/>
+                <a:chExt cx="921" cy="460"/>
+              </a:xfrm>
+            </p:grpSpPr>
+            <p:sp>
+              <p:nvSpPr>
+                <p:cNvPr id="45" name="Line 46">
+                  <a:extLst>
+                    <a:ext uri="{FF2B5EF4-FFF2-40B4-BE49-F238E27FC236}">
+                      <a16:creationId xmlns:a16="http://schemas.microsoft.com/office/drawing/2014/main" id="{6569E84D-0912-EE90-9F47-5C38EC2C6CB5}"/>
+                    </a:ext>
+                  </a:extLst>
+                </p:cNvPr>
+                <p:cNvSpPr>
+                  <a:spLocks noChangeShapeType="1"/>
+                </p:cNvSpPr>
+                <p:nvPr/>
+              </p:nvSpPr>
+              <p:spPr bwMode="auto">
+                <a:xfrm>
+                  <a:off x="624" y="2544"/>
+                  <a:ext cx="921" cy="0"/>
+                </a:xfrm>
+                <a:prstGeom prst="line">
+                  <a:avLst/>
+                </a:prstGeom>
+                <a:noFill/>
+                <a:ln w="9525">
+                  <a:solidFill>
+                    <a:schemeClr val="tx1"/>
+                  </a:solidFill>
+                  <a:round/>
+                  <a:headEnd/>
+                  <a:tailEnd/>
+                </a:ln>
+              </p:spPr>
+              <p:txBody>
+                <a:bodyPr wrap="none" lIns="92075" tIns="46038" rIns="92075" bIns="46038" anchor="ctr"/>
+                <a:lstStyle/>
+                <a:p>
+                  <a:pPr marL="0" marR="0" lvl="0" indent="0" algn="ctr" defTabSz="914400" eaLnBrk="0" fontAlgn="base" latinLnBrk="0" hangingPunct="0">
+                    <a:lnSpc>
+                      <a:spcPct val="100000"/>
+                    </a:lnSpc>
+                    <a:spcBef>
+                      <a:spcPct val="0"/>
+                    </a:spcBef>
+                    <a:spcAft>
+                      <a:spcPct val="0"/>
+                    </a:spcAft>
+                    <a:buClrTx/>
+                    <a:buSzTx/>
+                    <a:buFontTx/>
+                    <a:buNone/>
+                    <a:tabLst/>
+                    <a:defRPr/>
+                  </a:pPr>
+                  <a:endParaRPr kumimoji="0" lang="en-US" sz="2400" b="0" i="0" u="none" strike="noStrike" kern="0" cap="none" spc="0" normalizeH="0" baseline="0" noProof="0" dirty="0">
+                    <a:ln>
+                      <a:noFill/>
+                    </a:ln>
+                    <a:effectLst/>
+                    <a:uLnTx/>
+                    <a:uFillTx/>
+                    <a:latin typeface="Arial" charset="0"/>
+                  </a:endParaRPr>
+                </a:p>
+              </p:txBody>
+            </p:sp>
+            <p:sp>
+              <p:nvSpPr>
+                <p:cNvPr id="46" name="Line 47">
+                  <a:extLst>
+                    <a:ext uri="{FF2B5EF4-FFF2-40B4-BE49-F238E27FC236}">
+                      <a16:creationId xmlns:a16="http://schemas.microsoft.com/office/drawing/2014/main" id="{3A951AA6-6C36-7040-866B-D891E3877CB9}"/>
+                    </a:ext>
+                  </a:extLst>
+                </p:cNvPr>
+                <p:cNvSpPr>
+                  <a:spLocks noChangeShapeType="1"/>
+                </p:cNvSpPr>
+                <p:nvPr/>
+              </p:nvSpPr>
+              <p:spPr bwMode="auto">
+                <a:xfrm>
+                  <a:off x="797" y="3004"/>
+                  <a:ext cx="576" cy="0"/>
+                </a:xfrm>
+                <a:prstGeom prst="line">
+                  <a:avLst/>
+                </a:prstGeom>
+                <a:noFill/>
+                <a:ln w="9525">
+                  <a:solidFill>
+                    <a:schemeClr val="tx1"/>
+                  </a:solidFill>
+                  <a:round/>
+                  <a:headEnd/>
+                  <a:tailEnd/>
+                </a:ln>
+              </p:spPr>
+              <p:txBody>
+                <a:bodyPr wrap="none" lIns="92075" tIns="46038" rIns="92075" bIns="46038" anchor="ctr"/>
+                <a:lstStyle/>
+                <a:p>
+                  <a:pPr marL="0" marR="0" lvl="0" indent="0" algn="ctr" defTabSz="914400" eaLnBrk="0" fontAlgn="base" latinLnBrk="0" hangingPunct="0">
+                    <a:lnSpc>
+                      <a:spcPct val="100000"/>
+                    </a:lnSpc>
+                    <a:spcBef>
+                      <a:spcPct val="0"/>
+                    </a:spcBef>
+                    <a:spcAft>
+                      <a:spcPct val="0"/>
+                    </a:spcAft>
+                    <a:buClrTx/>
+                    <a:buSzTx/>
+                    <a:buFontTx/>
+                    <a:buNone/>
+                    <a:tabLst/>
+                    <a:defRPr/>
+                  </a:pPr>
+                  <a:endParaRPr kumimoji="0" lang="en-US" sz="2400" b="0" i="0" u="none" strike="noStrike" kern="0" cap="none" spc="0" normalizeH="0" baseline="0" noProof="0" dirty="0">
+                    <a:ln>
+                      <a:noFill/>
+                    </a:ln>
+                    <a:effectLst/>
+                    <a:uLnTx/>
+                    <a:uFillTx/>
+                    <a:latin typeface="Arial" charset="0"/>
+                  </a:endParaRPr>
+                </a:p>
+              </p:txBody>
+            </p:sp>
+            <p:sp>
+              <p:nvSpPr>
+                <p:cNvPr id="47" name="Line 48">
+                  <a:extLst>
+                    <a:ext uri="{FF2B5EF4-FFF2-40B4-BE49-F238E27FC236}">
+                      <a16:creationId xmlns:a16="http://schemas.microsoft.com/office/drawing/2014/main" id="{EE607E8D-1645-83A4-761B-FEAE7CFE8C3A}"/>
+                    </a:ext>
+                  </a:extLst>
+                </p:cNvPr>
+                <p:cNvSpPr>
+                  <a:spLocks noChangeShapeType="1"/>
+                </p:cNvSpPr>
+                <p:nvPr/>
+              </p:nvSpPr>
+              <p:spPr bwMode="auto">
+                <a:xfrm>
+                  <a:off x="625" y="2544"/>
+                  <a:ext cx="0" cy="230"/>
+                </a:xfrm>
+                <a:prstGeom prst="line">
+                  <a:avLst/>
+                </a:prstGeom>
+                <a:noFill/>
+                <a:ln w="9525">
+                  <a:solidFill>
+                    <a:schemeClr val="tx1"/>
+                  </a:solidFill>
+                  <a:round/>
+                  <a:headEnd/>
+                  <a:tailEnd/>
+                </a:ln>
+              </p:spPr>
+              <p:txBody>
+                <a:bodyPr wrap="none" lIns="92075" tIns="46038" rIns="92075" bIns="46038" anchor="ctr"/>
+                <a:lstStyle/>
+                <a:p>
+                  <a:pPr marL="0" marR="0" lvl="0" indent="0" algn="ctr" defTabSz="914400" eaLnBrk="0" fontAlgn="base" latinLnBrk="0" hangingPunct="0">
+                    <a:lnSpc>
+                      <a:spcPct val="100000"/>
+                    </a:lnSpc>
+                    <a:spcBef>
+                      <a:spcPct val="0"/>
+                    </a:spcBef>
+                    <a:spcAft>
+                      <a:spcPct val="0"/>
+                    </a:spcAft>
+                    <a:buClrTx/>
+                    <a:buSzTx/>
+                    <a:buFontTx/>
+                    <a:buNone/>
+                    <a:tabLst/>
+                    <a:defRPr/>
+                  </a:pPr>
+                  <a:endParaRPr kumimoji="0" lang="en-US" sz="2400" b="0" i="0" u="none" strike="noStrike" kern="0" cap="none" spc="0" normalizeH="0" baseline="0" noProof="0" dirty="0">
+                    <a:ln>
+                      <a:noFill/>
+                    </a:ln>
+                    <a:effectLst/>
+                    <a:uLnTx/>
+                    <a:uFillTx/>
+                    <a:latin typeface="Arial" charset="0"/>
+                  </a:endParaRPr>
+                </a:p>
+              </p:txBody>
+            </p:sp>
+            <p:sp>
+              <p:nvSpPr>
+                <p:cNvPr id="48" name="Line 49">
+                  <a:extLst>
+                    <a:ext uri="{FF2B5EF4-FFF2-40B4-BE49-F238E27FC236}">
+                      <a16:creationId xmlns:a16="http://schemas.microsoft.com/office/drawing/2014/main" id="{089BEEEB-7033-5579-BD73-2326DAE7F6DB}"/>
+                    </a:ext>
+                  </a:extLst>
+                </p:cNvPr>
+                <p:cNvSpPr>
+                  <a:spLocks noChangeShapeType="1"/>
+                </p:cNvSpPr>
+                <p:nvPr/>
+              </p:nvSpPr>
+              <p:spPr bwMode="auto">
+                <a:xfrm>
+                  <a:off x="1545" y="2544"/>
+                  <a:ext cx="0" cy="230"/>
+                </a:xfrm>
+                <a:prstGeom prst="line">
+                  <a:avLst/>
+                </a:prstGeom>
+                <a:noFill/>
+                <a:ln w="9525">
+                  <a:solidFill>
+                    <a:schemeClr val="tx1"/>
+                  </a:solidFill>
+                  <a:round/>
+                  <a:headEnd/>
+                  <a:tailEnd/>
+                </a:ln>
+              </p:spPr>
+              <p:txBody>
+                <a:bodyPr wrap="none" lIns="92075" tIns="46038" rIns="92075" bIns="46038" anchor="ctr"/>
+                <a:lstStyle/>
+                <a:p>
+                  <a:pPr marL="0" marR="0" lvl="0" indent="0" algn="ctr" defTabSz="914400" eaLnBrk="0" fontAlgn="base" latinLnBrk="0" hangingPunct="0">
+                    <a:lnSpc>
+                      <a:spcPct val="100000"/>
+                    </a:lnSpc>
+                    <a:spcBef>
+                      <a:spcPct val="0"/>
+                    </a:spcBef>
+                    <a:spcAft>
+                      <a:spcPct val="0"/>
+                    </a:spcAft>
+                    <a:buClrTx/>
+                    <a:buSzTx/>
+                    <a:buFontTx/>
+                    <a:buNone/>
+                    <a:tabLst/>
+                    <a:defRPr/>
+                  </a:pPr>
+                  <a:endParaRPr kumimoji="0" lang="en-US" sz="2400" b="0" i="0" u="none" strike="noStrike" kern="0" cap="none" spc="0" normalizeH="0" baseline="0" noProof="0" dirty="0">
+                    <a:ln>
+                      <a:noFill/>
+                    </a:ln>
+                    <a:effectLst/>
+                    <a:uLnTx/>
+                    <a:uFillTx/>
+                    <a:latin typeface="Arial" charset="0"/>
+                  </a:endParaRPr>
+                </a:p>
+              </p:txBody>
+            </p:sp>
+            <p:sp>
+              <p:nvSpPr>
+                <p:cNvPr id="49" name="Line 50">
+                  <a:extLst>
+                    <a:ext uri="{FF2B5EF4-FFF2-40B4-BE49-F238E27FC236}">
+                      <a16:creationId xmlns:a16="http://schemas.microsoft.com/office/drawing/2014/main" id="{65A046BB-518B-D7FD-3A39-BCCCD2AD9E60}"/>
+                    </a:ext>
+                  </a:extLst>
+                </p:cNvPr>
+                <p:cNvSpPr>
+                  <a:spLocks noChangeShapeType="1"/>
+                </p:cNvSpPr>
+                <p:nvPr/>
+              </p:nvSpPr>
+              <p:spPr bwMode="auto">
+                <a:xfrm>
+                  <a:off x="797" y="2774"/>
+                  <a:ext cx="0" cy="230"/>
+                </a:xfrm>
+                <a:prstGeom prst="line">
+                  <a:avLst/>
+                </a:prstGeom>
+                <a:noFill/>
+                <a:ln w="9525">
+                  <a:solidFill>
+                    <a:schemeClr val="tx1"/>
+                  </a:solidFill>
+                  <a:round/>
+                  <a:headEnd/>
+                  <a:tailEnd/>
+                </a:ln>
+              </p:spPr>
+              <p:txBody>
+                <a:bodyPr wrap="none" lIns="92075" tIns="46038" rIns="92075" bIns="46038" anchor="ctr"/>
+                <a:lstStyle/>
+                <a:p>
+                  <a:pPr marL="0" marR="0" lvl="0" indent="0" algn="ctr" defTabSz="914400" eaLnBrk="0" fontAlgn="base" latinLnBrk="0" hangingPunct="0">
+                    <a:lnSpc>
+                      <a:spcPct val="100000"/>
+                    </a:lnSpc>
+                    <a:spcBef>
+                      <a:spcPct val="0"/>
+                    </a:spcBef>
+                    <a:spcAft>
+                      <a:spcPct val="0"/>
+                    </a:spcAft>
+                    <a:buClrTx/>
+                    <a:buSzTx/>
+                    <a:buFontTx/>
+                    <a:buNone/>
+                    <a:tabLst/>
+                    <a:defRPr/>
+                  </a:pPr>
+                  <a:endParaRPr kumimoji="0" lang="en-US" sz="2400" b="0" i="0" u="none" strike="noStrike" kern="0" cap="none" spc="0" normalizeH="0" baseline="0" noProof="0" dirty="0">
+                    <a:ln>
+                      <a:noFill/>
+                    </a:ln>
+                    <a:effectLst/>
+                    <a:uLnTx/>
+                    <a:uFillTx/>
+                    <a:latin typeface="Arial" charset="0"/>
+                  </a:endParaRPr>
+                </a:p>
+              </p:txBody>
+            </p:sp>
+            <p:sp>
+              <p:nvSpPr>
+                <p:cNvPr id="50" name="Line 51">
+                  <a:extLst>
+                    <a:ext uri="{FF2B5EF4-FFF2-40B4-BE49-F238E27FC236}">
+                      <a16:creationId xmlns:a16="http://schemas.microsoft.com/office/drawing/2014/main" id="{DF56F5FB-FD9D-A003-ABD4-A893852731E3}"/>
+                    </a:ext>
+                  </a:extLst>
+                </p:cNvPr>
+                <p:cNvSpPr>
+                  <a:spLocks noChangeShapeType="1"/>
+                </p:cNvSpPr>
+                <p:nvPr/>
+              </p:nvSpPr>
+              <p:spPr bwMode="auto">
+                <a:xfrm>
+                  <a:off x="1373" y="2774"/>
+                  <a:ext cx="0" cy="230"/>
+                </a:xfrm>
+                <a:prstGeom prst="line">
+                  <a:avLst/>
+                </a:prstGeom>
+                <a:noFill/>
+                <a:ln w="9525">
+                  <a:solidFill>
+                    <a:srgbClr val="000099"/>
+                  </a:solidFill>
+                  <a:round/>
+                  <a:headEnd/>
+                  <a:tailEnd/>
+                </a:ln>
+              </p:spPr>
+              <p:txBody>
+                <a:bodyPr wrap="none" lIns="92075" tIns="46038" rIns="92075" bIns="46038" anchor="ctr"/>
+                <a:lstStyle/>
+                <a:p>
+                  <a:pPr marL="0" marR="0" lvl="0" indent="0" algn="ctr" defTabSz="914400" eaLnBrk="0" fontAlgn="base" latinLnBrk="0" hangingPunct="0">
+                    <a:lnSpc>
+                      <a:spcPct val="100000"/>
+                    </a:lnSpc>
+                    <a:spcBef>
+                      <a:spcPct val="0"/>
+                    </a:spcBef>
+                    <a:spcAft>
+                      <a:spcPct val="0"/>
+                    </a:spcAft>
+                    <a:buClrTx/>
+                    <a:buSzTx/>
+                    <a:buFontTx/>
+                    <a:buNone/>
+                    <a:tabLst/>
+                    <a:defRPr/>
+                  </a:pPr>
+                  <a:endParaRPr kumimoji="0" lang="en-US" sz="2400" b="0" i="0" u="none" strike="noStrike" kern="0" cap="none" spc="0" normalizeH="0" baseline="0" noProof="0" dirty="0">
+                    <a:ln>
+                      <a:noFill/>
+                    </a:ln>
+                    <a:effectLst/>
+                    <a:uLnTx/>
+                    <a:uFillTx/>
+                    <a:latin typeface="Arial" charset="0"/>
+                  </a:endParaRPr>
+                </a:p>
+              </p:txBody>
+            </p:sp>
+            <p:sp>
+              <p:nvSpPr>
+                <p:cNvPr id="51" name="Line 52">
+                  <a:extLst>
+                    <a:ext uri="{FF2B5EF4-FFF2-40B4-BE49-F238E27FC236}">
+                      <a16:creationId xmlns:a16="http://schemas.microsoft.com/office/drawing/2014/main" id="{DA42F41D-2934-F5BA-1309-087B76F98928}"/>
+                    </a:ext>
+                  </a:extLst>
+                </p:cNvPr>
+                <p:cNvSpPr>
+                  <a:spLocks noChangeShapeType="1"/>
+                </p:cNvSpPr>
+                <p:nvPr/>
+              </p:nvSpPr>
+              <p:spPr bwMode="auto">
+                <a:xfrm>
+                  <a:off x="624" y="2774"/>
+                  <a:ext cx="173" cy="0"/>
+                </a:xfrm>
+                <a:prstGeom prst="line">
+                  <a:avLst/>
+                </a:prstGeom>
+                <a:noFill/>
+                <a:ln w="9525">
+                  <a:solidFill>
+                    <a:schemeClr val="tx1"/>
+                  </a:solidFill>
+                  <a:round/>
+                  <a:headEnd/>
+                  <a:tailEnd/>
+                </a:ln>
+              </p:spPr>
+              <p:txBody>
+                <a:bodyPr wrap="none" lIns="92075" tIns="46038" rIns="92075" bIns="46038" anchor="ctr"/>
+                <a:lstStyle/>
+                <a:p>
+                  <a:pPr marL="0" marR="0" lvl="0" indent="0" algn="ctr" defTabSz="914400" eaLnBrk="0" fontAlgn="base" latinLnBrk="0" hangingPunct="0">
+                    <a:lnSpc>
+                      <a:spcPct val="100000"/>
+                    </a:lnSpc>
+                    <a:spcBef>
+                      <a:spcPct val="0"/>
+                    </a:spcBef>
+                    <a:spcAft>
+                      <a:spcPct val="0"/>
+                    </a:spcAft>
+                    <a:buClrTx/>
+                    <a:buSzTx/>
+                    <a:buFontTx/>
+                    <a:buNone/>
+                    <a:tabLst/>
+                    <a:defRPr/>
+                  </a:pPr>
+                  <a:endParaRPr kumimoji="0" lang="en-US" sz="2400" b="0" i="0" u="none" strike="noStrike" kern="0" cap="none" spc="0" normalizeH="0" baseline="0" noProof="0" dirty="0">
+                    <a:ln>
+                      <a:noFill/>
+                    </a:ln>
+                    <a:effectLst/>
+                    <a:uLnTx/>
+                    <a:uFillTx/>
+                    <a:latin typeface="Arial" charset="0"/>
+                  </a:endParaRPr>
+                </a:p>
+              </p:txBody>
+            </p:sp>
+            <p:sp>
+              <p:nvSpPr>
+                <p:cNvPr id="52" name="Line 53">
+                  <a:extLst>
+                    <a:ext uri="{FF2B5EF4-FFF2-40B4-BE49-F238E27FC236}">
+                      <a16:creationId xmlns:a16="http://schemas.microsoft.com/office/drawing/2014/main" id="{E02FB45E-F153-F96B-00F9-D6757DC27F1B}"/>
+                    </a:ext>
+                  </a:extLst>
+                </p:cNvPr>
+                <p:cNvSpPr>
+                  <a:spLocks noChangeShapeType="1"/>
+                </p:cNvSpPr>
+                <p:nvPr/>
+              </p:nvSpPr>
+              <p:spPr bwMode="auto">
+                <a:xfrm>
+                  <a:off x="1372" y="2774"/>
+                  <a:ext cx="173" cy="0"/>
+                </a:xfrm>
+                <a:prstGeom prst="line">
+                  <a:avLst/>
+                </a:prstGeom>
+                <a:noFill/>
+                <a:ln w="9525">
+                  <a:solidFill>
+                    <a:srgbClr val="000099"/>
+                  </a:solidFill>
+                  <a:round/>
+                  <a:headEnd/>
+                  <a:tailEnd/>
+                </a:ln>
+              </p:spPr>
+              <p:txBody>
+                <a:bodyPr wrap="none" lIns="92075" tIns="46038" rIns="92075" bIns="46038" anchor="ctr"/>
+                <a:lstStyle/>
+                <a:p>
+                  <a:pPr marL="0" marR="0" lvl="0" indent="0" algn="ctr" defTabSz="914400" eaLnBrk="0" fontAlgn="base" latinLnBrk="0" hangingPunct="0">
+                    <a:lnSpc>
+                      <a:spcPct val="100000"/>
+                    </a:lnSpc>
+                    <a:spcBef>
+                      <a:spcPct val="0"/>
+                    </a:spcBef>
+                    <a:spcAft>
+                      <a:spcPct val="0"/>
+                    </a:spcAft>
+                    <a:buClrTx/>
+                    <a:buSzTx/>
+                    <a:buFontTx/>
+                    <a:buNone/>
+                    <a:tabLst/>
+                    <a:defRPr/>
+                  </a:pPr>
+                  <a:endParaRPr kumimoji="0" lang="en-US" sz="2400" b="0" i="0" u="none" strike="noStrike" kern="0" cap="none" spc="0" normalizeH="0" baseline="0" noProof="0" dirty="0">
+                    <a:ln>
+                      <a:noFill/>
+                    </a:ln>
+                    <a:effectLst/>
+                    <a:uLnTx/>
+                    <a:uFillTx/>
+                    <a:latin typeface="Arial" charset="0"/>
+                  </a:endParaRPr>
+                </a:p>
+              </p:txBody>
+            </p:sp>
+          </p:grpSp>
+          <p:sp>
+            <p:nvSpPr>
+              <p:cNvPr id="43" name="Text Box 54">
+                <a:extLst>
+                  <a:ext uri="{FF2B5EF4-FFF2-40B4-BE49-F238E27FC236}">
+                    <a16:creationId xmlns:a16="http://schemas.microsoft.com/office/drawing/2014/main" id="{E2C7E5A8-330D-5A88-C880-1DB46C5BB3C4}"/>
+                  </a:ext>
+                </a:extLst>
+              </p:cNvPr>
+              <p:cNvSpPr txBox="1">
+                <a:spLocks noChangeArrowheads="1"/>
+              </p:cNvSpPr>
+              <p:nvPr/>
+            </p:nvSpPr>
+            <p:spPr bwMode="auto">
+              <a:xfrm>
+                <a:off x="912" y="2784"/>
+                <a:ext cx="346" cy="204"/>
+              </a:xfrm>
+              <a:prstGeom prst="rect">
+                <a:avLst/>
+              </a:prstGeom>
+              <a:noFill/>
+              <a:ln w="9525">
+                <a:noFill/>
+                <a:miter lim="800000"/>
+                <a:headEnd/>
+                <a:tailEnd/>
+              </a:ln>
+            </p:spPr>
+            <p:txBody>
+              <a:bodyPr wrap="none" lIns="92075" tIns="46038" rIns="92075" bIns="46038">
+                <a:spAutoFit/>
+              </a:bodyPr>
+              <a:lstStyle/>
+              <a:p>
+                <a:pPr marL="0" marR="0" lvl="0" indent="0" algn="ctr" defTabSz="914400" eaLnBrk="0" fontAlgn="base" latinLnBrk="0" hangingPunct="0">
+                  <a:lnSpc>
+                    <a:spcPct val="100000"/>
+                  </a:lnSpc>
+                  <a:spcBef>
+                    <a:spcPct val="0"/>
+                  </a:spcBef>
+                  <a:spcAft>
+                    <a:spcPct val="0"/>
+                  </a:spcAft>
+                  <a:buClrTx/>
+                  <a:buSzTx/>
+                  <a:buFontTx/>
+                  <a:buNone/>
+                  <a:tabLst/>
+                  <a:defRPr/>
+                </a:pPr>
+                <a:r>
+                  <a:rPr kumimoji="0" lang="en-US" sz="1500" b="0" i="0" u="none" strike="noStrike" kern="0" cap="none" spc="0" normalizeH="0" baseline="0" noProof="0" dirty="0">
+                    <a:ln>
+                      <a:noFill/>
+                    </a:ln>
+                    <a:effectLst/>
+                    <a:uLnTx/>
+                    <a:uFillTx/>
+                    <a:latin typeface="Arial" charset="0"/>
+                  </a:rPr>
+                  <a:t>C++</a:t>
+                </a:r>
+              </a:p>
+            </p:txBody>
+          </p:sp>
+          <p:sp>
+            <p:nvSpPr>
+              <p:cNvPr id="44" name="Text Box 55">
+                <a:extLst>
+                  <a:ext uri="{FF2B5EF4-FFF2-40B4-BE49-F238E27FC236}">
+                    <a16:creationId xmlns:a16="http://schemas.microsoft.com/office/drawing/2014/main" id="{0CDA0455-7AC0-E510-BFA6-46327AAEAFA5}"/>
+                  </a:ext>
+                </a:extLst>
+              </p:cNvPr>
+              <p:cNvSpPr txBox="1">
+                <a:spLocks noChangeArrowheads="1"/>
+              </p:cNvSpPr>
+              <p:nvPr/>
+            </p:nvSpPr>
+            <p:spPr bwMode="auto">
+              <a:xfrm>
+                <a:off x="595" y="2557"/>
+                <a:ext cx="978" cy="204"/>
+              </a:xfrm>
+              <a:prstGeom prst="rect">
+                <a:avLst/>
+              </a:prstGeom>
+              <a:noFill/>
+              <a:ln w="9525">
+                <a:noFill/>
+                <a:miter lim="800000"/>
+                <a:headEnd/>
+                <a:tailEnd/>
+              </a:ln>
+            </p:spPr>
+            <p:txBody>
+              <a:bodyPr wrap="none" lIns="92075" tIns="46038" rIns="92075" bIns="46038">
+                <a:spAutoFit/>
+              </a:bodyPr>
+              <a:lstStyle/>
+              <a:p>
+                <a:pPr marL="0" marR="0" lvl="0" indent="0" algn="ctr" defTabSz="914400" eaLnBrk="0" fontAlgn="base" latinLnBrk="0" hangingPunct="0">
+                  <a:lnSpc>
+                    <a:spcPct val="100000"/>
+                  </a:lnSpc>
+                  <a:spcBef>
+                    <a:spcPct val="0"/>
+                  </a:spcBef>
+                  <a:spcAft>
+                    <a:spcPct val="0"/>
+                  </a:spcAft>
+                  <a:buClrTx/>
+                  <a:buSzTx/>
+                  <a:buFontTx/>
+                  <a:buNone/>
+                  <a:tabLst/>
+                  <a:defRPr/>
+                </a:pPr>
+                <a:r>
+                  <a:rPr lang="en-US" sz="1500" kern="0" dirty="0">
+                    <a:latin typeface="Arial" charset="0"/>
+                  </a:rPr>
+                  <a:t>Kotlin</a:t>
+                </a:r>
+                <a:r>
+                  <a:rPr kumimoji="0" lang="en-US" sz="1500" b="0" i="0" u="none" strike="noStrike" kern="0" cap="none" spc="0" normalizeH="0" baseline="0" noProof="0" dirty="0">
+                    <a:ln>
+                      <a:noFill/>
+                    </a:ln>
+                    <a:effectLst/>
+                    <a:uLnTx/>
+                    <a:uFillTx/>
+                    <a:latin typeface="Arial" charset="0"/>
+                  </a:rPr>
+                  <a:t> </a:t>
+                </a:r>
+                <a:r>
+                  <a:rPr kumimoji="0" lang="en-US" sz="1500" b="0" i="0" u="none" strike="noStrike" kern="0" cap="none" spc="0" normalizeH="0" baseline="0" noProof="0" dirty="0">
+                    <a:ln>
+                      <a:noFill/>
+                    </a:ln>
+                    <a:effectLst/>
+                    <a:uLnTx/>
+                    <a:uFillTx/>
+                    <a:latin typeface="Arial" charset="0"/>
+                    <a:sym typeface="Symbol" pitchFamily="18" charset="2"/>
+                  </a:rPr>
+                  <a:t> </a:t>
+                </a:r>
+                <a:r>
+                  <a:rPr lang="en-US" sz="1500" kern="0" dirty="0">
+                    <a:latin typeface="Arial" charset="0"/>
+                    <a:sym typeface="Symbol" pitchFamily="18" charset="2"/>
+                  </a:rPr>
+                  <a:t>x86-64</a:t>
+                </a:r>
+                <a:endParaRPr kumimoji="0" lang="en-US" sz="1500" b="0" i="0" u="none" strike="noStrike" kern="0" cap="none" spc="0" normalizeH="0" baseline="0" noProof="0" dirty="0">
+                  <a:ln>
+                    <a:noFill/>
+                  </a:ln>
+                  <a:effectLst/>
+                  <a:uLnTx/>
+                  <a:uFillTx/>
+                  <a:latin typeface="Arial" charset="0"/>
+                  <a:sym typeface="Symbol" pitchFamily="18" charset="2"/>
+                </a:endParaRPr>
+              </a:p>
+            </p:txBody>
+          </p:sp>
+        </p:grpSp>
+        <p:grpSp>
+          <p:nvGrpSpPr>
+            <p:cNvPr id="8" name="Group 56">
+              <a:extLst>
+                <a:ext uri="{FF2B5EF4-FFF2-40B4-BE49-F238E27FC236}">
+                  <a16:creationId xmlns:a16="http://schemas.microsoft.com/office/drawing/2014/main" id="{D323DF13-4D5D-9829-C608-FC26320A3017}"/>
+                </a:ext>
+              </a:extLst>
+            </p:cNvPr>
+            <p:cNvGrpSpPr>
+              <a:grpSpLocks/>
+            </p:cNvGrpSpPr>
+            <p:nvPr/>
+          </p:nvGrpSpPr>
+          <p:grpSpPr bwMode="auto">
+            <a:xfrm>
+              <a:off x="5488862" y="2652679"/>
+              <a:ext cx="1462088" cy="730250"/>
+              <a:chOff x="624" y="2544"/>
+              <a:chExt cx="921" cy="460"/>
+            </a:xfrm>
+          </p:grpSpPr>
+          <p:grpSp>
+            <p:nvGrpSpPr>
+              <p:cNvPr id="31" name="Group 57">
+                <a:extLst>
+                  <a:ext uri="{FF2B5EF4-FFF2-40B4-BE49-F238E27FC236}">
+                    <a16:creationId xmlns:a16="http://schemas.microsoft.com/office/drawing/2014/main" id="{C928447D-E28B-390D-3A18-7963CCCB8BF9}"/>
+                  </a:ext>
+                </a:extLst>
+              </p:cNvPr>
+              <p:cNvGrpSpPr>
+                <a:grpSpLocks/>
+              </p:cNvGrpSpPr>
+              <p:nvPr/>
+            </p:nvGrpSpPr>
+            <p:grpSpPr bwMode="auto">
+              <a:xfrm>
+                <a:off x="624" y="2544"/>
+                <a:ext cx="921" cy="460"/>
+                <a:chOff x="624" y="2544"/>
+                <a:chExt cx="921" cy="460"/>
+              </a:xfrm>
+            </p:grpSpPr>
+            <p:sp>
+              <p:nvSpPr>
+                <p:cNvPr id="34" name="Line 58">
+                  <a:extLst>
+                    <a:ext uri="{FF2B5EF4-FFF2-40B4-BE49-F238E27FC236}">
+                      <a16:creationId xmlns:a16="http://schemas.microsoft.com/office/drawing/2014/main" id="{843D02DB-3502-920C-FC67-1E94154D9924}"/>
+                    </a:ext>
+                  </a:extLst>
+                </p:cNvPr>
+                <p:cNvSpPr>
+                  <a:spLocks noChangeShapeType="1"/>
+                </p:cNvSpPr>
+                <p:nvPr/>
+              </p:nvSpPr>
+              <p:spPr bwMode="auto">
+                <a:xfrm>
+                  <a:off x="624" y="2544"/>
+                  <a:ext cx="921" cy="0"/>
+                </a:xfrm>
+                <a:prstGeom prst="line">
+                  <a:avLst/>
+                </a:prstGeom>
+                <a:noFill/>
+                <a:ln w="9525">
+                  <a:solidFill>
+                    <a:schemeClr val="tx1"/>
+                  </a:solidFill>
+                  <a:round/>
+                  <a:headEnd/>
+                  <a:tailEnd/>
+                </a:ln>
+              </p:spPr>
+              <p:txBody>
+                <a:bodyPr wrap="none" lIns="92075" tIns="46038" rIns="92075" bIns="46038" anchor="ctr"/>
+                <a:lstStyle/>
+                <a:p>
+                  <a:pPr marL="0" marR="0" lvl="0" indent="0" algn="ctr" defTabSz="914400" eaLnBrk="0" fontAlgn="base" latinLnBrk="0" hangingPunct="0">
+                    <a:lnSpc>
+                      <a:spcPct val="100000"/>
+                    </a:lnSpc>
+                    <a:spcBef>
+                      <a:spcPct val="0"/>
+                    </a:spcBef>
+                    <a:spcAft>
+                      <a:spcPct val="0"/>
+                    </a:spcAft>
+                    <a:buClrTx/>
+                    <a:buSzTx/>
+                    <a:buFontTx/>
+                    <a:buNone/>
+                    <a:tabLst/>
+                    <a:defRPr/>
+                  </a:pPr>
+                  <a:endParaRPr kumimoji="0" lang="en-US" sz="2400" b="0" i="0" u="none" strike="noStrike" kern="0" cap="none" spc="0" normalizeH="0" baseline="0" noProof="0" dirty="0">
+                    <a:ln>
+                      <a:noFill/>
+                    </a:ln>
+                    <a:effectLst/>
+                    <a:uLnTx/>
+                    <a:uFillTx/>
+                    <a:latin typeface="Arial" charset="0"/>
+                  </a:endParaRPr>
+                </a:p>
+              </p:txBody>
+            </p:sp>
+            <p:sp>
+              <p:nvSpPr>
+                <p:cNvPr id="35" name="Line 59">
+                  <a:extLst>
+                    <a:ext uri="{FF2B5EF4-FFF2-40B4-BE49-F238E27FC236}">
+                      <a16:creationId xmlns:a16="http://schemas.microsoft.com/office/drawing/2014/main" id="{C2850535-0756-B096-7469-F9A2D481CAAD}"/>
+                    </a:ext>
+                  </a:extLst>
+                </p:cNvPr>
+                <p:cNvSpPr>
+                  <a:spLocks noChangeShapeType="1"/>
+                </p:cNvSpPr>
+                <p:nvPr/>
+              </p:nvSpPr>
+              <p:spPr bwMode="auto">
+                <a:xfrm>
+                  <a:off x="797" y="3004"/>
+                  <a:ext cx="576" cy="0"/>
+                </a:xfrm>
+                <a:prstGeom prst="line">
+                  <a:avLst/>
+                </a:prstGeom>
+                <a:noFill/>
+                <a:ln w="9525">
+                  <a:solidFill>
+                    <a:srgbClr val="000099"/>
+                  </a:solidFill>
+                  <a:round/>
+                  <a:headEnd/>
+                  <a:tailEnd/>
+                </a:ln>
+              </p:spPr>
+              <p:txBody>
+                <a:bodyPr wrap="none" lIns="92075" tIns="46038" rIns="92075" bIns="46038" anchor="ctr"/>
+                <a:lstStyle/>
+                <a:p>
+                  <a:pPr marL="0" marR="0" lvl="0" indent="0" algn="ctr" defTabSz="914400" eaLnBrk="0" fontAlgn="base" latinLnBrk="0" hangingPunct="0">
+                    <a:lnSpc>
+                      <a:spcPct val="100000"/>
+                    </a:lnSpc>
+                    <a:spcBef>
+                      <a:spcPct val="0"/>
+                    </a:spcBef>
+                    <a:spcAft>
+                      <a:spcPct val="0"/>
+                    </a:spcAft>
+                    <a:buClrTx/>
+                    <a:buSzTx/>
+                    <a:buFontTx/>
+                    <a:buNone/>
+                    <a:tabLst/>
+                    <a:defRPr/>
+                  </a:pPr>
+                  <a:endParaRPr kumimoji="0" lang="en-US" sz="2400" b="0" i="0" u="none" strike="noStrike" kern="0" cap="none" spc="0" normalizeH="0" baseline="0" noProof="0" dirty="0">
+                    <a:ln>
+                      <a:noFill/>
+                    </a:ln>
+                    <a:effectLst/>
+                    <a:uLnTx/>
+                    <a:uFillTx/>
+                    <a:latin typeface="Arial" charset="0"/>
+                  </a:endParaRPr>
+                </a:p>
+              </p:txBody>
+            </p:sp>
+            <p:sp>
+              <p:nvSpPr>
+                <p:cNvPr id="36" name="Line 60">
+                  <a:extLst>
+                    <a:ext uri="{FF2B5EF4-FFF2-40B4-BE49-F238E27FC236}">
+                      <a16:creationId xmlns:a16="http://schemas.microsoft.com/office/drawing/2014/main" id="{F4D8C82F-4E16-F1C2-D40F-48323FEF6AA7}"/>
+                    </a:ext>
+                  </a:extLst>
+                </p:cNvPr>
+                <p:cNvSpPr>
+                  <a:spLocks noChangeShapeType="1"/>
+                </p:cNvSpPr>
+                <p:nvPr/>
+              </p:nvSpPr>
+              <p:spPr bwMode="auto">
+                <a:xfrm>
+                  <a:off x="625" y="2544"/>
+                  <a:ext cx="0" cy="230"/>
+                </a:xfrm>
+                <a:prstGeom prst="line">
+                  <a:avLst/>
+                </a:prstGeom>
+                <a:noFill/>
+                <a:ln w="9525">
+                  <a:solidFill>
+                    <a:schemeClr val="tx1"/>
+                  </a:solidFill>
+                  <a:round/>
+                  <a:headEnd/>
+                  <a:tailEnd/>
+                </a:ln>
+              </p:spPr>
+              <p:txBody>
+                <a:bodyPr wrap="none" lIns="92075" tIns="46038" rIns="92075" bIns="46038" anchor="ctr"/>
+                <a:lstStyle/>
+                <a:p>
+                  <a:pPr marL="0" marR="0" lvl="0" indent="0" algn="ctr" defTabSz="914400" eaLnBrk="0" fontAlgn="base" latinLnBrk="0" hangingPunct="0">
+                    <a:lnSpc>
+                      <a:spcPct val="100000"/>
+                    </a:lnSpc>
+                    <a:spcBef>
+                      <a:spcPct val="0"/>
+                    </a:spcBef>
+                    <a:spcAft>
+                      <a:spcPct val="0"/>
+                    </a:spcAft>
+                    <a:buClrTx/>
+                    <a:buSzTx/>
+                    <a:buFontTx/>
+                    <a:buNone/>
+                    <a:tabLst/>
+                    <a:defRPr/>
+                  </a:pPr>
+                  <a:endParaRPr kumimoji="0" lang="en-US" sz="2400" b="0" i="0" u="none" strike="noStrike" kern="0" cap="none" spc="0" normalizeH="0" baseline="0" noProof="0" dirty="0">
+                    <a:ln>
+                      <a:noFill/>
+                    </a:ln>
+                    <a:effectLst/>
+                    <a:uLnTx/>
+                    <a:uFillTx/>
+                    <a:latin typeface="Arial" charset="0"/>
+                  </a:endParaRPr>
+                </a:p>
+              </p:txBody>
+            </p:sp>
+            <p:sp>
+              <p:nvSpPr>
+                <p:cNvPr id="37" name="Line 61">
+                  <a:extLst>
+                    <a:ext uri="{FF2B5EF4-FFF2-40B4-BE49-F238E27FC236}">
+                      <a16:creationId xmlns:a16="http://schemas.microsoft.com/office/drawing/2014/main" id="{EC7F0D94-000C-3AC3-392B-53A738A78821}"/>
+                    </a:ext>
+                  </a:extLst>
+                </p:cNvPr>
+                <p:cNvSpPr>
+                  <a:spLocks noChangeShapeType="1"/>
+                </p:cNvSpPr>
+                <p:nvPr/>
+              </p:nvSpPr>
+              <p:spPr bwMode="auto">
+                <a:xfrm>
+                  <a:off x="1545" y="2544"/>
+                  <a:ext cx="0" cy="230"/>
+                </a:xfrm>
+                <a:prstGeom prst="line">
+                  <a:avLst/>
+                </a:prstGeom>
+                <a:noFill/>
+                <a:ln w="9525">
+                  <a:solidFill>
+                    <a:srgbClr val="000099"/>
+                  </a:solidFill>
+                  <a:round/>
+                  <a:headEnd/>
+                  <a:tailEnd/>
+                </a:ln>
+              </p:spPr>
+              <p:txBody>
+                <a:bodyPr wrap="none" lIns="92075" tIns="46038" rIns="92075" bIns="46038" anchor="ctr"/>
+                <a:lstStyle/>
+                <a:p>
+                  <a:pPr marL="0" marR="0" lvl="0" indent="0" algn="ctr" defTabSz="914400" eaLnBrk="0" fontAlgn="base" latinLnBrk="0" hangingPunct="0">
+                    <a:lnSpc>
+                      <a:spcPct val="100000"/>
+                    </a:lnSpc>
+                    <a:spcBef>
+                      <a:spcPct val="0"/>
+                    </a:spcBef>
+                    <a:spcAft>
+                      <a:spcPct val="0"/>
+                    </a:spcAft>
+                    <a:buClrTx/>
+                    <a:buSzTx/>
+                    <a:buFontTx/>
+                    <a:buNone/>
+                    <a:tabLst/>
+                    <a:defRPr/>
+                  </a:pPr>
+                  <a:endParaRPr kumimoji="0" lang="en-US" sz="2400" b="0" i="0" u="none" strike="noStrike" kern="0" cap="none" spc="0" normalizeH="0" baseline="0" noProof="0" dirty="0">
+                    <a:ln>
+                      <a:noFill/>
+                    </a:ln>
+                    <a:effectLst/>
+                    <a:uLnTx/>
+                    <a:uFillTx/>
+                    <a:latin typeface="Arial" charset="0"/>
+                  </a:endParaRPr>
+                </a:p>
+              </p:txBody>
+            </p:sp>
+            <p:sp>
+              <p:nvSpPr>
+                <p:cNvPr id="38" name="Line 62">
+                  <a:extLst>
+                    <a:ext uri="{FF2B5EF4-FFF2-40B4-BE49-F238E27FC236}">
+                      <a16:creationId xmlns:a16="http://schemas.microsoft.com/office/drawing/2014/main" id="{5ABB38A1-F213-796B-29AC-9715CD589609}"/>
+                    </a:ext>
+                  </a:extLst>
+                </p:cNvPr>
+                <p:cNvSpPr>
+                  <a:spLocks noChangeShapeType="1"/>
+                </p:cNvSpPr>
+                <p:nvPr/>
+              </p:nvSpPr>
+              <p:spPr bwMode="auto">
+                <a:xfrm>
+                  <a:off x="797" y="2774"/>
+                  <a:ext cx="0" cy="230"/>
+                </a:xfrm>
+                <a:prstGeom prst="line">
+                  <a:avLst/>
+                </a:prstGeom>
+                <a:noFill/>
+                <a:ln w="9525">
+                  <a:solidFill>
+                    <a:schemeClr val="tx1"/>
+                  </a:solidFill>
+                  <a:round/>
+                  <a:headEnd/>
+                  <a:tailEnd/>
+                </a:ln>
+              </p:spPr>
+              <p:txBody>
+                <a:bodyPr wrap="none" lIns="92075" tIns="46038" rIns="92075" bIns="46038" anchor="ctr"/>
+                <a:lstStyle/>
+                <a:p>
+                  <a:pPr marL="0" marR="0" lvl="0" indent="0" algn="ctr" defTabSz="914400" eaLnBrk="0" fontAlgn="base" latinLnBrk="0" hangingPunct="0">
+                    <a:lnSpc>
+                      <a:spcPct val="100000"/>
+                    </a:lnSpc>
+                    <a:spcBef>
+                      <a:spcPct val="0"/>
+                    </a:spcBef>
+                    <a:spcAft>
+                      <a:spcPct val="0"/>
+                    </a:spcAft>
+                    <a:buClrTx/>
+                    <a:buSzTx/>
+                    <a:buFontTx/>
+                    <a:buNone/>
+                    <a:tabLst/>
+                    <a:defRPr/>
+                  </a:pPr>
+                  <a:endParaRPr kumimoji="0" lang="en-US" sz="2400" b="0" i="0" u="none" strike="noStrike" kern="0" cap="none" spc="0" normalizeH="0" baseline="0" noProof="0" dirty="0">
+                    <a:ln>
+                      <a:noFill/>
+                    </a:ln>
+                    <a:effectLst/>
+                    <a:uLnTx/>
+                    <a:uFillTx/>
+                    <a:latin typeface="Arial" charset="0"/>
+                  </a:endParaRPr>
+                </a:p>
+              </p:txBody>
+            </p:sp>
+            <p:sp>
+              <p:nvSpPr>
+                <p:cNvPr id="39" name="Line 63">
+                  <a:extLst>
+                    <a:ext uri="{FF2B5EF4-FFF2-40B4-BE49-F238E27FC236}">
+                      <a16:creationId xmlns:a16="http://schemas.microsoft.com/office/drawing/2014/main" id="{F5566025-DF6A-9500-70AD-C92BA5E6157C}"/>
+                    </a:ext>
+                  </a:extLst>
+                </p:cNvPr>
+                <p:cNvSpPr>
+                  <a:spLocks noChangeShapeType="1"/>
+                </p:cNvSpPr>
+                <p:nvPr/>
+              </p:nvSpPr>
+              <p:spPr bwMode="auto">
+                <a:xfrm>
+                  <a:off x="1373" y="2774"/>
+                  <a:ext cx="0" cy="230"/>
+                </a:xfrm>
+                <a:prstGeom prst="line">
+                  <a:avLst/>
+                </a:prstGeom>
+                <a:noFill/>
+                <a:ln w="9525">
+                  <a:solidFill>
+                    <a:schemeClr val="tx1"/>
+                  </a:solidFill>
+                  <a:round/>
+                  <a:headEnd/>
+                  <a:tailEnd/>
+                </a:ln>
+              </p:spPr>
+              <p:txBody>
+                <a:bodyPr wrap="none" lIns="92075" tIns="46038" rIns="92075" bIns="46038" anchor="ctr"/>
+                <a:lstStyle/>
+                <a:p>
+                  <a:pPr marL="0" marR="0" lvl="0" indent="0" algn="ctr" defTabSz="914400" eaLnBrk="0" fontAlgn="base" latinLnBrk="0" hangingPunct="0">
+                    <a:lnSpc>
+                      <a:spcPct val="100000"/>
+                    </a:lnSpc>
+                    <a:spcBef>
+                      <a:spcPct val="0"/>
+                    </a:spcBef>
+                    <a:spcAft>
+                      <a:spcPct val="0"/>
+                    </a:spcAft>
+                    <a:buClrTx/>
+                    <a:buSzTx/>
+                    <a:buFontTx/>
+                    <a:buNone/>
+                    <a:tabLst/>
+                    <a:defRPr/>
+                  </a:pPr>
+                  <a:endParaRPr kumimoji="0" lang="en-US" sz="2400" b="0" i="0" u="none" strike="noStrike" kern="0" cap="none" spc="0" normalizeH="0" baseline="0" noProof="0" dirty="0">
+                    <a:ln>
+                      <a:noFill/>
+                    </a:ln>
+                    <a:effectLst/>
+                    <a:uLnTx/>
+                    <a:uFillTx/>
+                    <a:latin typeface="Arial" charset="0"/>
+                  </a:endParaRPr>
+                </a:p>
+              </p:txBody>
+            </p:sp>
+            <p:sp>
+              <p:nvSpPr>
+                <p:cNvPr id="40" name="Line 64">
+                  <a:extLst>
+                    <a:ext uri="{FF2B5EF4-FFF2-40B4-BE49-F238E27FC236}">
+                      <a16:creationId xmlns:a16="http://schemas.microsoft.com/office/drawing/2014/main" id="{EA7E2FAF-1F1B-4E60-532D-944A878D0C04}"/>
+                    </a:ext>
+                  </a:extLst>
+                </p:cNvPr>
+                <p:cNvSpPr>
+                  <a:spLocks noChangeShapeType="1"/>
+                </p:cNvSpPr>
+                <p:nvPr/>
+              </p:nvSpPr>
+              <p:spPr bwMode="auto">
+                <a:xfrm>
+                  <a:off x="624" y="2774"/>
+                  <a:ext cx="173" cy="0"/>
+                </a:xfrm>
+                <a:prstGeom prst="line">
+                  <a:avLst/>
+                </a:prstGeom>
+                <a:noFill/>
+                <a:ln w="9525">
+                  <a:solidFill>
+                    <a:schemeClr val="tx1"/>
+                  </a:solidFill>
+                  <a:round/>
+                  <a:headEnd/>
+                  <a:tailEnd/>
+                </a:ln>
+              </p:spPr>
+              <p:txBody>
+                <a:bodyPr wrap="none" lIns="92075" tIns="46038" rIns="92075" bIns="46038" anchor="ctr"/>
+                <a:lstStyle/>
+                <a:p>
+                  <a:pPr marL="0" marR="0" lvl="0" indent="0" algn="ctr" defTabSz="914400" eaLnBrk="0" fontAlgn="base" latinLnBrk="0" hangingPunct="0">
+                    <a:lnSpc>
+                      <a:spcPct val="100000"/>
+                    </a:lnSpc>
+                    <a:spcBef>
+                      <a:spcPct val="0"/>
+                    </a:spcBef>
+                    <a:spcAft>
+                      <a:spcPct val="0"/>
+                    </a:spcAft>
+                    <a:buClrTx/>
+                    <a:buSzTx/>
+                    <a:buFontTx/>
+                    <a:buNone/>
+                    <a:tabLst/>
+                    <a:defRPr/>
+                  </a:pPr>
+                  <a:endParaRPr kumimoji="0" lang="en-US" sz="2400" b="0" i="0" u="none" strike="noStrike" kern="0" cap="none" spc="0" normalizeH="0" baseline="0" noProof="0" dirty="0">
+                    <a:ln>
+                      <a:noFill/>
+                    </a:ln>
+                    <a:effectLst/>
+                    <a:uLnTx/>
+                    <a:uFillTx/>
+                    <a:latin typeface="Arial" charset="0"/>
+                  </a:endParaRPr>
+                </a:p>
+              </p:txBody>
+            </p:sp>
+            <p:sp>
+              <p:nvSpPr>
+                <p:cNvPr id="41" name="Line 65">
+                  <a:extLst>
+                    <a:ext uri="{FF2B5EF4-FFF2-40B4-BE49-F238E27FC236}">
+                      <a16:creationId xmlns:a16="http://schemas.microsoft.com/office/drawing/2014/main" id="{AF7387A4-52D2-4536-B336-61530BDC6BB0}"/>
+                    </a:ext>
+                  </a:extLst>
+                </p:cNvPr>
+                <p:cNvSpPr>
+                  <a:spLocks noChangeShapeType="1"/>
+                </p:cNvSpPr>
+                <p:nvPr/>
+              </p:nvSpPr>
+              <p:spPr bwMode="auto">
+                <a:xfrm>
+                  <a:off x="1372" y="2774"/>
+                  <a:ext cx="173" cy="0"/>
+                </a:xfrm>
+                <a:prstGeom prst="line">
+                  <a:avLst/>
+                </a:prstGeom>
+                <a:noFill/>
+                <a:ln w="9525">
+                  <a:solidFill>
+                    <a:schemeClr val="tx1"/>
+                  </a:solidFill>
+                  <a:round/>
+                  <a:headEnd/>
+                  <a:tailEnd/>
+                </a:ln>
+              </p:spPr>
+              <p:txBody>
+                <a:bodyPr wrap="none" lIns="92075" tIns="46038" rIns="92075" bIns="46038" anchor="ctr"/>
+                <a:lstStyle/>
+                <a:p>
+                  <a:pPr marL="0" marR="0" lvl="0" indent="0" algn="ctr" defTabSz="914400" eaLnBrk="0" fontAlgn="base" latinLnBrk="0" hangingPunct="0">
+                    <a:lnSpc>
+                      <a:spcPct val="100000"/>
+                    </a:lnSpc>
+                    <a:spcBef>
+                      <a:spcPct val="0"/>
+                    </a:spcBef>
+                    <a:spcAft>
+                      <a:spcPct val="0"/>
+                    </a:spcAft>
+                    <a:buClrTx/>
+                    <a:buSzTx/>
+                    <a:buFontTx/>
+                    <a:buNone/>
+                    <a:tabLst/>
+                    <a:defRPr/>
+                  </a:pPr>
+                  <a:endParaRPr kumimoji="0" lang="en-US" sz="2400" b="0" i="0" u="none" strike="noStrike" kern="0" cap="none" spc="0" normalizeH="0" baseline="0" noProof="0" dirty="0">
+                    <a:ln>
+                      <a:noFill/>
+                    </a:ln>
+                    <a:effectLst/>
+                    <a:uLnTx/>
+                    <a:uFillTx/>
+                    <a:latin typeface="Arial" charset="0"/>
+                  </a:endParaRPr>
+                </a:p>
+              </p:txBody>
+            </p:sp>
+          </p:grpSp>
+          <p:sp>
+            <p:nvSpPr>
+              <p:cNvPr id="32" name="Text Box 66">
+                <a:extLst>
+                  <a:ext uri="{FF2B5EF4-FFF2-40B4-BE49-F238E27FC236}">
+                    <a16:creationId xmlns:a16="http://schemas.microsoft.com/office/drawing/2014/main" id="{7D69655C-E433-AA7D-601C-7381EF5FDA96}"/>
+                  </a:ext>
+                </a:extLst>
+              </p:cNvPr>
+              <p:cNvSpPr txBox="1">
+                <a:spLocks noChangeArrowheads="1"/>
+              </p:cNvSpPr>
+              <p:nvPr/>
+            </p:nvSpPr>
+            <p:spPr bwMode="auto">
+              <a:xfrm>
+                <a:off x="839" y="2784"/>
+                <a:ext cx="489" cy="204"/>
+              </a:xfrm>
+              <a:prstGeom prst="rect">
+                <a:avLst/>
+              </a:prstGeom>
+              <a:noFill/>
+              <a:ln w="9525">
+                <a:noFill/>
+                <a:miter lim="800000"/>
+                <a:headEnd/>
+                <a:tailEnd/>
+              </a:ln>
+            </p:spPr>
+            <p:txBody>
+              <a:bodyPr wrap="none" lIns="92075" tIns="46038" rIns="92075" bIns="46038">
+                <a:spAutoFit/>
+              </a:bodyPr>
+              <a:lstStyle/>
+              <a:p>
+                <a:pPr marL="0" marR="0" lvl="0" indent="0" algn="ctr" defTabSz="914400" eaLnBrk="0" fontAlgn="base" latinLnBrk="0" hangingPunct="0">
+                  <a:lnSpc>
+                    <a:spcPct val="100000"/>
+                  </a:lnSpc>
+                  <a:spcBef>
+                    <a:spcPct val="0"/>
+                  </a:spcBef>
+                  <a:spcAft>
+                    <a:spcPct val="0"/>
+                  </a:spcAft>
+                  <a:buClrTx/>
+                  <a:buSzTx/>
+                  <a:buFontTx/>
+                  <a:buNone/>
+                  <a:tabLst/>
+                  <a:defRPr/>
+                </a:pPr>
+                <a:r>
+                  <a:rPr lang="en-US" sz="1500" kern="0" dirty="0">
+                    <a:latin typeface="Arial" charset="0"/>
+                  </a:rPr>
+                  <a:t>x86-64</a:t>
+                </a:r>
+                <a:endParaRPr kumimoji="0" lang="en-US" sz="1500" b="0" i="0" u="none" strike="noStrike" kern="0" cap="none" spc="0" normalizeH="0" baseline="0" noProof="0" dirty="0">
+                  <a:ln>
+                    <a:noFill/>
+                  </a:ln>
+                  <a:effectLst/>
+                  <a:uLnTx/>
+                  <a:uFillTx/>
+                  <a:latin typeface="Arial" charset="0"/>
+                </a:endParaRPr>
+              </a:p>
+            </p:txBody>
+          </p:sp>
+          <p:sp>
+            <p:nvSpPr>
+              <p:cNvPr id="33" name="Text Box 67">
+                <a:extLst>
+                  <a:ext uri="{FF2B5EF4-FFF2-40B4-BE49-F238E27FC236}">
+                    <a16:creationId xmlns:a16="http://schemas.microsoft.com/office/drawing/2014/main" id="{E227FE5A-7218-66B8-6966-C999023A7874}"/>
+                  </a:ext>
+                </a:extLst>
+              </p:cNvPr>
+              <p:cNvSpPr txBox="1">
+                <a:spLocks noChangeArrowheads="1"/>
+              </p:cNvSpPr>
+              <p:nvPr/>
+            </p:nvSpPr>
+            <p:spPr bwMode="auto">
+              <a:xfrm>
+                <a:off x="632" y="2557"/>
+                <a:ext cx="904" cy="204"/>
+              </a:xfrm>
+              <a:prstGeom prst="rect">
+                <a:avLst/>
+              </a:prstGeom>
+              <a:noFill/>
+              <a:ln w="9525">
+                <a:noFill/>
+                <a:miter lim="800000"/>
+                <a:headEnd/>
+                <a:tailEnd/>
+              </a:ln>
+            </p:spPr>
+            <p:txBody>
+              <a:bodyPr wrap="none" lIns="92075" tIns="46038" rIns="92075" bIns="46038">
+                <a:spAutoFit/>
+              </a:bodyPr>
+              <a:lstStyle/>
+              <a:p>
+                <a:pPr marL="0" marR="0" lvl="0" indent="0" algn="ctr" defTabSz="914400" eaLnBrk="0" fontAlgn="base" latinLnBrk="0" hangingPunct="0">
+                  <a:lnSpc>
+                    <a:spcPct val="100000"/>
+                  </a:lnSpc>
+                  <a:spcBef>
+                    <a:spcPct val="0"/>
+                  </a:spcBef>
+                  <a:spcAft>
+                    <a:spcPct val="0"/>
+                  </a:spcAft>
+                  <a:buClrTx/>
+                  <a:buSzTx/>
+                  <a:buFontTx/>
+                  <a:buNone/>
+                  <a:tabLst/>
+                  <a:defRPr/>
+                </a:pPr>
+                <a:r>
+                  <a:rPr kumimoji="0" lang="en-US" sz="1500" b="0" i="0" u="none" strike="noStrike" kern="0" cap="none" spc="0" normalizeH="0" baseline="0" noProof="0" dirty="0">
+                    <a:ln>
+                      <a:noFill/>
+                    </a:ln>
+                    <a:effectLst/>
+                    <a:uLnTx/>
+                    <a:uFillTx/>
+                    <a:latin typeface="Arial" charset="0"/>
+                  </a:rPr>
+                  <a:t>C</a:t>
+                </a:r>
+                <a:r>
+                  <a:rPr lang="en-US" sz="1500" kern="0" dirty="0">
+                    <a:latin typeface="Arial" charset="0"/>
+                  </a:rPr>
+                  <a:t>++</a:t>
+                </a:r>
+                <a:r>
+                  <a:rPr kumimoji="0" lang="en-US" sz="1500" b="0" i="0" u="none" strike="noStrike" kern="0" cap="none" spc="0" normalizeH="0" baseline="0" noProof="0" dirty="0">
+                    <a:ln>
+                      <a:noFill/>
+                    </a:ln>
+                    <a:effectLst/>
+                    <a:uLnTx/>
+                    <a:uFillTx/>
+                    <a:latin typeface="Arial" charset="0"/>
+                  </a:rPr>
+                  <a:t> </a:t>
+                </a:r>
+                <a:r>
+                  <a:rPr kumimoji="0" lang="en-US" sz="1500" b="0" i="0" u="none" strike="noStrike" kern="0" cap="none" spc="0" normalizeH="0" baseline="0" noProof="0" dirty="0">
+                    <a:ln>
+                      <a:noFill/>
+                    </a:ln>
+                    <a:effectLst/>
+                    <a:uLnTx/>
+                    <a:uFillTx/>
+                    <a:latin typeface="Arial" charset="0"/>
+                    <a:sym typeface="Symbol" pitchFamily="18" charset="2"/>
+                  </a:rPr>
+                  <a:t> x86-64</a:t>
+                </a:r>
+              </a:p>
+            </p:txBody>
+          </p:sp>
+        </p:grpSp>
+        <p:grpSp>
+          <p:nvGrpSpPr>
+            <p:cNvPr id="9" name="Group 68">
+              <a:extLst>
+                <a:ext uri="{FF2B5EF4-FFF2-40B4-BE49-F238E27FC236}">
+                  <a16:creationId xmlns:a16="http://schemas.microsoft.com/office/drawing/2014/main" id="{DE0DA76B-A389-C715-C7CF-41A13B55CFE9}"/>
+                </a:ext>
+              </a:extLst>
+            </p:cNvPr>
+            <p:cNvGrpSpPr>
+              <a:grpSpLocks/>
+            </p:cNvGrpSpPr>
+            <p:nvPr/>
+          </p:nvGrpSpPr>
+          <p:grpSpPr bwMode="auto">
+            <a:xfrm>
+              <a:off x="6630275" y="2287554"/>
+              <a:ext cx="1552576" cy="730250"/>
+              <a:chOff x="595" y="2544"/>
+              <a:chExt cx="978" cy="460"/>
+            </a:xfrm>
+          </p:grpSpPr>
+          <p:grpSp>
+            <p:nvGrpSpPr>
+              <p:cNvPr id="20" name="Group 69">
+                <a:extLst>
+                  <a:ext uri="{FF2B5EF4-FFF2-40B4-BE49-F238E27FC236}">
+                    <a16:creationId xmlns:a16="http://schemas.microsoft.com/office/drawing/2014/main" id="{2432E12E-E26B-2741-AFAD-09571592523B}"/>
+                  </a:ext>
+                </a:extLst>
+              </p:cNvPr>
+              <p:cNvGrpSpPr>
+                <a:grpSpLocks/>
+              </p:cNvGrpSpPr>
+              <p:nvPr/>
+            </p:nvGrpSpPr>
+            <p:grpSpPr bwMode="auto">
+              <a:xfrm>
+                <a:off x="624" y="2544"/>
+                <a:ext cx="921" cy="460"/>
+                <a:chOff x="624" y="2544"/>
+                <a:chExt cx="921" cy="460"/>
+              </a:xfrm>
+            </p:grpSpPr>
+            <p:sp>
+              <p:nvSpPr>
+                <p:cNvPr id="23" name="Line 70">
+                  <a:extLst>
+                    <a:ext uri="{FF2B5EF4-FFF2-40B4-BE49-F238E27FC236}">
+                      <a16:creationId xmlns:a16="http://schemas.microsoft.com/office/drawing/2014/main" id="{A46C2015-13EE-14E1-FF46-29DD179BDF83}"/>
+                    </a:ext>
+                  </a:extLst>
+                </p:cNvPr>
+                <p:cNvSpPr>
+                  <a:spLocks noChangeShapeType="1"/>
+                </p:cNvSpPr>
+                <p:nvPr/>
+              </p:nvSpPr>
+              <p:spPr bwMode="auto">
+                <a:xfrm>
+                  <a:off x="624" y="2544"/>
+                  <a:ext cx="921" cy="0"/>
+                </a:xfrm>
+                <a:prstGeom prst="line">
+                  <a:avLst/>
+                </a:prstGeom>
+                <a:noFill/>
+                <a:ln w="9525">
+                  <a:solidFill>
+                    <a:schemeClr val="tx1"/>
+                  </a:solidFill>
+                  <a:round/>
+                  <a:headEnd/>
+                  <a:tailEnd/>
+                </a:ln>
+              </p:spPr>
+              <p:txBody>
+                <a:bodyPr wrap="none" lIns="92075" tIns="46038" rIns="92075" bIns="46038" anchor="ctr"/>
+                <a:lstStyle/>
+                <a:p>
+                  <a:pPr marL="0" marR="0" lvl="0" indent="0" algn="ctr" defTabSz="914400" eaLnBrk="0" fontAlgn="base" latinLnBrk="0" hangingPunct="0">
+                    <a:lnSpc>
+                      <a:spcPct val="100000"/>
+                    </a:lnSpc>
+                    <a:spcBef>
+                      <a:spcPct val="0"/>
+                    </a:spcBef>
+                    <a:spcAft>
+                      <a:spcPct val="0"/>
+                    </a:spcAft>
+                    <a:buClrTx/>
+                    <a:buSzTx/>
+                    <a:buFontTx/>
+                    <a:buNone/>
+                    <a:tabLst/>
+                    <a:defRPr/>
+                  </a:pPr>
+                  <a:endParaRPr kumimoji="0" lang="en-US" sz="2400" b="0" i="0" u="none" strike="noStrike" kern="0" cap="none" spc="0" normalizeH="0" baseline="0" noProof="0" dirty="0">
+                    <a:ln>
+                      <a:noFill/>
+                    </a:ln>
+                    <a:effectLst/>
+                    <a:uLnTx/>
+                    <a:uFillTx/>
+                    <a:latin typeface="Arial" charset="0"/>
+                  </a:endParaRPr>
+                </a:p>
+              </p:txBody>
+            </p:sp>
+            <p:sp>
+              <p:nvSpPr>
+                <p:cNvPr id="24" name="Line 71">
+                  <a:extLst>
+                    <a:ext uri="{FF2B5EF4-FFF2-40B4-BE49-F238E27FC236}">
+                      <a16:creationId xmlns:a16="http://schemas.microsoft.com/office/drawing/2014/main" id="{B162363E-3CB4-B753-21A1-E884B2AB1254}"/>
+                    </a:ext>
+                  </a:extLst>
+                </p:cNvPr>
+                <p:cNvSpPr>
+                  <a:spLocks noChangeShapeType="1"/>
+                </p:cNvSpPr>
+                <p:nvPr/>
+              </p:nvSpPr>
+              <p:spPr bwMode="auto">
+                <a:xfrm>
+                  <a:off x="797" y="3004"/>
+                  <a:ext cx="576" cy="0"/>
+                </a:xfrm>
+                <a:prstGeom prst="line">
+                  <a:avLst/>
+                </a:prstGeom>
+                <a:noFill/>
+                <a:ln w="9525">
+                  <a:solidFill>
+                    <a:schemeClr val="tx1"/>
+                  </a:solidFill>
+                  <a:round/>
+                  <a:headEnd/>
+                  <a:tailEnd/>
+                </a:ln>
+              </p:spPr>
+              <p:txBody>
+                <a:bodyPr wrap="none" lIns="92075" tIns="46038" rIns="92075" bIns="46038" anchor="ctr"/>
+                <a:lstStyle/>
+                <a:p>
+                  <a:pPr marL="0" marR="0" lvl="0" indent="0" algn="ctr" defTabSz="914400" eaLnBrk="0" fontAlgn="base" latinLnBrk="0" hangingPunct="0">
+                    <a:lnSpc>
+                      <a:spcPct val="100000"/>
+                    </a:lnSpc>
+                    <a:spcBef>
+                      <a:spcPct val="0"/>
+                    </a:spcBef>
+                    <a:spcAft>
+                      <a:spcPct val="0"/>
+                    </a:spcAft>
+                    <a:buClrTx/>
+                    <a:buSzTx/>
+                    <a:buFontTx/>
+                    <a:buNone/>
+                    <a:tabLst/>
+                    <a:defRPr/>
+                  </a:pPr>
+                  <a:endParaRPr kumimoji="0" lang="en-US" sz="2400" b="0" i="0" u="none" strike="noStrike" kern="0" cap="none" spc="0" normalizeH="0" baseline="0" noProof="0" dirty="0">
+                    <a:ln>
+                      <a:noFill/>
+                    </a:ln>
+                    <a:effectLst/>
+                    <a:uLnTx/>
+                    <a:uFillTx/>
+                    <a:latin typeface="Arial" charset="0"/>
+                  </a:endParaRPr>
+                </a:p>
+              </p:txBody>
+            </p:sp>
+            <p:sp>
+              <p:nvSpPr>
+                <p:cNvPr id="25" name="Line 72">
+                  <a:extLst>
+                    <a:ext uri="{FF2B5EF4-FFF2-40B4-BE49-F238E27FC236}">
+                      <a16:creationId xmlns:a16="http://schemas.microsoft.com/office/drawing/2014/main" id="{6FB555BF-87C2-74C6-6F16-BA3803A38431}"/>
+                    </a:ext>
+                  </a:extLst>
+                </p:cNvPr>
+                <p:cNvSpPr>
+                  <a:spLocks noChangeShapeType="1"/>
+                </p:cNvSpPr>
+                <p:nvPr/>
+              </p:nvSpPr>
+              <p:spPr bwMode="auto">
+                <a:xfrm>
+                  <a:off x="625" y="2544"/>
+                  <a:ext cx="0" cy="230"/>
+                </a:xfrm>
+                <a:prstGeom prst="line">
+                  <a:avLst/>
+                </a:prstGeom>
+                <a:noFill/>
+                <a:ln w="9525">
+                  <a:solidFill>
+                    <a:schemeClr val="tx1"/>
+                  </a:solidFill>
+                  <a:round/>
+                  <a:headEnd/>
+                  <a:tailEnd/>
+                </a:ln>
+              </p:spPr>
+              <p:txBody>
+                <a:bodyPr wrap="none" lIns="92075" tIns="46038" rIns="92075" bIns="46038" anchor="ctr"/>
+                <a:lstStyle/>
+                <a:p>
+                  <a:pPr marL="0" marR="0" lvl="0" indent="0" algn="ctr" defTabSz="914400" eaLnBrk="0" fontAlgn="base" latinLnBrk="0" hangingPunct="0">
+                    <a:lnSpc>
+                      <a:spcPct val="100000"/>
+                    </a:lnSpc>
+                    <a:spcBef>
+                      <a:spcPct val="0"/>
+                    </a:spcBef>
+                    <a:spcAft>
+                      <a:spcPct val="0"/>
+                    </a:spcAft>
+                    <a:buClrTx/>
+                    <a:buSzTx/>
+                    <a:buFontTx/>
+                    <a:buNone/>
+                    <a:tabLst/>
+                    <a:defRPr/>
+                  </a:pPr>
+                  <a:endParaRPr kumimoji="0" lang="en-US" sz="2400" b="0" i="0" u="none" strike="noStrike" kern="0" cap="none" spc="0" normalizeH="0" baseline="0" noProof="0" dirty="0">
+                    <a:ln>
+                      <a:noFill/>
+                    </a:ln>
+                    <a:effectLst/>
+                    <a:uLnTx/>
+                    <a:uFillTx/>
+                    <a:latin typeface="Arial" charset="0"/>
+                  </a:endParaRPr>
+                </a:p>
+              </p:txBody>
+            </p:sp>
+            <p:sp>
+              <p:nvSpPr>
+                <p:cNvPr id="26" name="Line 73">
+                  <a:extLst>
+                    <a:ext uri="{FF2B5EF4-FFF2-40B4-BE49-F238E27FC236}">
+                      <a16:creationId xmlns:a16="http://schemas.microsoft.com/office/drawing/2014/main" id="{CBD3D357-F116-A774-BBBB-EE2D6DDF804C}"/>
+                    </a:ext>
+                  </a:extLst>
+                </p:cNvPr>
+                <p:cNvSpPr>
+                  <a:spLocks noChangeShapeType="1"/>
+                </p:cNvSpPr>
+                <p:nvPr/>
+              </p:nvSpPr>
+              <p:spPr bwMode="auto">
+                <a:xfrm>
+                  <a:off x="1545" y="2544"/>
+                  <a:ext cx="0" cy="230"/>
+                </a:xfrm>
+                <a:prstGeom prst="line">
+                  <a:avLst/>
+                </a:prstGeom>
+                <a:noFill/>
+                <a:ln w="9525">
+                  <a:solidFill>
+                    <a:schemeClr val="tx1"/>
+                  </a:solidFill>
+                  <a:round/>
+                  <a:headEnd/>
+                  <a:tailEnd/>
+                </a:ln>
+              </p:spPr>
+              <p:txBody>
+                <a:bodyPr wrap="none" lIns="92075" tIns="46038" rIns="92075" bIns="46038" anchor="ctr"/>
+                <a:lstStyle/>
+                <a:p>
+                  <a:pPr marL="0" marR="0" lvl="0" indent="0" algn="ctr" defTabSz="914400" eaLnBrk="0" fontAlgn="base" latinLnBrk="0" hangingPunct="0">
+                    <a:lnSpc>
+                      <a:spcPct val="100000"/>
+                    </a:lnSpc>
+                    <a:spcBef>
+                      <a:spcPct val="0"/>
+                    </a:spcBef>
+                    <a:spcAft>
+                      <a:spcPct val="0"/>
+                    </a:spcAft>
+                    <a:buClrTx/>
+                    <a:buSzTx/>
+                    <a:buFontTx/>
+                    <a:buNone/>
+                    <a:tabLst/>
+                    <a:defRPr/>
+                  </a:pPr>
+                  <a:endParaRPr kumimoji="0" lang="en-US" sz="2400" b="0" i="0" u="none" strike="noStrike" kern="0" cap="none" spc="0" normalizeH="0" baseline="0" noProof="0" dirty="0">
+                    <a:ln>
+                      <a:noFill/>
+                    </a:ln>
+                    <a:effectLst/>
+                    <a:uLnTx/>
+                    <a:uFillTx/>
+                    <a:latin typeface="Arial" charset="0"/>
+                  </a:endParaRPr>
+                </a:p>
+              </p:txBody>
+            </p:sp>
+            <p:sp>
+              <p:nvSpPr>
+                <p:cNvPr id="27" name="Line 74">
+                  <a:extLst>
+                    <a:ext uri="{FF2B5EF4-FFF2-40B4-BE49-F238E27FC236}">
+                      <a16:creationId xmlns:a16="http://schemas.microsoft.com/office/drawing/2014/main" id="{BD8671A8-8C67-7905-1A1D-86AE23C20E98}"/>
+                    </a:ext>
+                  </a:extLst>
+                </p:cNvPr>
+                <p:cNvSpPr>
+                  <a:spLocks noChangeShapeType="1"/>
+                </p:cNvSpPr>
+                <p:nvPr/>
+              </p:nvSpPr>
+              <p:spPr bwMode="auto">
+                <a:xfrm>
+                  <a:off x="797" y="2774"/>
+                  <a:ext cx="0" cy="230"/>
+                </a:xfrm>
+                <a:prstGeom prst="line">
+                  <a:avLst/>
+                </a:prstGeom>
+                <a:noFill/>
+                <a:ln w="9525">
+                  <a:solidFill>
+                    <a:schemeClr val="tx1"/>
+                  </a:solidFill>
+                  <a:round/>
+                  <a:headEnd/>
+                  <a:tailEnd/>
+                </a:ln>
+              </p:spPr>
+              <p:txBody>
+                <a:bodyPr wrap="none" lIns="92075" tIns="46038" rIns="92075" bIns="46038" anchor="ctr"/>
+                <a:lstStyle/>
+                <a:p>
+                  <a:pPr marL="0" marR="0" lvl="0" indent="0" algn="ctr" defTabSz="914400" eaLnBrk="0" fontAlgn="base" latinLnBrk="0" hangingPunct="0">
+                    <a:lnSpc>
+                      <a:spcPct val="100000"/>
+                    </a:lnSpc>
+                    <a:spcBef>
+                      <a:spcPct val="0"/>
+                    </a:spcBef>
+                    <a:spcAft>
+                      <a:spcPct val="0"/>
+                    </a:spcAft>
+                    <a:buClrTx/>
+                    <a:buSzTx/>
+                    <a:buFontTx/>
+                    <a:buNone/>
+                    <a:tabLst/>
+                    <a:defRPr/>
+                  </a:pPr>
+                  <a:endParaRPr kumimoji="0" lang="en-US" sz="2400" b="0" i="0" u="none" strike="noStrike" kern="0" cap="none" spc="0" normalizeH="0" baseline="0" noProof="0" dirty="0">
+                    <a:ln>
+                      <a:noFill/>
+                    </a:ln>
+                    <a:effectLst/>
+                    <a:uLnTx/>
+                    <a:uFillTx/>
+                    <a:latin typeface="Arial" charset="0"/>
+                  </a:endParaRPr>
+                </a:p>
+              </p:txBody>
+            </p:sp>
+            <p:sp>
+              <p:nvSpPr>
+                <p:cNvPr id="28" name="Line 75">
+                  <a:extLst>
+                    <a:ext uri="{FF2B5EF4-FFF2-40B4-BE49-F238E27FC236}">
+                      <a16:creationId xmlns:a16="http://schemas.microsoft.com/office/drawing/2014/main" id="{9F635DAD-7B66-0606-6F24-A67BD02A12D5}"/>
+                    </a:ext>
+                  </a:extLst>
+                </p:cNvPr>
+                <p:cNvSpPr>
+                  <a:spLocks noChangeShapeType="1"/>
+                </p:cNvSpPr>
+                <p:nvPr/>
+              </p:nvSpPr>
+              <p:spPr bwMode="auto">
+                <a:xfrm>
+                  <a:off x="1373" y="2774"/>
+                  <a:ext cx="0" cy="230"/>
+                </a:xfrm>
+                <a:prstGeom prst="line">
+                  <a:avLst/>
+                </a:prstGeom>
+                <a:noFill/>
+                <a:ln w="9525">
+                  <a:solidFill>
+                    <a:schemeClr val="tx1"/>
+                  </a:solidFill>
+                  <a:round/>
+                  <a:headEnd/>
+                  <a:tailEnd/>
+                </a:ln>
+              </p:spPr>
+              <p:txBody>
+                <a:bodyPr wrap="none" lIns="92075" tIns="46038" rIns="92075" bIns="46038" anchor="ctr"/>
+                <a:lstStyle/>
+                <a:p>
+                  <a:pPr marL="0" marR="0" lvl="0" indent="0" algn="ctr" defTabSz="914400" eaLnBrk="0" fontAlgn="base" latinLnBrk="0" hangingPunct="0">
+                    <a:lnSpc>
+                      <a:spcPct val="100000"/>
+                    </a:lnSpc>
+                    <a:spcBef>
+                      <a:spcPct val="0"/>
+                    </a:spcBef>
+                    <a:spcAft>
+                      <a:spcPct val="0"/>
+                    </a:spcAft>
+                    <a:buClrTx/>
+                    <a:buSzTx/>
+                    <a:buFontTx/>
+                    <a:buNone/>
+                    <a:tabLst/>
+                    <a:defRPr/>
+                  </a:pPr>
+                  <a:endParaRPr kumimoji="0" lang="en-US" sz="2400" b="0" i="0" u="none" strike="noStrike" kern="0" cap="none" spc="0" normalizeH="0" baseline="0" noProof="0" dirty="0">
+                    <a:ln>
+                      <a:noFill/>
+                    </a:ln>
+                    <a:effectLst/>
+                    <a:uLnTx/>
+                    <a:uFillTx/>
+                    <a:latin typeface="Arial" charset="0"/>
+                  </a:endParaRPr>
+                </a:p>
+              </p:txBody>
+            </p:sp>
+            <p:sp>
+              <p:nvSpPr>
+                <p:cNvPr id="29" name="Line 76">
+                  <a:extLst>
+                    <a:ext uri="{FF2B5EF4-FFF2-40B4-BE49-F238E27FC236}">
+                      <a16:creationId xmlns:a16="http://schemas.microsoft.com/office/drawing/2014/main" id="{9E208568-F7B7-7C25-4E4A-FE6BCF8B8460}"/>
+                    </a:ext>
+                  </a:extLst>
+                </p:cNvPr>
+                <p:cNvSpPr>
+                  <a:spLocks noChangeShapeType="1"/>
+                </p:cNvSpPr>
+                <p:nvPr/>
+              </p:nvSpPr>
+              <p:spPr bwMode="auto">
+                <a:xfrm>
+                  <a:off x="624" y="2774"/>
+                  <a:ext cx="173" cy="0"/>
+                </a:xfrm>
+                <a:prstGeom prst="line">
+                  <a:avLst/>
+                </a:prstGeom>
+                <a:noFill/>
+                <a:ln w="9525">
+                  <a:solidFill>
+                    <a:schemeClr val="tx1"/>
+                  </a:solidFill>
+                  <a:round/>
+                  <a:headEnd/>
+                  <a:tailEnd/>
+                </a:ln>
+              </p:spPr>
+              <p:txBody>
+                <a:bodyPr wrap="none" lIns="92075" tIns="46038" rIns="92075" bIns="46038" anchor="ctr"/>
+                <a:lstStyle/>
+                <a:p>
+                  <a:pPr marL="0" marR="0" lvl="0" indent="0" algn="ctr" defTabSz="914400" eaLnBrk="0" fontAlgn="base" latinLnBrk="0" hangingPunct="0">
+                    <a:lnSpc>
+                      <a:spcPct val="100000"/>
+                    </a:lnSpc>
+                    <a:spcBef>
+                      <a:spcPct val="0"/>
+                    </a:spcBef>
+                    <a:spcAft>
+                      <a:spcPct val="0"/>
+                    </a:spcAft>
+                    <a:buClrTx/>
+                    <a:buSzTx/>
+                    <a:buFontTx/>
+                    <a:buNone/>
+                    <a:tabLst/>
+                    <a:defRPr/>
+                  </a:pPr>
+                  <a:endParaRPr kumimoji="0" lang="en-US" sz="2400" b="0" i="0" u="none" strike="noStrike" kern="0" cap="none" spc="0" normalizeH="0" baseline="0" noProof="0" dirty="0">
+                    <a:ln>
+                      <a:noFill/>
+                    </a:ln>
+                    <a:effectLst/>
+                    <a:uLnTx/>
+                    <a:uFillTx/>
+                    <a:latin typeface="Arial" charset="0"/>
+                  </a:endParaRPr>
+                </a:p>
+              </p:txBody>
+            </p:sp>
+            <p:sp>
+              <p:nvSpPr>
+                <p:cNvPr id="30" name="Line 77">
+                  <a:extLst>
+                    <a:ext uri="{FF2B5EF4-FFF2-40B4-BE49-F238E27FC236}">
+                      <a16:creationId xmlns:a16="http://schemas.microsoft.com/office/drawing/2014/main" id="{769F932B-6EE3-E88F-89EF-322FC42B88E2}"/>
+                    </a:ext>
+                  </a:extLst>
+                </p:cNvPr>
+                <p:cNvSpPr>
+                  <a:spLocks noChangeShapeType="1"/>
+                </p:cNvSpPr>
+                <p:nvPr/>
+              </p:nvSpPr>
+              <p:spPr bwMode="auto">
+                <a:xfrm>
+                  <a:off x="1372" y="2774"/>
+                  <a:ext cx="173" cy="0"/>
+                </a:xfrm>
+                <a:prstGeom prst="line">
+                  <a:avLst/>
+                </a:prstGeom>
+                <a:noFill/>
+                <a:ln w="9525">
+                  <a:solidFill>
+                    <a:schemeClr val="tx1"/>
+                  </a:solidFill>
+                  <a:round/>
+                  <a:headEnd/>
+                  <a:tailEnd/>
+                </a:ln>
+              </p:spPr>
+              <p:txBody>
+                <a:bodyPr wrap="none" lIns="92075" tIns="46038" rIns="92075" bIns="46038" anchor="ctr"/>
+                <a:lstStyle/>
+                <a:p>
+                  <a:pPr marL="0" marR="0" lvl="0" indent="0" algn="ctr" defTabSz="914400" eaLnBrk="0" fontAlgn="base" latinLnBrk="0" hangingPunct="0">
+                    <a:lnSpc>
+                      <a:spcPct val="100000"/>
+                    </a:lnSpc>
+                    <a:spcBef>
+                      <a:spcPct val="0"/>
+                    </a:spcBef>
+                    <a:spcAft>
+                      <a:spcPct val="0"/>
+                    </a:spcAft>
+                    <a:buClrTx/>
+                    <a:buSzTx/>
+                    <a:buFontTx/>
+                    <a:buNone/>
+                    <a:tabLst/>
+                    <a:defRPr/>
+                  </a:pPr>
+                  <a:endParaRPr kumimoji="0" lang="en-US" sz="2400" b="0" i="0" u="none" strike="noStrike" kern="0" cap="none" spc="0" normalizeH="0" baseline="0" noProof="0" dirty="0">
+                    <a:ln>
+                      <a:noFill/>
+                    </a:ln>
+                    <a:effectLst/>
+                    <a:uLnTx/>
+                    <a:uFillTx/>
+                    <a:latin typeface="Arial" charset="0"/>
+                  </a:endParaRPr>
+                </a:p>
+              </p:txBody>
+            </p:sp>
+          </p:grpSp>
+          <p:sp>
+            <p:nvSpPr>
+              <p:cNvPr id="21" name="Text Box 78">
+                <a:extLst>
+                  <a:ext uri="{FF2B5EF4-FFF2-40B4-BE49-F238E27FC236}">
+                    <a16:creationId xmlns:a16="http://schemas.microsoft.com/office/drawing/2014/main" id="{1C8B1EF8-CA5D-5560-C367-2A012948D44A}"/>
+                  </a:ext>
+                </a:extLst>
+              </p:cNvPr>
+              <p:cNvSpPr txBox="1">
+                <a:spLocks noChangeArrowheads="1"/>
+              </p:cNvSpPr>
+              <p:nvPr/>
+            </p:nvSpPr>
+            <p:spPr bwMode="auto">
+              <a:xfrm>
+                <a:off x="839" y="2784"/>
+                <a:ext cx="489" cy="204"/>
+              </a:xfrm>
+              <a:prstGeom prst="rect">
+                <a:avLst/>
+              </a:prstGeom>
+              <a:noFill/>
+              <a:ln w="9525">
+                <a:noFill/>
+                <a:miter lim="800000"/>
+                <a:headEnd/>
+                <a:tailEnd/>
+              </a:ln>
+            </p:spPr>
+            <p:txBody>
+              <a:bodyPr wrap="none" lIns="92075" tIns="46038" rIns="92075" bIns="46038">
+                <a:spAutoFit/>
+              </a:bodyPr>
+              <a:lstStyle/>
+              <a:p>
+                <a:pPr marL="0" marR="0" lvl="0" indent="0" algn="ctr" defTabSz="914400" eaLnBrk="0" fontAlgn="base" latinLnBrk="0" hangingPunct="0">
+                  <a:lnSpc>
+                    <a:spcPct val="100000"/>
+                  </a:lnSpc>
+                  <a:spcBef>
+                    <a:spcPct val="0"/>
+                  </a:spcBef>
+                  <a:spcAft>
+                    <a:spcPct val="0"/>
+                  </a:spcAft>
+                  <a:buClrTx/>
+                  <a:buSzTx/>
+                  <a:buFontTx/>
+                  <a:buNone/>
+                  <a:tabLst/>
+                  <a:defRPr/>
+                </a:pPr>
+                <a:r>
+                  <a:rPr lang="en-US" sz="1500" kern="0" dirty="0">
+                    <a:latin typeface="Arial" charset="0"/>
+                  </a:rPr>
+                  <a:t>x86-64</a:t>
+                </a:r>
+                <a:endParaRPr kumimoji="0" lang="en-US" sz="1500" b="0" i="0" u="none" strike="noStrike" kern="0" cap="none" spc="0" normalizeH="0" baseline="0" noProof="0" dirty="0">
+                  <a:ln>
+                    <a:noFill/>
+                  </a:ln>
+                  <a:effectLst/>
+                  <a:uLnTx/>
+                  <a:uFillTx/>
+                  <a:latin typeface="Arial" charset="0"/>
+                </a:endParaRPr>
+              </a:p>
+            </p:txBody>
+          </p:sp>
+          <p:sp>
+            <p:nvSpPr>
+              <p:cNvPr id="22" name="Text Box 79">
+                <a:extLst>
+                  <a:ext uri="{FF2B5EF4-FFF2-40B4-BE49-F238E27FC236}">
+                    <a16:creationId xmlns:a16="http://schemas.microsoft.com/office/drawing/2014/main" id="{AE0B8B50-541F-FE1C-3045-099B042F7AC8}"/>
+                  </a:ext>
+                </a:extLst>
+              </p:cNvPr>
+              <p:cNvSpPr txBox="1">
+                <a:spLocks noChangeArrowheads="1"/>
+              </p:cNvSpPr>
+              <p:nvPr/>
+            </p:nvSpPr>
+            <p:spPr bwMode="auto">
+              <a:xfrm>
+                <a:off x="595" y="2557"/>
+                <a:ext cx="978" cy="204"/>
+              </a:xfrm>
+              <a:prstGeom prst="rect">
+                <a:avLst/>
+              </a:prstGeom>
+              <a:noFill/>
+              <a:ln w="9525">
+                <a:noFill/>
+                <a:miter lim="800000"/>
+                <a:headEnd/>
+                <a:tailEnd/>
+              </a:ln>
+            </p:spPr>
+            <p:txBody>
+              <a:bodyPr wrap="none" lIns="92075" tIns="46038" rIns="92075" bIns="46038">
+                <a:spAutoFit/>
+              </a:bodyPr>
+              <a:lstStyle/>
+              <a:p>
+                <a:pPr marL="0" marR="0" lvl="0" indent="0" algn="ctr" defTabSz="914400" eaLnBrk="0" fontAlgn="base" latinLnBrk="0" hangingPunct="0">
+                  <a:lnSpc>
+                    <a:spcPct val="100000"/>
+                  </a:lnSpc>
+                  <a:spcBef>
+                    <a:spcPct val="0"/>
+                  </a:spcBef>
+                  <a:spcAft>
+                    <a:spcPct val="0"/>
+                  </a:spcAft>
+                  <a:buClrTx/>
+                  <a:buSzTx/>
+                  <a:buFontTx/>
+                  <a:buNone/>
+                  <a:tabLst/>
+                  <a:defRPr/>
+                </a:pPr>
+                <a:r>
+                  <a:rPr lang="en-US" sz="1500" kern="0" dirty="0">
+                    <a:latin typeface="Arial" charset="0"/>
+                  </a:rPr>
+                  <a:t>Kotlin</a:t>
+                </a:r>
+                <a:r>
+                  <a:rPr kumimoji="0" lang="en-US" sz="1500" b="0" i="0" u="none" strike="noStrike" kern="0" cap="none" spc="0" normalizeH="0" baseline="0" noProof="0" dirty="0">
+                    <a:ln>
+                      <a:noFill/>
+                    </a:ln>
+                    <a:effectLst/>
+                    <a:uLnTx/>
+                    <a:uFillTx/>
+                    <a:latin typeface="Arial" charset="0"/>
+                  </a:rPr>
+                  <a:t> </a:t>
+                </a:r>
+                <a:r>
+                  <a:rPr kumimoji="0" lang="en-US" sz="1500" b="0" i="0" u="none" strike="noStrike" kern="0" cap="none" spc="0" normalizeH="0" baseline="0" noProof="0" dirty="0">
+                    <a:ln>
+                      <a:noFill/>
+                    </a:ln>
+                    <a:effectLst/>
+                    <a:uLnTx/>
+                    <a:uFillTx/>
+                    <a:latin typeface="Arial" charset="0"/>
+                    <a:sym typeface="Symbol" pitchFamily="18" charset="2"/>
+                  </a:rPr>
+                  <a:t> </a:t>
+                </a:r>
+                <a:r>
+                  <a:rPr lang="en-US" sz="1500" kern="0" dirty="0">
+                    <a:latin typeface="Arial" charset="0"/>
+                    <a:sym typeface="Symbol" pitchFamily="18" charset="2"/>
+                  </a:rPr>
+                  <a:t>x86-64</a:t>
+                </a:r>
+              </a:p>
+            </p:txBody>
+          </p:sp>
+        </p:grpSp>
+        <p:sp>
+          <p:nvSpPr>
+            <p:cNvPr id="10" name="Text Box 80">
+              <a:extLst>
+                <a:ext uri="{FF2B5EF4-FFF2-40B4-BE49-F238E27FC236}">
+                  <a16:creationId xmlns:a16="http://schemas.microsoft.com/office/drawing/2014/main" id="{7830B637-608C-B7D6-59BE-70D9A2652D9C}"/>
+                </a:ext>
+              </a:extLst>
+            </p:cNvPr>
+            <p:cNvSpPr txBox="1">
+              <a:spLocks noChangeArrowheads="1"/>
+            </p:cNvSpPr>
+            <p:nvPr/>
+          </p:nvSpPr>
+          <p:spPr bwMode="auto">
+            <a:xfrm>
+              <a:off x="2705564" y="3201954"/>
+              <a:ext cx="2055050" cy="585418"/>
+            </a:xfrm>
+            <a:prstGeom prst="rect">
+              <a:avLst/>
+            </a:prstGeom>
+            <a:noFill/>
+            <a:ln w="9525">
+              <a:noFill/>
+              <a:miter lim="800000"/>
+              <a:headEnd/>
+              <a:tailEnd/>
+            </a:ln>
+          </p:spPr>
+          <p:txBody>
+            <a:bodyPr wrap="none" lIns="92075" tIns="46038" rIns="92075" bIns="46038">
+              <a:spAutoFit/>
+            </a:bodyPr>
+            <a:lstStyle/>
+            <a:p>
+              <a:pPr marL="0" marR="0" lvl="0" indent="0" algn="ctr" defTabSz="914400" eaLnBrk="0" fontAlgn="base" latinLnBrk="0" hangingPunct="0">
+                <a:lnSpc>
+                  <a:spcPct val="100000"/>
+                </a:lnSpc>
+                <a:spcBef>
+                  <a:spcPct val="0"/>
+                </a:spcBef>
+                <a:spcAft>
+                  <a:spcPct val="0"/>
+                </a:spcAft>
+                <a:buClrTx/>
+                <a:buSzTx/>
+                <a:buFontTx/>
+                <a:buNone/>
+                <a:tabLst/>
+                <a:defRPr/>
+              </a:pPr>
+              <a:r>
+                <a:rPr lang="en-US" sz="1600" kern="0" dirty="0">
+                  <a:latin typeface="Arial" charset="0"/>
+                </a:rPr>
+                <a:t>Source code version</a:t>
+              </a:r>
+            </a:p>
+            <a:p>
+              <a:pPr marL="0" marR="0" lvl="0" indent="0" algn="ctr" defTabSz="914400" eaLnBrk="0" fontAlgn="base" latinLnBrk="0" hangingPunct="0">
+                <a:lnSpc>
+                  <a:spcPct val="100000"/>
+                </a:lnSpc>
+                <a:spcBef>
+                  <a:spcPct val="0"/>
+                </a:spcBef>
+                <a:spcAft>
+                  <a:spcPct val="0"/>
+                </a:spcAft>
+                <a:buClrTx/>
+                <a:buSzTx/>
+                <a:buFontTx/>
+                <a:buNone/>
+                <a:tabLst/>
+                <a:defRPr/>
+              </a:pPr>
+              <a:r>
+                <a:rPr kumimoji="0" lang="en-US" sz="1600" b="0" i="0" u="none" strike="noStrike" kern="0" cap="none" spc="0" normalizeH="0" baseline="0" noProof="0" dirty="0">
+                  <a:ln>
+                    <a:noFill/>
+                  </a:ln>
+                  <a:effectLst/>
+                  <a:uLnTx/>
+                  <a:uFillTx/>
+                  <a:latin typeface="Arial" charset="0"/>
+                </a:rPr>
+                <a:t>of Kotlin compiler.</a:t>
+              </a:r>
+            </a:p>
+          </p:txBody>
+        </p:sp>
+        <p:sp>
+          <p:nvSpPr>
+            <p:cNvPr id="11" name="Text Box 81">
+              <a:extLst>
+                <a:ext uri="{FF2B5EF4-FFF2-40B4-BE49-F238E27FC236}">
+                  <a16:creationId xmlns:a16="http://schemas.microsoft.com/office/drawing/2014/main" id="{696F9A9D-C336-D624-30E9-82607302D2F8}"/>
+                </a:ext>
+              </a:extLst>
+            </p:cNvPr>
+            <p:cNvSpPr txBox="1">
+              <a:spLocks noChangeArrowheads="1"/>
+            </p:cNvSpPr>
+            <p:nvPr/>
+          </p:nvSpPr>
+          <p:spPr bwMode="auto">
+            <a:xfrm>
+              <a:off x="4430253" y="4192554"/>
+              <a:ext cx="1096454" cy="339196"/>
+            </a:xfrm>
+            <a:prstGeom prst="rect">
+              <a:avLst/>
+            </a:prstGeom>
+            <a:noFill/>
+            <a:ln w="9525">
+              <a:noFill/>
+              <a:miter lim="800000"/>
+              <a:headEnd/>
+              <a:tailEnd/>
+            </a:ln>
+          </p:spPr>
+          <p:txBody>
+            <a:bodyPr wrap="none" lIns="92075" tIns="46038" rIns="92075" bIns="46038">
+              <a:spAutoFit/>
+            </a:bodyPr>
+            <a:lstStyle/>
+            <a:p>
+              <a:pPr marL="0" marR="0" lvl="0" indent="0" algn="ctr" defTabSz="914400" eaLnBrk="0" fontAlgn="base" latinLnBrk="0" hangingPunct="0">
+                <a:lnSpc>
+                  <a:spcPct val="100000"/>
+                </a:lnSpc>
+                <a:spcBef>
+                  <a:spcPct val="0"/>
+                </a:spcBef>
+                <a:spcAft>
+                  <a:spcPct val="0"/>
+                </a:spcAft>
+                <a:buClrTx/>
+                <a:buSzTx/>
+                <a:buFontTx/>
+                <a:buNone/>
+                <a:tabLst/>
+                <a:defRPr/>
+              </a:pPr>
+              <a:r>
+                <a:rPr kumimoji="0" lang="en-US" sz="1600" b="0" i="0" u="none" strike="noStrike" kern="0" cap="none" spc="0" normalizeH="0" baseline="0" noProof="0" dirty="0">
+                  <a:ln>
+                    <a:noFill/>
+                  </a:ln>
+                  <a:effectLst/>
+                  <a:uLnTx/>
+                  <a:uFillTx/>
+                  <a:latin typeface="Arial" charset="0"/>
+                </a:rPr>
+                <a:t>Compile it</a:t>
+              </a:r>
+            </a:p>
+          </p:txBody>
+        </p:sp>
+        <p:sp>
+          <p:nvSpPr>
+            <p:cNvPr id="12" name="Text Box 82">
+              <a:extLst>
+                <a:ext uri="{FF2B5EF4-FFF2-40B4-BE49-F238E27FC236}">
+                  <a16:creationId xmlns:a16="http://schemas.microsoft.com/office/drawing/2014/main" id="{BED3BBA6-A0F6-0D5C-2F21-C8F5EA5B2070}"/>
+                </a:ext>
+              </a:extLst>
+            </p:cNvPr>
+            <p:cNvSpPr txBox="1">
+              <a:spLocks noChangeArrowheads="1"/>
+            </p:cNvSpPr>
+            <p:nvPr/>
+          </p:nvSpPr>
+          <p:spPr bwMode="auto">
+            <a:xfrm>
+              <a:off x="7686526" y="3278154"/>
+              <a:ext cx="1998945" cy="585418"/>
+            </a:xfrm>
+            <a:prstGeom prst="rect">
+              <a:avLst/>
+            </a:prstGeom>
+            <a:noFill/>
+            <a:ln w="9525">
+              <a:noFill/>
+              <a:miter lim="800000"/>
+              <a:headEnd/>
+              <a:tailEnd/>
+            </a:ln>
+          </p:spPr>
+          <p:txBody>
+            <a:bodyPr wrap="none" lIns="92075" tIns="46038" rIns="92075" bIns="46038">
+              <a:spAutoFit/>
+            </a:bodyPr>
+            <a:lstStyle/>
+            <a:p>
+              <a:pPr marL="0" marR="0" lvl="0" indent="0" algn="ctr" defTabSz="914400" eaLnBrk="0" fontAlgn="base" latinLnBrk="0" hangingPunct="0">
+                <a:lnSpc>
+                  <a:spcPct val="100000"/>
+                </a:lnSpc>
+                <a:spcBef>
+                  <a:spcPct val="0"/>
+                </a:spcBef>
+                <a:spcAft>
+                  <a:spcPct val="0"/>
+                </a:spcAft>
+                <a:buClrTx/>
+                <a:buSzTx/>
+                <a:buFontTx/>
+                <a:buNone/>
+                <a:tabLst/>
+                <a:defRPr/>
+              </a:pPr>
+              <a:r>
+                <a:rPr kumimoji="0" lang="en-US" sz="1600" b="0" i="0" u="none" strike="noStrike" kern="0" cap="none" spc="0" normalizeH="0" baseline="0" noProof="0" dirty="0">
+                  <a:ln>
+                    <a:noFill/>
+                  </a:ln>
+                  <a:effectLst/>
+                  <a:uLnTx/>
+                  <a:uFillTx/>
+                  <a:latin typeface="Arial" charset="0"/>
+                </a:rPr>
+                <a:t>Object code version</a:t>
+              </a:r>
+            </a:p>
+            <a:p>
+              <a:pPr marL="0" marR="0" lvl="0" indent="0" algn="ctr" defTabSz="914400" eaLnBrk="0" fontAlgn="base" latinLnBrk="0" hangingPunct="0">
+                <a:lnSpc>
+                  <a:spcPct val="100000"/>
+                </a:lnSpc>
+                <a:spcBef>
+                  <a:spcPct val="0"/>
+                </a:spcBef>
+                <a:spcAft>
+                  <a:spcPct val="0"/>
+                </a:spcAft>
+                <a:buClrTx/>
+                <a:buSzTx/>
+                <a:buFontTx/>
+                <a:buNone/>
+                <a:tabLst/>
+                <a:defRPr/>
+              </a:pPr>
+              <a:r>
+                <a:rPr lang="en-US" sz="1600" kern="0" dirty="0">
+                  <a:latin typeface="Arial" charset="0"/>
+                </a:rPr>
+                <a:t>of Kotlin compiler</a:t>
+              </a:r>
+              <a:endParaRPr kumimoji="0" lang="en-US" sz="1600" b="0" i="0" u="none" strike="noStrike" kern="0" cap="none" spc="0" normalizeH="0" baseline="0" noProof="0" dirty="0">
+                <a:ln>
+                  <a:noFill/>
+                </a:ln>
+                <a:effectLst/>
+                <a:uLnTx/>
+                <a:uFillTx/>
+                <a:latin typeface="Arial" charset="0"/>
+              </a:endParaRPr>
+            </a:p>
+          </p:txBody>
+        </p:sp>
+        <p:sp>
+          <p:nvSpPr>
+            <p:cNvPr id="13" name="AutoShape 85">
+              <a:extLst>
+                <a:ext uri="{FF2B5EF4-FFF2-40B4-BE49-F238E27FC236}">
+                  <a16:creationId xmlns:a16="http://schemas.microsoft.com/office/drawing/2014/main" id="{87E9ED2C-9B5C-4BD4-8881-D0A625CA78A0}"/>
+                </a:ext>
+              </a:extLst>
+            </p:cNvPr>
+            <p:cNvSpPr>
+              <a:spLocks noChangeArrowheads="1"/>
+            </p:cNvSpPr>
+            <p:nvPr/>
+          </p:nvSpPr>
+          <p:spPr bwMode="auto">
+            <a:xfrm>
+              <a:off x="6173075" y="3286092"/>
+              <a:ext cx="92075" cy="92075"/>
+            </a:xfrm>
+            <a:prstGeom prst="diamond">
+              <a:avLst/>
+            </a:prstGeom>
+            <a:noFill/>
+            <a:ln w="9525">
+              <a:noFill/>
+              <a:miter lim="800000"/>
+              <a:headEnd/>
+              <a:tailEnd/>
+            </a:ln>
+          </p:spPr>
+          <p:txBody>
+            <a:bodyPr wrap="none" lIns="92075" tIns="46038" rIns="92075" bIns="46038" anchor="ctr"/>
+            <a:lstStyle/>
+            <a:p>
+              <a:pPr marL="0" marR="0" lvl="0" indent="0" algn="ctr" defTabSz="914400" eaLnBrk="0" fontAlgn="base" latinLnBrk="0" hangingPunct="0">
+                <a:lnSpc>
+                  <a:spcPct val="100000"/>
+                </a:lnSpc>
+                <a:spcBef>
+                  <a:spcPct val="0"/>
+                </a:spcBef>
+                <a:spcAft>
+                  <a:spcPct val="0"/>
+                </a:spcAft>
+                <a:buClrTx/>
+                <a:buSzTx/>
+                <a:buFontTx/>
+                <a:buNone/>
+                <a:tabLst/>
+                <a:defRPr/>
+              </a:pPr>
+              <a:endParaRPr kumimoji="0" lang="en-US" sz="2400" b="0" i="0" u="none" strike="noStrike" kern="0" cap="none" spc="0" normalizeH="0" baseline="0" noProof="0" dirty="0">
+                <a:ln>
+                  <a:noFill/>
+                </a:ln>
+                <a:effectLst/>
+                <a:uLnTx/>
+                <a:uFillTx/>
+                <a:latin typeface="Arial" charset="0"/>
+              </a:endParaRPr>
+            </a:p>
+          </p:txBody>
+        </p:sp>
+        <p:sp>
+          <p:nvSpPr>
+            <p:cNvPr id="14" name="AutoShape 87">
+              <a:extLst>
+                <a:ext uri="{FF2B5EF4-FFF2-40B4-BE49-F238E27FC236}">
+                  <a16:creationId xmlns:a16="http://schemas.microsoft.com/office/drawing/2014/main" id="{765EA642-F743-80D5-9AE9-ED1EB0A26DEC}"/>
+                </a:ext>
+              </a:extLst>
+            </p:cNvPr>
+            <p:cNvSpPr>
+              <a:spLocks noChangeArrowheads="1"/>
+            </p:cNvSpPr>
+            <p:nvPr/>
+          </p:nvSpPr>
+          <p:spPr bwMode="auto">
+            <a:xfrm>
+              <a:off x="4987212" y="2928904"/>
+              <a:ext cx="92075" cy="92075"/>
+            </a:xfrm>
+            <a:prstGeom prst="diamond">
+              <a:avLst/>
+            </a:prstGeom>
+            <a:noFill/>
+            <a:ln w="9525">
+              <a:noFill/>
+              <a:miter lim="800000"/>
+              <a:headEnd/>
+              <a:tailEnd/>
+            </a:ln>
+          </p:spPr>
+          <p:txBody>
+            <a:bodyPr wrap="none" lIns="92075" tIns="46038" rIns="92075" bIns="46038" anchor="ctr"/>
+            <a:lstStyle/>
+            <a:p>
+              <a:pPr marL="0" marR="0" lvl="0" indent="0" algn="ctr" defTabSz="914400" eaLnBrk="0" fontAlgn="base" latinLnBrk="0" hangingPunct="0">
+                <a:lnSpc>
+                  <a:spcPct val="100000"/>
+                </a:lnSpc>
+                <a:spcBef>
+                  <a:spcPct val="0"/>
+                </a:spcBef>
+                <a:spcAft>
+                  <a:spcPct val="0"/>
+                </a:spcAft>
+                <a:buClrTx/>
+                <a:buSzTx/>
+                <a:buFontTx/>
+                <a:buNone/>
+                <a:tabLst/>
+                <a:defRPr/>
+              </a:pPr>
+              <a:endParaRPr kumimoji="0" lang="en-US" sz="2400" b="0" i="0" u="none" strike="noStrike" kern="0" cap="none" spc="0" normalizeH="0" baseline="0" noProof="0" dirty="0">
+                <a:ln>
+                  <a:noFill/>
+                </a:ln>
+                <a:effectLst/>
+                <a:uLnTx/>
+                <a:uFillTx/>
+                <a:latin typeface="Arial" charset="0"/>
+              </a:endParaRPr>
+            </a:p>
+          </p:txBody>
+        </p:sp>
+        <p:sp>
+          <p:nvSpPr>
+            <p:cNvPr id="15" name="AutoShape 88">
+              <a:extLst>
+                <a:ext uri="{FF2B5EF4-FFF2-40B4-BE49-F238E27FC236}">
+                  <a16:creationId xmlns:a16="http://schemas.microsoft.com/office/drawing/2014/main" id="{9402D914-688A-BE2A-2341-DF825AC23508}"/>
+                </a:ext>
+              </a:extLst>
+            </p:cNvPr>
+            <p:cNvSpPr>
+              <a:spLocks noChangeArrowheads="1"/>
+            </p:cNvSpPr>
+            <p:nvPr/>
+          </p:nvSpPr>
+          <p:spPr bwMode="auto">
+            <a:xfrm>
+              <a:off x="7349412" y="2928904"/>
+              <a:ext cx="92075" cy="92075"/>
+            </a:xfrm>
+            <a:prstGeom prst="diamond">
+              <a:avLst/>
+            </a:prstGeom>
+            <a:noFill/>
+            <a:ln w="9525">
+              <a:noFill/>
+              <a:miter lim="800000"/>
+              <a:headEnd/>
+              <a:tailEnd/>
+            </a:ln>
+          </p:spPr>
+          <p:txBody>
+            <a:bodyPr wrap="none" lIns="92075" tIns="46038" rIns="92075" bIns="46038" anchor="ctr"/>
+            <a:lstStyle/>
+            <a:p>
+              <a:pPr marL="0" marR="0" lvl="0" indent="0" algn="ctr" defTabSz="914400" eaLnBrk="0" fontAlgn="base" latinLnBrk="0" hangingPunct="0">
+                <a:lnSpc>
+                  <a:spcPct val="100000"/>
+                </a:lnSpc>
+                <a:spcBef>
+                  <a:spcPct val="0"/>
+                </a:spcBef>
+                <a:spcAft>
+                  <a:spcPct val="0"/>
+                </a:spcAft>
+                <a:buClrTx/>
+                <a:buSzTx/>
+                <a:buFontTx/>
+                <a:buNone/>
+                <a:tabLst/>
+                <a:defRPr/>
+              </a:pPr>
+              <a:endParaRPr kumimoji="0" lang="en-US" sz="2400" b="0" i="0" u="none" strike="noStrike" kern="0" cap="none" spc="0" normalizeH="0" baseline="0" noProof="0" dirty="0">
+                <a:ln>
+                  <a:noFill/>
+                </a:ln>
+                <a:effectLst/>
+                <a:uLnTx/>
+                <a:uFillTx/>
+                <a:latin typeface="Arial" charset="0"/>
+              </a:endParaRPr>
+            </a:p>
+          </p:txBody>
+        </p:sp>
+        <p:cxnSp>
+          <p:nvCxnSpPr>
+            <p:cNvPr id="16" name="AutoShape 89">
+              <a:extLst>
+                <a:ext uri="{FF2B5EF4-FFF2-40B4-BE49-F238E27FC236}">
+                  <a16:creationId xmlns:a16="http://schemas.microsoft.com/office/drawing/2014/main" id="{74D90576-A12E-CEC2-3A1D-6B14DF5E54CF}"/>
+                </a:ext>
+              </a:extLst>
+            </p:cNvPr>
+            <p:cNvCxnSpPr>
+              <a:cxnSpLocks noChangeShapeType="1"/>
+              <a:stCxn id="10" idx="3"/>
+              <a:endCxn id="14" idx="2"/>
+            </p:cNvCxnSpPr>
+            <p:nvPr/>
+          </p:nvCxnSpPr>
+          <p:spPr bwMode="auto">
+            <a:xfrm flipV="1">
+              <a:off x="4760614" y="3020979"/>
+              <a:ext cx="272636" cy="473684"/>
+            </a:xfrm>
+            <a:prstGeom prst="bentConnector2">
+              <a:avLst/>
+            </a:prstGeom>
+            <a:noFill/>
+            <a:ln w="9525">
+              <a:solidFill>
+                <a:schemeClr val="tx1"/>
+              </a:solidFill>
+              <a:miter lim="800000"/>
+              <a:headEnd/>
+              <a:tailEnd type="triangle" w="med" len="med"/>
+            </a:ln>
+          </p:spPr>
+        </p:cxnSp>
+        <p:cxnSp>
+          <p:nvCxnSpPr>
+            <p:cNvPr id="17" name="AutoShape 90">
+              <a:extLst>
+                <a:ext uri="{FF2B5EF4-FFF2-40B4-BE49-F238E27FC236}">
+                  <a16:creationId xmlns:a16="http://schemas.microsoft.com/office/drawing/2014/main" id="{221D9D7E-12DA-BC42-8679-0F5FAE5B8500}"/>
+                </a:ext>
+              </a:extLst>
+            </p:cNvPr>
+            <p:cNvCxnSpPr>
+              <a:cxnSpLocks noChangeShapeType="1"/>
+              <a:stCxn id="11" idx="3"/>
+              <a:endCxn id="19" idx="2"/>
+            </p:cNvCxnSpPr>
+            <p:nvPr/>
+          </p:nvCxnSpPr>
+          <p:spPr bwMode="auto">
+            <a:xfrm flipV="1">
+              <a:off x="5526707" y="4114816"/>
+              <a:ext cx="694254" cy="247336"/>
+            </a:xfrm>
+            <a:prstGeom prst="bentConnector2">
+              <a:avLst/>
+            </a:prstGeom>
+            <a:noFill/>
+            <a:ln w="9525">
+              <a:solidFill>
+                <a:schemeClr val="tx1"/>
+              </a:solidFill>
+              <a:miter lim="800000"/>
+              <a:headEnd/>
+              <a:tailEnd type="triangle" w="med" len="med"/>
+            </a:ln>
+          </p:spPr>
+        </p:cxnSp>
+        <p:cxnSp>
+          <p:nvCxnSpPr>
+            <p:cNvPr id="18" name="AutoShape 91">
+              <a:extLst>
+                <a:ext uri="{FF2B5EF4-FFF2-40B4-BE49-F238E27FC236}">
+                  <a16:creationId xmlns:a16="http://schemas.microsoft.com/office/drawing/2014/main" id="{34EEBEC3-F480-8F95-19FA-14ABECC1D803}"/>
+                </a:ext>
+              </a:extLst>
+            </p:cNvPr>
+            <p:cNvCxnSpPr>
+              <a:cxnSpLocks noChangeShapeType="1"/>
+              <a:stCxn id="12" idx="1"/>
+              <a:endCxn id="15" idx="2"/>
+            </p:cNvCxnSpPr>
+            <p:nvPr/>
+          </p:nvCxnSpPr>
+          <p:spPr bwMode="auto">
+            <a:xfrm rot="10800000">
+              <a:off x="7395450" y="3020979"/>
+              <a:ext cx="291076" cy="549884"/>
+            </a:xfrm>
+            <a:prstGeom prst="bentConnector2">
+              <a:avLst/>
+            </a:prstGeom>
+            <a:noFill/>
+            <a:ln w="9525">
+              <a:solidFill>
+                <a:schemeClr val="tx1"/>
+              </a:solidFill>
+              <a:miter lim="800000"/>
+              <a:headEnd/>
+              <a:tailEnd type="triangle" w="med" len="med"/>
+            </a:ln>
+          </p:spPr>
+        </p:cxnSp>
+        <p:sp>
+          <p:nvSpPr>
+            <p:cNvPr id="19" name="Flowchart: Off-page Connector 18">
+              <a:extLst>
+                <a:ext uri="{FF2B5EF4-FFF2-40B4-BE49-F238E27FC236}">
+                  <a16:creationId xmlns:a16="http://schemas.microsoft.com/office/drawing/2014/main" id="{0CAF3D6F-02E1-D848-09C6-CCB8C20D2167}"/>
+                </a:ext>
+              </a:extLst>
+            </p:cNvPr>
+            <p:cNvSpPr/>
+            <p:nvPr/>
+          </p:nvSpPr>
+          <p:spPr bwMode="auto">
+            <a:xfrm>
+              <a:off x="5763761" y="3383296"/>
+              <a:ext cx="914400" cy="731520"/>
+            </a:xfrm>
+            <a:prstGeom prst="flowChartOffpageConnector">
+              <a:avLst/>
+            </a:prstGeom>
+            <a:noFill/>
+            <a:ln w="9525">
+              <a:solidFill>
+                <a:schemeClr val="tx1"/>
+              </a:solidFill>
+              <a:round/>
+              <a:headEnd/>
+              <a:tailEnd/>
+            </a:ln>
+          </p:spPr>
+          <p:txBody>
+            <a:bodyPr wrap="none" lIns="92075" tIns="46038" rIns="92075" bIns="46038" rtlCol="0" anchor="ctr"/>
+            <a:lstStyle/>
+            <a:p>
+              <a:pPr marL="0" marR="0" lvl="0" indent="0" algn="ctr" defTabSz="914400" eaLnBrk="0" fontAlgn="base" latinLnBrk="0" hangingPunct="0">
+                <a:lnSpc>
+                  <a:spcPct val="100000"/>
+                </a:lnSpc>
+                <a:spcBef>
+                  <a:spcPct val="0"/>
+                </a:spcBef>
+                <a:spcAft>
+                  <a:spcPct val="0"/>
+                </a:spcAft>
+                <a:buClrTx/>
+                <a:buSzTx/>
+                <a:buFontTx/>
+                <a:buNone/>
+                <a:tabLst/>
+                <a:defRPr/>
+              </a:pPr>
+              <a:r>
+                <a:rPr lang="en-US" sz="1500" kern="0" dirty="0">
+                  <a:latin typeface="Arial" charset="0"/>
+                </a:rPr>
+                <a:t>x86-64</a:t>
+              </a:r>
+              <a:endParaRPr kumimoji="0" lang="en-US" sz="1500" b="0" i="0" u="none" strike="noStrike" kern="0" cap="none" spc="0" normalizeH="0" baseline="0" noProof="0" dirty="0">
+                <a:ln>
+                  <a:noFill/>
+                </a:ln>
+                <a:effectLst/>
+                <a:uLnTx/>
+                <a:uFillTx/>
+                <a:latin typeface="Arial" charset="0"/>
+              </a:endParaRPr>
+            </a:p>
+          </p:txBody>
+        </p:sp>
+      </p:grpSp>
+    </p:spTree>
+    <p:extLst>
+      <p:ext uri="{BB962C8B-B14F-4D97-AF65-F5344CB8AC3E}">
+        <p14:creationId xmlns:p14="http://schemas.microsoft.com/office/powerpoint/2010/main" val="4083545083"/>
+      </p:ext>
+    </p:extLst>
+  </p:cSld>
+  <p:clrMapOvr>
+    <a:masterClrMapping/>
+  </p:clrMapOvr>
+</p:sld>
+</file>
+
+<file path=ppt/slides/slide24.xml><?xml version="1.0" encoding="utf-8"?>
+<p:sld xmlns:a="http://schemas.openxmlformats.org/drawingml/2006/main" xmlns:r="http://schemas.openxmlformats.org/officeDocument/2006/relationships" xmlns:p="http://schemas.openxmlformats.org/presentationml/2006/main">
+  <p:cSld>
+    <p:spTree>
+      <p:nvGrpSpPr>
+        <p:cNvPr id="1" name=""/>
+        <p:cNvGrpSpPr/>
+        <p:nvPr/>
+      </p:nvGrpSpPr>
+      <p:grpSpPr>
+        <a:xfrm>
+          <a:off x="0" y="0"/>
+          <a:ext cx="0" cy="0"/>
+          <a:chOff x="0" y="0"/>
+          <a:chExt cx="0" cy="0"/>
+        </a:xfrm>
+      </p:grpSpPr>
+      <p:sp>
+        <p:nvSpPr>
           <p:cNvPr id="26626" name="Footer Placeholder 3"/>
           <p:cNvSpPr>
             <a:spLocks noGrp="1"/>
@@ -19383,7 +22396,7 @@
             <a:fld id="{66846709-EB65-45D0-AD52-DA233C30DA37}" type="slidenum">
               <a:rPr lang="en-US" smtClean="0"/>
               <a:pPr/>
-              <a:t>23</a:t>
+              <a:t>24</a:t>
             </a:fld>
             <a:endParaRPr lang="en-US"/>
           </a:p>
@@ -21390,7 +24403,7 @@
 </p:sld>
 </file>
 
-<file path=ppt/slides/slide24.xml><?xml version="1.0" encoding="utf-8"?>
+<file path=ppt/slides/slide25.xml><?xml version="1.0" encoding="utf-8"?>
 <p:sld xmlns:a="http://schemas.openxmlformats.org/drawingml/2006/main" xmlns:r="http://schemas.openxmlformats.org/officeDocument/2006/relationships" xmlns:p="http://schemas.openxmlformats.org/presentationml/2006/main">
   <p:cSld>
     <p:spTree>
@@ -21455,7 +24468,7 @@
             <a:fld id="{58AE9F25-F8EC-4935-83FD-B3566C4F8689}" type="slidenum">
               <a:rPr lang="en-US" smtClean="0"/>
               <a:pPr/>
-              <a:t>24</a:t>
+              <a:t>25</a:t>
             </a:fld>
             <a:endParaRPr lang="en-US"/>
           </a:p>
@@ -25222,8 +28235,8 @@
             </p:nvSpPr>
             <p:spPr bwMode="auto">
               <a:xfrm>
-                <a:off x="1601" y="3479"/>
-                <a:ext cx="447" cy="204"/>
+                <a:off x="1611" y="3479"/>
+                <a:ext cx="427" cy="204"/>
               </a:xfrm>
               <a:prstGeom prst="rect">
                 <a:avLst/>
@@ -25244,7 +28257,7 @@
               <a:p>
                 <a:r>
                   <a:rPr lang="en-US" sz="1500" dirty="0"/>
-                  <a:t>X86/A</a:t>
+                  <a:t>x86/A</a:t>
                 </a:r>
               </a:p>
             </p:txBody>
@@ -25717,8 +28730,8 @@
             </p:nvSpPr>
             <p:spPr bwMode="auto">
               <a:xfrm>
-                <a:off x="672" y="2557"/>
-                <a:ext cx="822" cy="204"/>
+                <a:off x="682" y="2557"/>
+                <a:ext cx="802" cy="204"/>
               </a:xfrm>
               <a:prstGeom prst="rect">
                 <a:avLst/>
@@ -25739,7 +28752,7 @@
               <a:p>
                 <a:r>
                   <a:rPr lang="en-US" sz="1500" dirty="0"/>
-                  <a:t>X86/A </a:t>
+                  <a:t>x86/A </a:t>
                 </a:r>
                 <a:r>
                   <a:rPr lang="en-US" sz="1500" dirty="0">
@@ -26506,7 +29519,7 @@
 </p:sld>
 </file>
 
-<file path=ppt/slides/slide25.xml><?xml version="1.0" encoding="utf-8"?>
+<file path=ppt/slides/slide26.xml><?xml version="1.0" encoding="utf-8"?>
 <p:sld xmlns:a="http://schemas.openxmlformats.org/drawingml/2006/main" xmlns:r="http://schemas.openxmlformats.org/officeDocument/2006/relationships" xmlns:p="http://schemas.openxmlformats.org/presentationml/2006/main">
   <p:cSld>
     <p:spTree>
@@ -26666,7 +29679,7 @@
               <a:pPr>
                 <a:defRPr/>
               </a:pPr>
-              <a:t>25</a:t>
+              <a:t>26</a:t>
             </a:fld>
             <a:endParaRPr lang="en-US"/>
           </a:p>
@@ -26680,7 +29693,7 @@
 </p:sld>
 </file>
 
-<file path=ppt/slides/slide26.xml><?xml version="1.0" encoding="utf-8"?>
+<file path=ppt/slides/slide27.xml><?xml version="1.0" encoding="utf-8"?>
 <p:sld xmlns:a="http://schemas.openxmlformats.org/drawingml/2006/main" xmlns:r="http://schemas.openxmlformats.org/officeDocument/2006/relationships" xmlns:p="http://schemas.openxmlformats.org/presentationml/2006/main">
   <p:cSld>
     <p:spTree>
@@ -26745,7 +29758,7 @@
             <a:fld id="{D34E147E-1A5A-4812-BF03-A94A88D4CC56}" type="slidenum">
               <a:rPr lang="en-US" smtClean="0"/>
               <a:pPr/>
-              <a:t>26</a:t>
+              <a:t>27</a:t>
             </a:fld>
             <a:endParaRPr lang="en-US"/>
           </a:p>
@@ -28054,7 +31067,7 @@
 </p:sld>
 </file>
 
-<file path=ppt/slides/slide27.xml><?xml version="1.0" encoding="utf-8"?>
+<file path=ppt/slides/slide28.xml><?xml version="1.0" encoding="utf-8"?>
 <p:sld xmlns:a="http://schemas.openxmlformats.org/drawingml/2006/main" xmlns:r="http://schemas.openxmlformats.org/officeDocument/2006/relationships" xmlns:p="http://schemas.openxmlformats.org/presentationml/2006/main">
   <p:cSld>
     <p:spTree>
@@ -28119,7 +31132,7 @@
             <a:fld id="{475B629B-9E67-4B48-9615-AC5F47877617}" type="slidenum">
               <a:rPr lang="en-US" smtClean="0"/>
               <a:pPr/>
-              <a:t>27</a:t>
+              <a:t>28</a:t>
             </a:fld>
             <a:endParaRPr lang="en-US"/>
           </a:p>
@@ -29686,7 +32699,7 @@
 </p:sld>
 </file>
 
-<file path=ppt/slides/slide28.xml><?xml version="1.0" encoding="utf-8"?>
+<file path=ppt/slides/slide29.xml><?xml version="1.0" encoding="utf-8"?>
 <p:sld xmlns:a="http://schemas.openxmlformats.org/drawingml/2006/main" xmlns:r="http://schemas.openxmlformats.org/officeDocument/2006/relationships" xmlns:p="http://schemas.openxmlformats.org/presentationml/2006/main">
   <p:cSld>
     <p:spTree>
@@ -29751,7 +32764,7 @@
             <a:fld id="{EE9439EB-6633-4FF2-AB78-0FBC56C6D880}" type="slidenum">
               <a:rPr lang="en-US" smtClean="0"/>
               <a:pPr/>
-              <a:t>28</a:t>
+              <a:t>29</a:t>
             </a:fld>
             <a:endParaRPr lang="en-US"/>
           </a:p>
@@ -31333,163 +34346,6 @@
 </p:sld>
 </file>
 
-<file path=ppt/slides/slide29.xml><?xml version="1.0" encoding="utf-8"?>
-<p:sld xmlns:a="http://schemas.openxmlformats.org/drawingml/2006/main" xmlns:r="http://schemas.openxmlformats.org/officeDocument/2006/relationships" xmlns:p="http://schemas.openxmlformats.org/presentationml/2006/main">
-  <p:cSld>
-    <p:spTree>
-      <p:nvGrpSpPr>
-        <p:cNvPr id="1" name=""/>
-        <p:cNvGrpSpPr/>
-        <p:nvPr/>
-      </p:nvGrpSpPr>
-      <p:grpSpPr>
-        <a:xfrm>
-          <a:off x="0" y="0"/>
-          <a:ext cx="0" cy="0"/>
-          <a:chOff x="0" y="0"/>
-          <a:chExt cx="0" cy="0"/>
-        </a:xfrm>
-      </p:grpSpPr>
-      <p:sp>
-        <p:nvSpPr>
-          <p:cNvPr id="32770" name="Footer Placeholder 3"/>
-          <p:cNvSpPr>
-            <a:spLocks noGrp="1"/>
-          </p:cNvSpPr>
-          <p:nvPr>
-            <p:ph type="ftr" sz="quarter" idx="10"/>
-          </p:nvPr>
-        </p:nvSpPr>
-        <p:spPr>
-          <a:noFill/>
-        </p:spPr>
-        <p:txBody>
-          <a:bodyPr/>
-          <a:lstStyle/>
-          <a:p>
-            <a:r>
-              <a:rPr lang="en-US"/>
-              <a:t>©SoftMoore Consulting</a:t>
-            </a:r>
-          </a:p>
-        </p:txBody>
-      </p:sp>
-      <p:sp>
-        <p:nvSpPr>
-          <p:cNvPr id="32771" name="Slide Number Placeholder 4"/>
-          <p:cNvSpPr>
-            <a:spLocks noGrp="1"/>
-          </p:cNvSpPr>
-          <p:nvPr>
-            <p:ph type="sldNum" sz="quarter" idx="11"/>
-          </p:nvPr>
-        </p:nvSpPr>
-        <p:spPr>
-          <a:noFill/>
-        </p:spPr>
-        <p:txBody>
-          <a:bodyPr/>
-          <a:lstStyle/>
-          <a:p>
-            <a:r>
-              <a:rPr lang="en-US"/>
-              <a:t>Slide </a:t>
-            </a:r>
-            <a:fld id="{6C04F3E6-ED30-4455-B409-5033B564222C}" type="slidenum">
-              <a:rPr lang="en-US" smtClean="0"/>
-              <a:pPr/>
-              <a:t>29</a:t>
-            </a:fld>
-            <a:endParaRPr lang="en-US"/>
-          </a:p>
-        </p:txBody>
-      </p:sp>
-      <p:sp>
-        <p:nvSpPr>
-          <p:cNvPr id="32772" name="Rectangle 2"/>
-          <p:cNvSpPr>
-            <a:spLocks noGrp="1" noChangeArrowheads="1"/>
-          </p:cNvSpPr>
-          <p:nvPr>
-            <p:ph type="title"/>
-          </p:nvPr>
-        </p:nvSpPr>
-        <p:spPr/>
-        <p:txBody>
-          <a:bodyPr/>
-          <a:lstStyle/>
-          <a:p>
-            <a:r>
-              <a:rPr lang="en-US"/>
-              <a:t>Efficiency</a:t>
-            </a:r>
-          </a:p>
-        </p:txBody>
-      </p:sp>
-      <p:sp>
-        <p:nvSpPr>
-          <p:cNvPr id="32773" name="Rectangle 3"/>
-          <p:cNvSpPr>
-            <a:spLocks noGrp="1" noChangeArrowheads="1"/>
-          </p:cNvSpPr>
-          <p:nvPr>
-            <p:ph type="body" idx="1"/>
-          </p:nvPr>
-        </p:nvSpPr>
-        <p:spPr/>
-        <p:txBody>
-          <a:bodyPr/>
-          <a:lstStyle/>
-          <a:p>
-            <a:r>
-              <a:rPr lang="en-US"/>
-              <a:t>Efficiency of a program</a:t>
-            </a:r>
-          </a:p>
-          <a:p>
-            <a:pPr lvl="1"/>
-            <a:r>
-              <a:rPr lang="en-US"/>
-              <a:t>speed</a:t>
-            </a:r>
-          </a:p>
-          <a:p>
-            <a:pPr lvl="1"/>
-            <a:r>
-              <a:rPr lang="en-US"/>
-              <a:t>use of memory</a:t>
-            </a:r>
-          </a:p>
-          <a:p>
-            <a:r>
-              <a:rPr lang="en-US"/>
-              <a:t>Efficiency of a compiler</a:t>
-            </a:r>
-          </a:p>
-          <a:p>
-            <a:pPr lvl="1"/>
-            <a:r>
-              <a:rPr lang="en-US"/>
-              <a:t>efficiency of the compiler itself</a:t>
-            </a:r>
-          </a:p>
-          <a:p>
-            <a:pPr lvl="1"/>
-            <a:r>
-              <a:rPr lang="en-US"/>
-              <a:t>efficiency of the object code that it generates</a:t>
-            </a:r>
-          </a:p>
-        </p:txBody>
-      </p:sp>
-    </p:spTree>
-  </p:cSld>
-  <p:clrMapOvr>
-    <a:masterClrMapping/>
-  </p:clrMapOvr>
-</p:sld>
-</file>
-
 <file path=ppt/slides/slide3.xml><?xml version="1.0" encoding="utf-8"?>
 <p:sld xmlns:a="http://schemas.openxmlformats.org/drawingml/2006/main" xmlns:r="http://schemas.openxmlformats.org/officeDocument/2006/relationships" xmlns:p="http://schemas.openxmlformats.org/presentationml/2006/main">
   <p:cSld>
@@ -31654,6 +34510,163 @@
       </p:grpSpPr>
       <p:sp>
         <p:nvSpPr>
+          <p:cNvPr id="32770" name="Footer Placeholder 3"/>
+          <p:cNvSpPr>
+            <a:spLocks noGrp="1"/>
+          </p:cNvSpPr>
+          <p:nvPr>
+            <p:ph type="ftr" sz="quarter" idx="10"/>
+          </p:nvPr>
+        </p:nvSpPr>
+        <p:spPr>
+          <a:noFill/>
+        </p:spPr>
+        <p:txBody>
+          <a:bodyPr/>
+          <a:lstStyle/>
+          <a:p>
+            <a:r>
+              <a:rPr lang="en-US"/>
+              <a:t>©SoftMoore Consulting</a:t>
+            </a:r>
+          </a:p>
+        </p:txBody>
+      </p:sp>
+      <p:sp>
+        <p:nvSpPr>
+          <p:cNvPr id="32771" name="Slide Number Placeholder 4"/>
+          <p:cNvSpPr>
+            <a:spLocks noGrp="1"/>
+          </p:cNvSpPr>
+          <p:nvPr>
+            <p:ph type="sldNum" sz="quarter" idx="11"/>
+          </p:nvPr>
+        </p:nvSpPr>
+        <p:spPr>
+          <a:noFill/>
+        </p:spPr>
+        <p:txBody>
+          <a:bodyPr/>
+          <a:lstStyle/>
+          <a:p>
+            <a:r>
+              <a:rPr lang="en-US"/>
+              <a:t>Slide </a:t>
+            </a:r>
+            <a:fld id="{6C04F3E6-ED30-4455-B409-5033B564222C}" type="slidenum">
+              <a:rPr lang="en-US" smtClean="0"/>
+              <a:pPr/>
+              <a:t>30</a:t>
+            </a:fld>
+            <a:endParaRPr lang="en-US"/>
+          </a:p>
+        </p:txBody>
+      </p:sp>
+      <p:sp>
+        <p:nvSpPr>
+          <p:cNvPr id="32772" name="Rectangle 2"/>
+          <p:cNvSpPr>
+            <a:spLocks noGrp="1" noChangeArrowheads="1"/>
+          </p:cNvSpPr>
+          <p:nvPr>
+            <p:ph type="title"/>
+          </p:nvPr>
+        </p:nvSpPr>
+        <p:spPr/>
+        <p:txBody>
+          <a:bodyPr/>
+          <a:lstStyle/>
+          <a:p>
+            <a:r>
+              <a:rPr lang="en-US"/>
+              <a:t>Efficiency</a:t>
+            </a:r>
+          </a:p>
+        </p:txBody>
+      </p:sp>
+      <p:sp>
+        <p:nvSpPr>
+          <p:cNvPr id="32773" name="Rectangle 3"/>
+          <p:cNvSpPr>
+            <a:spLocks noGrp="1" noChangeArrowheads="1"/>
+          </p:cNvSpPr>
+          <p:nvPr>
+            <p:ph type="body" idx="1"/>
+          </p:nvPr>
+        </p:nvSpPr>
+        <p:spPr/>
+        <p:txBody>
+          <a:bodyPr/>
+          <a:lstStyle/>
+          <a:p>
+            <a:r>
+              <a:rPr lang="en-US"/>
+              <a:t>Efficiency of a program</a:t>
+            </a:r>
+          </a:p>
+          <a:p>
+            <a:pPr lvl="1"/>
+            <a:r>
+              <a:rPr lang="en-US"/>
+              <a:t>speed</a:t>
+            </a:r>
+          </a:p>
+          <a:p>
+            <a:pPr lvl="1"/>
+            <a:r>
+              <a:rPr lang="en-US"/>
+              <a:t>use of memory</a:t>
+            </a:r>
+          </a:p>
+          <a:p>
+            <a:r>
+              <a:rPr lang="en-US"/>
+              <a:t>Efficiency of a compiler</a:t>
+            </a:r>
+          </a:p>
+          <a:p>
+            <a:pPr lvl="1"/>
+            <a:r>
+              <a:rPr lang="en-US"/>
+              <a:t>efficiency of the compiler itself</a:t>
+            </a:r>
+          </a:p>
+          <a:p>
+            <a:pPr lvl="1"/>
+            <a:r>
+              <a:rPr lang="en-US"/>
+              <a:t>efficiency of the object code that it generates</a:t>
+            </a:r>
+          </a:p>
+        </p:txBody>
+      </p:sp>
+    </p:spTree>
+  </p:cSld>
+  <p:clrMapOvr>
+    <a:masterClrMapping/>
+  </p:clrMapOvr>
+</p:sld>
+</file>
+
+<file path=ppt/slides/slide31.xml><?xml version="1.0" encoding="utf-8"?>
+<p:sld xmlns:a="http://schemas.openxmlformats.org/drawingml/2006/main" xmlns:r="http://schemas.openxmlformats.org/officeDocument/2006/relationships" xmlns:p="http://schemas.openxmlformats.org/presentationml/2006/main">
+  <p:cSld>
+    <p:spTree>
+      <p:nvGrpSpPr>
+        <p:cNvPr id="1" name=""/>
+        <p:cNvGrpSpPr/>
+        <p:nvPr/>
+      </p:nvGrpSpPr>
+      <p:grpSpPr>
+        <a:xfrm>
+          <a:off x="0" y="0"/>
+          <a:ext cx="0" cy="0"/>
+          <a:chOff x="0" y="0"/>
+          <a:chExt cx="0" cy="0"/>
+        </a:xfrm>
+      </p:grpSpPr>
+      <p:sp>
+        <p:nvSpPr>
           <p:cNvPr id="33794" name="Footer Placeholder 3"/>
           <p:cNvSpPr>
             <a:spLocks noGrp="1"/>
@@ -31700,7 +34713,7 @@
             <a:fld id="{6B892657-F6C6-4A90-B818-B298D3E265B8}" type="slidenum">
               <a:rPr lang="en-US" smtClean="0"/>
               <a:pPr/>
-              <a:t>30</a:t>
+              <a:t>31</a:t>
             </a:fld>
             <a:endParaRPr lang="en-US"/>
           </a:p>
@@ -33758,7 +36771,7 @@
 </p:sld>
 </file>
 
-<file path=ppt/slides/slide31.xml><?xml version="1.0" encoding="utf-8"?>
+<file path=ppt/slides/slide32.xml><?xml version="1.0" encoding="utf-8"?>
 <p:sld xmlns:a="http://schemas.openxmlformats.org/drawingml/2006/main" xmlns:r="http://schemas.openxmlformats.org/officeDocument/2006/relationships" xmlns:p="http://schemas.openxmlformats.org/presentationml/2006/main">
   <p:cSld>
     <p:spTree>
@@ -33823,7 +36836,7 @@
             <a:fld id="{6B892657-F6C6-4A90-B818-B298D3E265B8}" type="slidenum">
               <a:rPr lang="en-US" smtClean="0"/>
               <a:pPr/>
-              <a:t>31</a:t>
+              <a:t>32</a:t>
             </a:fld>
             <a:endParaRPr lang="en-US"/>
           </a:p>
@@ -35726,7 +38739,7 @@
 </p:sld>
 </file>
 
-<file path=ppt/slides/slide32.xml><?xml version="1.0" encoding="utf-8"?>
+<file path=ppt/slides/slide33.xml><?xml version="1.0" encoding="utf-8"?>
 <p:sld xmlns:a="http://schemas.openxmlformats.org/drawingml/2006/main" xmlns:r="http://schemas.openxmlformats.org/officeDocument/2006/relationships" xmlns:p="http://schemas.openxmlformats.org/presentationml/2006/main">
   <p:cSld>
     <p:spTree>
@@ -35791,7 +38804,7 @@
             <a:fld id="{380FA25E-8339-4B04-9CBA-5DFCC61268EA}" type="slidenum">
               <a:rPr lang="en-US" smtClean="0"/>
               <a:pPr/>
-              <a:t>32</a:t>
+              <a:t>33</a:t>
             </a:fld>
             <a:endParaRPr lang="en-US"/>
           </a:p>
@@ -36071,7 +39084,7 @@
 </p:sld>
 </file>
 
-<file path=ppt/slides/slide33.xml><?xml version="1.0" encoding="utf-8"?>
+<file path=ppt/slides/slide34.xml><?xml version="1.0" encoding="utf-8"?>
 <p:sld xmlns:a="http://schemas.openxmlformats.org/drawingml/2006/main" xmlns:r="http://schemas.openxmlformats.org/officeDocument/2006/relationships" xmlns:p="http://schemas.openxmlformats.org/presentationml/2006/main">
   <p:cSld>
     <p:spTree>
@@ -36136,7 +39149,7 @@
             <a:fld id="{664EEF59-2466-41B1-A25C-7DF9D683EC78}" type="slidenum">
               <a:rPr lang="en-US" smtClean="0"/>
               <a:pPr/>
-              <a:t>33</a:t>
+              <a:t>34</a:t>
             </a:fld>
             <a:endParaRPr lang="en-US"/>
           </a:p>
@@ -36955,7 +39968,7 @@
 </p:sld>
 </file>
 
-<file path=ppt/slides/slide34.xml><?xml version="1.0" encoding="utf-8"?>
+<file path=ppt/slides/slide35.xml><?xml version="1.0" encoding="utf-8"?>
 <p:sld xmlns:a="http://schemas.openxmlformats.org/drawingml/2006/main" xmlns:r="http://schemas.openxmlformats.org/officeDocument/2006/relationships" xmlns:p="http://schemas.openxmlformats.org/presentationml/2006/main">
   <p:cSld>
     <p:spTree>
@@ -37020,7 +40033,7 @@
             <a:fld id="{BA60C916-759F-41D1-AB4C-ACDEAA9E9251}" type="slidenum">
               <a:rPr lang="en-US" smtClean="0"/>
               <a:pPr/>
-              <a:t>34</a:t>
+              <a:t>35</a:t>
             </a:fld>
             <a:endParaRPr lang="en-US"/>
           </a:p>
@@ -39224,7 +42237,7 @@
 </p:sld>
 </file>
 
-<file path=ppt/slides/slide35.xml><?xml version="1.0" encoding="utf-8"?>
+<file path=ppt/slides/slide36.xml><?xml version="1.0" encoding="utf-8"?>
 <p:sld xmlns:a="http://schemas.openxmlformats.org/drawingml/2006/main" xmlns:r="http://schemas.openxmlformats.org/officeDocument/2006/relationships" xmlns:p="http://schemas.openxmlformats.org/presentationml/2006/main">
   <p:cSld>
     <p:spTree>
@@ -39289,7 +42302,7 @@
             <a:fld id="{7E969F8D-5909-4C9F-840E-A6F55F635B13}" type="slidenum">
               <a:rPr lang="en-US" smtClean="0"/>
               <a:pPr/>
-              <a:t>35</a:t>
+              <a:t>36</a:t>
             </a:fld>
             <a:endParaRPr lang="en-US"/>
           </a:p>
@@ -39378,7 +42391,7 @@
 </p:sld>
 </file>
 
-<file path=ppt/slides/slide36.xml><?xml version="1.0" encoding="utf-8"?>
+<file path=ppt/slides/slide37.xml><?xml version="1.0" encoding="utf-8"?>
 <p:sld xmlns:a="http://schemas.openxmlformats.org/drawingml/2006/main" xmlns:r="http://schemas.openxmlformats.org/officeDocument/2006/relationships" xmlns:p="http://schemas.openxmlformats.org/presentationml/2006/main">
   <p:cSld>
     <p:spTree>
@@ -39443,7 +42456,7 @@
             <a:fld id="{7E969F8D-5909-4C9F-840E-A6F55F635B13}" type="slidenum">
               <a:rPr lang="en-US" smtClean="0"/>
               <a:pPr/>
-              <a:t>36</a:t>
+              <a:t>37</a:t>
             </a:fld>
             <a:endParaRPr lang="en-US"/>
           </a:p>
@@ -40930,7 +43943,7 @@
 </p:sld>
 </file>
 
-<file path=ppt/slides/slide37.xml><?xml version="1.0" encoding="utf-8"?>
+<file path=ppt/slides/slide38.xml><?xml version="1.0" encoding="utf-8"?>
 <p:sld xmlns:a="http://schemas.openxmlformats.org/drawingml/2006/main" xmlns:r="http://schemas.openxmlformats.org/officeDocument/2006/relationships" xmlns:p="http://schemas.openxmlformats.org/presentationml/2006/main">
   <p:cSld>
     <p:spTree>
@@ -40995,7 +44008,7 @@
             <a:fld id="{D9553B3F-2640-4B19-8022-F68A61F7EE86}" type="slidenum">
               <a:rPr lang="en-US" smtClean="0"/>
               <a:pPr/>
-              <a:t>37</a:t>
+              <a:t>38</a:t>
             </a:fld>
             <a:endParaRPr lang="en-US"/>
           </a:p>
@@ -43386,7 +46399,7 @@
 </p:sld>
 </file>
 
-<file path=ppt/slides/slide38.xml><?xml version="1.0" encoding="utf-8"?>
+<file path=ppt/slides/slide39.xml><?xml version="1.0" encoding="utf-8"?>
 <p:sld xmlns:a="http://schemas.openxmlformats.org/drawingml/2006/main" xmlns:r="http://schemas.openxmlformats.org/officeDocument/2006/relationships" xmlns:p="http://schemas.openxmlformats.org/presentationml/2006/main">
   <p:cSld>
     <p:spTree>
@@ -43451,7 +46464,7 @@
             <a:fld id="{886EEF83-9573-4C6A-A1DA-4BBA5A4368E3}" type="slidenum">
               <a:rPr lang="en-US" smtClean="0"/>
               <a:pPr/>
-              <a:t>38</a:t>
+              <a:t>39</a:t>
             </a:fld>
             <a:endParaRPr lang="en-US"/>
           </a:p>

</xml_diff>

<commit_message>
minor updates to a few slides
</commit_message>
<xml_diff>
--- a/PowerPoints/01 - Overview of Compilers.pptx
+++ b/PowerPoints/01 - Overview of Compilers.pptx
@@ -1,6 +1,6 @@
 
 <file path=ppt/presentation.xml><?xml version="1.0" encoding="utf-8"?>
-<p:presentation xmlns:a="http://schemas.openxmlformats.org/drawingml/2006/main" xmlns:r="http://schemas.openxmlformats.org/officeDocument/2006/relationships" xmlns:p="http://schemas.openxmlformats.org/presentationml/2006/main" saveSubsetFonts="1">
+<p:presentation xmlns:a="http://schemas.openxmlformats.org/drawingml/2006/main" xmlns:r="http://schemas.openxmlformats.org/officeDocument/2006/relationships" xmlns:p="http://schemas.openxmlformats.org/presentationml/2006/main" saveSubsetFonts="1" autoCompressPictures="0">
   <p:sldMasterIdLst>
     <p:sldMasterId id="2147483651" r:id="rId1"/>
   </p:sldMasterIdLst>
@@ -8295,7 +8295,7 @@
             <a:pPr lvl="1"/>
             <a:r>
               <a:rPr lang="en-US" dirty="0"/>
-              <a:t>Execution switches to the compiled version once it becomes available.</a:t>
+              <a:t>Execution switches to the compiled version once it becomes available,</a:t>
             </a:r>
           </a:p>
           <a:p>

</xml_diff>